<commit_message>
move "Normalized" button to the customized toolbar
</commit_message>
<xml_diff>
--- a/app/ui/iconpack/icon.pptx
+++ b/app/ui/iconpack/icon.pptx
@@ -104,6 +104,11 @@
       </a:defRPr>
     </a:lvl9pPr>
   </p:defaultTextStyle>
+  <p:extLst>
+    <p:ext uri="{EFAFB233-063F-42B5-8137-9DF3F51BA10A}">
+      <p15:sldGuideLst xmlns:p15="http://schemas.microsoft.com/office/powerpoint/2012/main"/>
+    </p:ext>
+  </p:extLst>
 </p:presentation>
 </file>
 
@@ -254,7 +259,7 @@
           <a:p>
             <a:fld id="{B9739118-5D76-D243-9607-339F9C0D3323}" type="datetimeFigureOut">
               <a:rPr lang="en-US" smtClean="0"/>
-              <a:t>2/6/25</a:t>
+              <a:t>2/9/25</a:t>
             </a:fld>
             <a:endParaRPr lang="en-US"/>
           </a:p>
@@ -452,7 +457,7 @@
           <a:p>
             <a:fld id="{B9739118-5D76-D243-9607-339F9C0D3323}" type="datetimeFigureOut">
               <a:rPr lang="en-US" smtClean="0"/>
-              <a:t>2/6/25</a:t>
+              <a:t>2/9/25</a:t>
             </a:fld>
             <a:endParaRPr lang="en-US"/>
           </a:p>
@@ -660,7 +665,7 @@
           <a:p>
             <a:fld id="{B9739118-5D76-D243-9607-339F9C0D3323}" type="datetimeFigureOut">
               <a:rPr lang="en-US" smtClean="0"/>
-              <a:t>2/6/25</a:t>
+              <a:t>2/9/25</a:t>
             </a:fld>
             <a:endParaRPr lang="en-US"/>
           </a:p>
@@ -858,7 +863,7 @@
           <a:p>
             <a:fld id="{B9739118-5D76-D243-9607-339F9C0D3323}" type="datetimeFigureOut">
               <a:rPr lang="en-US" smtClean="0"/>
-              <a:t>2/6/25</a:t>
+              <a:t>2/9/25</a:t>
             </a:fld>
             <a:endParaRPr lang="en-US"/>
           </a:p>
@@ -1133,7 +1138,7 @@
           <a:p>
             <a:fld id="{B9739118-5D76-D243-9607-339F9C0D3323}" type="datetimeFigureOut">
               <a:rPr lang="en-US" smtClean="0"/>
-              <a:t>2/6/25</a:t>
+              <a:t>2/9/25</a:t>
             </a:fld>
             <a:endParaRPr lang="en-US"/>
           </a:p>
@@ -1398,7 +1403,7 @@
           <a:p>
             <a:fld id="{B9739118-5D76-D243-9607-339F9C0D3323}" type="datetimeFigureOut">
               <a:rPr lang="en-US" smtClean="0"/>
-              <a:t>2/6/25</a:t>
+              <a:t>2/9/25</a:t>
             </a:fld>
             <a:endParaRPr lang="en-US"/>
           </a:p>
@@ -1810,7 +1815,7 @@
           <a:p>
             <a:fld id="{B9739118-5D76-D243-9607-339F9C0D3323}" type="datetimeFigureOut">
               <a:rPr lang="en-US" smtClean="0"/>
-              <a:t>2/6/25</a:t>
+              <a:t>2/9/25</a:t>
             </a:fld>
             <a:endParaRPr lang="en-US"/>
           </a:p>
@@ -1951,7 +1956,7 @@
           <a:p>
             <a:fld id="{B9739118-5D76-D243-9607-339F9C0D3323}" type="datetimeFigureOut">
               <a:rPr lang="en-US" smtClean="0"/>
-              <a:t>2/6/25</a:t>
+              <a:t>2/9/25</a:t>
             </a:fld>
             <a:endParaRPr lang="en-US"/>
           </a:p>
@@ -2064,7 +2069,7 @@
           <a:p>
             <a:fld id="{B9739118-5D76-D243-9607-339F9C0D3323}" type="datetimeFigureOut">
               <a:rPr lang="en-US" smtClean="0"/>
-              <a:t>2/6/25</a:t>
+              <a:t>2/9/25</a:t>
             </a:fld>
             <a:endParaRPr lang="en-US"/>
           </a:p>
@@ -2375,7 +2380,7 @@
           <a:p>
             <a:fld id="{B9739118-5D76-D243-9607-339F9C0D3323}" type="datetimeFigureOut">
               <a:rPr lang="en-US" smtClean="0"/>
-              <a:t>2/6/25</a:t>
+              <a:t>2/9/25</a:t>
             </a:fld>
             <a:endParaRPr lang="en-US"/>
           </a:p>
@@ -2663,7 +2668,7 @@
           <a:p>
             <a:fld id="{B9739118-5D76-D243-9607-339F9C0D3323}" type="datetimeFigureOut">
               <a:rPr lang="en-US" smtClean="0"/>
-              <a:t>2/6/25</a:t>
+              <a:t>2/9/25</a:t>
             </a:fld>
             <a:endParaRPr lang="en-US"/>
           </a:p>
@@ -2904,7 +2909,7 @@
           <a:p>
             <a:fld id="{B9739118-5D76-D243-9607-339F9C0D3323}" type="datetimeFigureOut">
               <a:rPr lang="en-US" smtClean="0"/>
-              <a:t>2/6/25</a:t>
+              <a:t>2/9/25</a:t>
             </a:fld>
             <a:endParaRPr lang="en-US"/>
           </a:p>
@@ -3440,7 +3445,11 @@
               </a:pathLst>
             </a:custGeom>
             <a:noFill/>
-            <a:ln w="57150"/>
+            <a:ln w="57150">
+              <a:solidFill>
+                <a:schemeClr val="tx1"/>
+              </a:solidFill>
+            </a:ln>
           </p:spPr>
           <p:style>
             <a:lnRef idx="2">
@@ -3792,7 +3801,11 @@
               </a:pathLst>
             </a:custGeom>
             <a:noFill/>
-            <a:ln w="57150"/>
+            <a:ln w="57150">
+              <a:solidFill>
+                <a:schemeClr val="tx1"/>
+              </a:solidFill>
+            </a:ln>
           </p:spPr>
           <p:style>
             <a:lnRef idx="2">
@@ -3924,6 +3937,311 @@
             <a:p>
               <a:pPr algn="ctr"/>
               <a:endParaRPr lang="en-US" dirty="0"/>
+            </a:p>
+          </p:txBody>
+        </p:sp>
+      </p:grpSp>
+      <p:grpSp>
+        <p:nvGrpSpPr>
+          <p:cNvPr id="17" name="Group 16">
+            <a:extLst>
+              <a:ext uri="{FF2B5EF4-FFF2-40B4-BE49-F238E27FC236}">
+                <a16:creationId xmlns:a16="http://schemas.microsoft.com/office/drawing/2014/main" id="{5B3BCF0F-7B7D-6ECB-DF9D-C219BF86A73B}"/>
+              </a:ext>
+            </a:extLst>
+          </p:cNvPr>
+          <p:cNvGrpSpPr/>
+          <p:nvPr/>
+        </p:nvGrpSpPr>
+        <p:grpSpPr>
+          <a:xfrm>
+            <a:off x="8568401" y="3733798"/>
+            <a:ext cx="1219201" cy="872205"/>
+            <a:chOff x="8568401" y="3733798"/>
+            <a:chExt cx="1219201" cy="872205"/>
+          </a:xfrm>
+        </p:grpSpPr>
+        <p:grpSp>
+          <p:nvGrpSpPr>
+            <p:cNvPr id="15" name="Group 14">
+              <a:extLst>
+                <a:ext uri="{FF2B5EF4-FFF2-40B4-BE49-F238E27FC236}">
+                  <a16:creationId xmlns:a16="http://schemas.microsoft.com/office/drawing/2014/main" id="{41A00C56-1854-DAAE-B532-C3AD5E399254}"/>
+                </a:ext>
+              </a:extLst>
+            </p:cNvPr>
+            <p:cNvGrpSpPr/>
+            <p:nvPr/>
+          </p:nvGrpSpPr>
+          <p:grpSpPr>
+            <a:xfrm>
+              <a:off x="8568401" y="3733798"/>
+              <a:ext cx="1219201" cy="872205"/>
+              <a:chOff x="8568401" y="3733798"/>
+              <a:chExt cx="1219201" cy="872205"/>
+            </a:xfrm>
+          </p:grpSpPr>
+          <p:cxnSp>
+            <p:nvCxnSpPr>
+              <p:cNvPr id="7" name="Straight Connector 6">
+                <a:extLst>
+                  <a:ext uri="{FF2B5EF4-FFF2-40B4-BE49-F238E27FC236}">
+                    <a16:creationId xmlns:a16="http://schemas.microsoft.com/office/drawing/2014/main" id="{678AB21F-5AF2-B704-0511-C61702DB1AAB}"/>
+                  </a:ext>
+                </a:extLst>
+              </p:cNvPr>
+              <p:cNvCxnSpPr>
+                <a:cxnSpLocks/>
+              </p:cNvCxnSpPr>
+              <p:nvPr/>
+            </p:nvCxnSpPr>
+            <p:spPr>
+              <a:xfrm>
+                <a:off x="8654144" y="3733798"/>
+                <a:ext cx="1133458" cy="0"/>
+              </a:xfrm>
+              <a:prstGeom prst="line">
+                <a:avLst/>
+              </a:prstGeom>
+              <a:ln w="38100">
+                <a:solidFill>
+                  <a:srgbClr val="D00000"/>
+                </a:solidFill>
+              </a:ln>
+            </p:spPr>
+            <p:style>
+              <a:lnRef idx="2">
+                <a:schemeClr val="accent1"/>
+              </a:lnRef>
+              <a:fillRef idx="0">
+                <a:schemeClr val="accent1"/>
+              </a:fillRef>
+              <a:effectRef idx="1">
+                <a:schemeClr val="accent1"/>
+              </a:effectRef>
+              <a:fontRef idx="minor">
+                <a:schemeClr val="tx1"/>
+              </a:fontRef>
+            </p:style>
+          </p:cxnSp>
+          <p:sp>
+            <p:nvSpPr>
+              <p:cNvPr id="13" name="Freeform 12">
+                <a:extLst>
+                  <a:ext uri="{FF2B5EF4-FFF2-40B4-BE49-F238E27FC236}">
+                    <a16:creationId xmlns:a16="http://schemas.microsoft.com/office/drawing/2014/main" id="{5EB67275-BA45-0F26-36A8-9D4847BED167}"/>
+                  </a:ext>
+                </a:extLst>
+              </p:cNvPr>
+              <p:cNvSpPr/>
+              <p:nvPr/>
+            </p:nvSpPr>
+            <p:spPr>
+              <a:xfrm>
+                <a:off x="8568401" y="3811346"/>
+                <a:ext cx="1034144" cy="794657"/>
+              </a:xfrm>
+              <a:custGeom>
+                <a:avLst/>
+                <a:gdLst>
+                  <a:gd name="connsiteX0" fmla="*/ 0 w 1262743"/>
+                  <a:gd name="connsiteY0" fmla="*/ 1175986 h 1175986"/>
+                  <a:gd name="connsiteX1" fmla="*/ 478972 w 1262743"/>
+                  <a:gd name="connsiteY1" fmla="*/ 914729 h 1175986"/>
+                  <a:gd name="connsiteX2" fmla="*/ 609600 w 1262743"/>
+                  <a:gd name="connsiteY2" fmla="*/ 329 h 1175986"/>
+                  <a:gd name="connsiteX3" fmla="*/ 849086 w 1262743"/>
+                  <a:gd name="connsiteY3" fmla="*/ 1023586 h 1175986"/>
+                  <a:gd name="connsiteX4" fmla="*/ 1262743 w 1262743"/>
+                  <a:gd name="connsiteY4" fmla="*/ 1154215 h 1175986"/>
+                </a:gdLst>
+                <a:ahLst/>
+                <a:cxnLst>
+                  <a:cxn ang="0">
+                    <a:pos x="connsiteX0" y="connsiteY0"/>
+                  </a:cxn>
+                  <a:cxn ang="0">
+                    <a:pos x="connsiteX1" y="connsiteY1"/>
+                  </a:cxn>
+                  <a:cxn ang="0">
+                    <a:pos x="connsiteX2" y="connsiteY2"/>
+                  </a:cxn>
+                  <a:cxn ang="0">
+                    <a:pos x="connsiteX3" y="connsiteY3"/>
+                  </a:cxn>
+                  <a:cxn ang="0">
+                    <a:pos x="connsiteX4" y="connsiteY4"/>
+                  </a:cxn>
+                </a:cxnLst>
+                <a:rect l="l" t="t" r="r" b="b"/>
+                <a:pathLst>
+                  <a:path w="1262743" h="1175986">
+                    <a:moveTo>
+                      <a:pt x="0" y="1175986"/>
+                    </a:moveTo>
+                    <a:cubicBezTo>
+                      <a:pt x="188686" y="1143329"/>
+                      <a:pt x="377372" y="1110672"/>
+                      <a:pt x="478972" y="914729"/>
+                    </a:cubicBezTo>
+                    <a:cubicBezTo>
+                      <a:pt x="580572" y="718786"/>
+                      <a:pt x="547914" y="-17814"/>
+                      <a:pt x="609600" y="329"/>
+                    </a:cubicBezTo>
+                    <a:cubicBezTo>
+                      <a:pt x="671286" y="18472"/>
+                      <a:pt x="740229" y="831272"/>
+                      <a:pt x="849086" y="1023586"/>
+                    </a:cubicBezTo>
+                    <a:cubicBezTo>
+                      <a:pt x="957943" y="1215900"/>
+                      <a:pt x="1197429" y="1132444"/>
+                      <a:pt x="1262743" y="1154215"/>
+                    </a:cubicBezTo>
+                  </a:path>
+                </a:pathLst>
+              </a:custGeom>
+              <a:noFill/>
+              <a:ln w="57150">
+                <a:solidFill>
+                  <a:schemeClr val="tx1"/>
+                </a:solidFill>
+              </a:ln>
+            </p:spPr>
+            <p:style>
+              <a:lnRef idx="2">
+                <a:schemeClr val="accent1">
+                  <a:shade val="15000"/>
+                </a:schemeClr>
+              </a:lnRef>
+              <a:fillRef idx="1">
+                <a:schemeClr val="accent1"/>
+              </a:fillRef>
+              <a:effectRef idx="0">
+                <a:schemeClr val="accent1"/>
+              </a:effectRef>
+              <a:fontRef idx="minor">
+                <a:schemeClr val="lt1"/>
+              </a:fontRef>
+            </p:style>
+            <p:txBody>
+              <a:bodyPr rtlCol="0" anchor="ctr"/>
+              <a:lstStyle/>
+              <a:p>
+                <a:pPr algn="ctr"/>
+                <a:endParaRPr lang="en-US"/>
+              </a:p>
+            </p:txBody>
+          </p:sp>
+        </p:grpSp>
+        <p:sp>
+          <p:nvSpPr>
+            <p:cNvPr id="16" name="Freeform 15">
+              <a:extLst>
+                <a:ext uri="{FF2B5EF4-FFF2-40B4-BE49-F238E27FC236}">
+                  <a16:creationId xmlns:a16="http://schemas.microsoft.com/office/drawing/2014/main" id="{B2248F3C-D89A-DE1C-9611-A774C747096F}"/>
+                </a:ext>
+              </a:extLst>
+            </p:cNvPr>
+            <p:cNvSpPr/>
+            <p:nvPr/>
+          </p:nvSpPr>
+          <p:spPr>
+            <a:xfrm>
+              <a:off x="8753458" y="3811346"/>
+              <a:ext cx="1034144" cy="794657"/>
+            </a:xfrm>
+            <a:custGeom>
+              <a:avLst/>
+              <a:gdLst>
+                <a:gd name="connsiteX0" fmla="*/ 0 w 1262743"/>
+                <a:gd name="connsiteY0" fmla="*/ 1175986 h 1175986"/>
+                <a:gd name="connsiteX1" fmla="*/ 478972 w 1262743"/>
+                <a:gd name="connsiteY1" fmla="*/ 914729 h 1175986"/>
+                <a:gd name="connsiteX2" fmla="*/ 609600 w 1262743"/>
+                <a:gd name="connsiteY2" fmla="*/ 329 h 1175986"/>
+                <a:gd name="connsiteX3" fmla="*/ 849086 w 1262743"/>
+                <a:gd name="connsiteY3" fmla="*/ 1023586 h 1175986"/>
+                <a:gd name="connsiteX4" fmla="*/ 1262743 w 1262743"/>
+                <a:gd name="connsiteY4" fmla="*/ 1154215 h 1175986"/>
+              </a:gdLst>
+              <a:ahLst/>
+              <a:cxnLst>
+                <a:cxn ang="0">
+                  <a:pos x="connsiteX0" y="connsiteY0"/>
+                </a:cxn>
+                <a:cxn ang="0">
+                  <a:pos x="connsiteX1" y="connsiteY1"/>
+                </a:cxn>
+                <a:cxn ang="0">
+                  <a:pos x="connsiteX2" y="connsiteY2"/>
+                </a:cxn>
+                <a:cxn ang="0">
+                  <a:pos x="connsiteX3" y="connsiteY3"/>
+                </a:cxn>
+                <a:cxn ang="0">
+                  <a:pos x="connsiteX4" y="connsiteY4"/>
+                </a:cxn>
+              </a:cxnLst>
+              <a:rect l="l" t="t" r="r" b="b"/>
+              <a:pathLst>
+                <a:path w="1262743" h="1175986">
+                  <a:moveTo>
+                    <a:pt x="0" y="1175986"/>
+                  </a:moveTo>
+                  <a:cubicBezTo>
+                    <a:pt x="188686" y="1143329"/>
+                    <a:pt x="377372" y="1110672"/>
+                    <a:pt x="478972" y="914729"/>
+                  </a:cubicBezTo>
+                  <a:cubicBezTo>
+                    <a:pt x="580572" y="718786"/>
+                    <a:pt x="547914" y="-17814"/>
+                    <a:pt x="609600" y="329"/>
+                  </a:cubicBezTo>
+                  <a:cubicBezTo>
+                    <a:pt x="671286" y="18472"/>
+                    <a:pt x="740229" y="831272"/>
+                    <a:pt x="849086" y="1023586"/>
+                  </a:cubicBezTo>
+                  <a:cubicBezTo>
+                    <a:pt x="957943" y="1215900"/>
+                    <a:pt x="1197429" y="1132444"/>
+                    <a:pt x="1262743" y="1154215"/>
+                  </a:cubicBezTo>
+                </a:path>
+              </a:pathLst>
+            </a:custGeom>
+            <a:noFill/>
+            <a:ln w="57150">
+              <a:solidFill>
+                <a:schemeClr val="tx1"/>
+              </a:solidFill>
+            </a:ln>
+          </p:spPr>
+          <p:style>
+            <a:lnRef idx="2">
+              <a:schemeClr val="accent1">
+                <a:shade val="15000"/>
+              </a:schemeClr>
+            </a:lnRef>
+            <a:fillRef idx="1">
+              <a:schemeClr val="accent1"/>
+            </a:fillRef>
+            <a:effectRef idx="0">
+              <a:schemeClr val="accent1"/>
+            </a:effectRef>
+            <a:fontRef idx="minor">
+              <a:schemeClr val="lt1"/>
+            </a:fontRef>
+          </p:style>
+          <p:txBody>
+            <a:bodyPr rtlCol="0" anchor="ctr"/>
+            <a:lstStyle/>
+            <a:p>
+              <a:pPr algn="ctr"/>
+              <a:endParaRPr lang="en-US"/>
             </a:p>
           </p:txBody>
         </p:sp>

</xml_diff>

<commit_message>
move "Legend" option in Toolbar
</commit_message>
<xml_diff>
--- a/app/ui/iconpack/icon.pptx
+++ b/app/ui/iconpack/icon.pptx
@@ -259,7 +259,7 @@
           <a:p>
             <a:fld id="{B9739118-5D76-D243-9607-339F9C0D3323}" type="datetimeFigureOut">
               <a:rPr lang="en-US" smtClean="0"/>
-              <a:t>2/9/25</a:t>
+              <a:t>3/25/2025</a:t>
             </a:fld>
             <a:endParaRPr lang="en-US"/>
           </a:p>
@@ -313,7 +313,7 @@
           <a:p>
             <a:fld id="{93A46D9C-AB76-C249-9469-514F26A85DAF}" type="slidenum">
               <a:rPr lang="en-US" smtClean="0"/>
-              <a:t>‹#›</a:t>
+              <a:t>‹N°›</a:t>
             </a:fld>
             <a:endParaRPr lang="en-US"/>
           </a:p>
@@ -457,7 +457,7 @@
           <a:p>
             <a:fld id="{B9739118-5D76-D243-9607-339F9C0D3323}" type="datetimeFigureOut">
               <a:rPr lang="en-US" smtClean="0"/>
-              <a:t>2/9/25</a:t>
+              <a:t>3/25/2025</a:t>
             </a:fld>
             <a:endParaRPr lang="en-US"/>
           </a:p>
@@ -511,7 +511,7 @@
           <a:p>
             <a:fld id="{93A46D9C-AB76-C249-9469-514F26A85DAF}" type="slidenum">
               <a:rPr lang="en-US" smtClean="0"/>
-              <a:t>‹#›</a:t>
+              <a:t>‹N°›</a:t>
             </a:fld>
             <a:endParaRPr lang="en-US"/>
           </a:p>
@@ -665,7 +665,7 @@
           <a:p>
             <a:fld id="{B9739118-5D76-D243-9607-339F9C0D3323}" type="datetimeFigureOut">
               <a:rPr lang="en-US" smtClean="0"/>
-              <a:t>2/9/25</a:t>
+              <a:t>3/25/2025</a:t>
             </a:fld>
             <a:endParaRPr lang="en-US"/>
           </a:p>
@@ -719,7 +719,7 @@
           <a:p>
             <a:fld id="{93A46D9C-AB76-C249-9469-514F26A85DAF}" type="slidenum">
               <a:rPr lang="en-US" smtClean="0"/>
-              <a:t>‹#›</a:t>
+              <a:t>‹N°›</a:t>
             </a:fld>
             <a:endParaRPr lang="en-US"/>
           </a:p>
@@ -863,7 +863,7 @@
           <a:p>
             <a:fld id="{B9739118-5D76-D243-9607-339F9C0D3323}" type="datetimeFigureOut">
               <a:rPr lang="en-US" smtClean="0"/>
-              <a:t>2/9/25</a:t>
+              <a:t>3/25/2025</a:t>
             </a:fld>
             <a:endParaRPr lang="en-US"/>
           </a:p>
@@ -917,7 +917,7 @@
           <a:p>
             <a:fld id="{93A46D9C-AB76-C249-9469-514F26A85DAF}" type="slidenum">
               <a:rPr lang="en-US" smtClean="0"/>
-              <a:t>‹#›</a:t>
+              <a:t>‹N°›</a:t>
             </a:fld>
             <a:endParaRPr lang="en-US"/>
           </a:p>
@@ -1138,7 +1138,7 @@
           <a:p>
             <a:fld id="{B9739118-5D76-D243-9607-339F9C0D3323}" type="datetimeFigureOut">
               <a:rPr lang="en-US" smtClean="0"/>
-              <a:t>2/9/25</a:t>
+              <a:t>3/25/2025</a:t>
             </a:fld>
             <a:endParaRPr lang="en-US"/>
           </a:p>
@@ -1192,7 +1192,7 @@
           <a:p>
             <a:fld id="{93A46D9C-AB76-C249-9469-514F26A85DAF}" type="slidenum">
               <a:rPr lang="en-US" smtClean="0"/>
-              <a:t>‹#›</a:t>
+              <a:t>‹N°›</a:t>
             </a:fld>
             <a:endParaRPr lang="en-US"/>
           </a:p>
@@ -1403,7 +1403,7 @@
           <a:p>
             <a:fld id="{B9739118-5D76-D243-9607-339F9C0D3323}" type="datetimeFigureOut">
               <a:rPr lang="en-US" smtClean="0"/>
-              <a:t>2/9/25</a:t>
+              <a:t>3/25/2025</a:t>
             </a:fld>
             <a:endParaRPr lang="en-US"/>
           </a:p>
@@ -1457,7 +1457,7 @@
           <a:p>
             <a:fld id="{93A46D9C-AB76-C249-9469-514F26A85DAF}" type="slidenum">
               <a:rPr lang="en-US" smtClean="0"/>
-              <a:t>‹#›</a:t>
+              <a:t>‹N°›</a:t>
             </a:fld>
             <a:endParaRPr lang="en-US"/>
           </a:p>
@@ -1815,7 +1815,7 @@
           <a:p>
             <a:fld id="{B9739118-5D76-D243-9607-339F9C0D3323}" type="datetimeFigureOut">
               <a:rPr lang="en-US" smtClean="0"/>
-              <a:t>2/9/25</a:t>
+              <a:t>3/25/2025</a:t>
             </a:fld>
             <a:endParaRPr lang="en-US"/>
           </a:p>
@@ -1869,7 +1869,7 @@
           <a:p>
             <a:fld id="{93A46D9C-AB76-C249-9469-514F26A85DAF}" type="slidenum">
               <a:rPr lang="en-US" smtClean="0"/>
-              <a:t>‹#›</a:t>
+              <a:t>‹N°›</a:t>
             </a:fld>
             <a:endParaRPr lang="en-US"/>
           </a:p>
@@ -1956,7 +1956,7 @@
           <a:p>
             <a:fld id="{B9739118-5D76-D243-9607-339F9C0D3323}" type="datetimeFigureOut">
               <a:rPr lang="en-US" smtClean="0"/>
-              <a:t>2/9/25</a:t>
+              <a:t>3/25/2025</a:t>
             </a:fld>
             <a:endParaRPr lang="en-US"/>
           </a:p>
@@ -2010,7 +2010,7 @@
           <a:p>
             <a:fld id="{93A46D9C-AB76-C249-9469-514F26A85DAF}" type="slidenum">
               <a:rPr lang="en-US" smtClean="0"/>
-              <a:t>‹#›</a:t>
+              <a:t>‹N°›</a:t>
             </a:fld>
             <a:endParaRPr lang="en-US"/>
           </a:p>
@@ -2069,7 +2069,7 @@
           <a:p>
             <a:fld id="{B9739118-5D76-D243-9607-339F9C0D3323}" type="datetimeFigureOut">
               <a:rPr lang="en-US" smtClean="0"/>
-              <a:t>2/9/25</a:t>
+              <a:t>3/25/2025</a:t>
             </a:fld>
             <a:endParaRPr lang="en-US"/>
           </a:p>
@@ -2123,7 +2123,7 @@
           <a:p>
             <a:fld id="{93A46D9C-AB76-C249-9469-514F26A85DAF}" type="slidenum">
               <a:rPr lang="en-US" smtClean="0"/>
-              <a:t>‹#›</a:t>
+              <a:t>‹N°›</a:t>
             </a:fld>
             <a:endParaRPr lang="en-US"/>
           </a:p>
@@ -2380,7 +2380,7 @@
           <a:p>
             <a:fld id="{B9739118-5D76-D243-9607-339F9C0D3323}" type="datetimeFigureOut">
               <a:rPr lang="en-US" smtClean="0"/>
-              <a:t>2/9/25</a:t>
+              <a:t>3/25/2025</a:t>
             </a:fld>
             <a:endParaRPr lang="en-US"/>
           </a:p>
@@ -2434,7 +2434,7 @@
           <a:p>
             <a:fld id="{93A46D9C-AB76-C249-9469-514F26A85DAF}" type="slidenum">
               <a:rPr lang="en-US" smtClean="0"/>
-              <a:t>‹#›</a:t>
+              <a:t>‹N°›</a:t>
             </a:fld>
             <a:endParaRPr lang="en-US"/>
           </a:p>
@@ -2668,7 +2668,7 @@
           <a:p>
             <a:fld id="{B9739118-5D76-D243-9607-339F9C0D3323}" type="datetimeFigureOut">
               <a:rPr lang="en-US" smtClean="0"/>
-              <a:t>2/9/25</a:t>
+              <a:t>3/25/2025</a:t>
             </a:fld>
             <a:endParaRPr lang="en-US"/>
           </a:p>
@@ -2722,7 +2722,7 @@
           <a:p>
             <a:fld id="{93A46D9C-AB76-C249-9469-514F26A85DAF}" type="slidenum">
               <a:rPr lang="en-US" smtClean="0"/>
-              <a:t>‹#›</a:t>
+              <a:t>‹N°›</a:t>
             </a:fld>
             <a:endParaRPr lang="en-US"/>
           </a:p>
@@ -2909,7 +2909,7 @@
           <a:p>
             <a:fld id="{B9739118-5D76-D243-9607-339F9C0D3323}" type="datetimeFigureOut">
               <a:rPr lang="en-US" smtClean="0"/>
-              <a:t>2/9/25</a:t>
+              <a:t>3/25/2025</a:t>
             </a:fld>
             <a:endParaRPr lang="en-US"/>
           </a:p>
@@ -2999,7 +2999,7 @@
           <a:p>
             <a:fld id="{93A46D9C-AB76-C249-9469-514F26A85DAF}" type="slidenum">
               <a:rPr lang="en-US" smtClean="0"/>
-              <a:t>‹#›</a:t>
+              <a:t>‹N°›</a:t>
             </a:fld>
             <a:endParaRPr lang="en-US"/>
           </a:p>
@@ -4224,6 +4224,189 @@
             <a:lnRef idx="2">
               <a:schemeClr val="accent1">
                 <a:shade val="15000"/>
+              </a:schemeClr>
+            </a:lnRef>
+            <a:fillRef idx="1">
+              <a:schemeClr val="accent1"/>
+            </a:fillRef>
+            <a:effectRef idx="0">
+              <a:schemeClr val="accent1"/>
+            </a:effectRef>
+            <a:fontRef idx="minor">
+              <a:schemeClr val="lt1"/>
+            </a:fontRef>
+          </p:style>
+          <p:txBody>
+            <a:bodyPr rtlCol="0" anchor="ctr"/>
+            <a:lstStyle/>
+            <a:p>
+              <a:pPr algn="ctr"/>
+              <a:endParaRPr lang="en-US"/>
+            </a:p>
+          </p:txBody>
+        </p:sp>
+      </p:grpSp>
+      <p:grpSp>
+        <p:nvGrpSpPr>
+          <p:cNvPr id="11" name="Groupe 10">
+            <a:extLst>
+              <a:ext uri="{FF2B5EF4-FFF2-40B4-BE49-F238E27FC236}">
+                <a16:creationId xmlns:a16="http://schemas.microsoft.com/office/drawing/2014/main" id="{07BDC365-CE43-4666-BDDF-0822D9C4EC24}"/>
+              </a:ext>
+            </a:extLst>
+          </p:cNvPr>
+          <p:cNvGrpSpPr/>
+          <p:nvPr/>
+        </p:nvGrpSpPr>
+        <p:grpSpPr>
+          <a:xfrm>
+            <a:off x="1981199" y="4873645"/>
+            <a:ext cx="1034144" cy="845341"/>
+            <a:chOff x="1981199" y="4873645"/>
+            <a:chExt cx="1034144" cy="845341"/>
+          </a:xfrm>
+        </p:grpSpPr>
+        <p:sp>
+          <p:nvSpPr>
+            <p:cNvPr id="28" name="Freeform 12">
+              <a:extLst>
+                <a:ext uri="{FF2B5EF4-FFF2-40B4-BE49-F238E27FC236}">
+                  <a16:creationId xmlns:a16="http://schemas.microsoft.com/office/drawing/2014/main" id="{0DFE1D0F-DC0D-4F23-B2DA-3B2AE057D766}"/>
+                </a:ext>
+              </a:extLst>
+            </p:cNvPr>
+            <p:cNvSpPr/>
+            <p:nvPr/>
+          </p:nvSpPr>
+          <p:spPr>
+            <a:xfrm>
+              <a:off x="1981199" y="5080000"/>
+              <a:ext cx="1034144" cy="638986"/>
+            </a:xfrm>
+            <a:custGeom>
+              <a:avLst/>
+              <a:gdLst>
+                <a:gd name="connsiteX0" fmla="*/ 0 w 1262743"/>
+                <a:gd name="connsiteY0" fmla="*/ 1175986 h 1175986"/>
+                <a:gd name="connsiteX1" fmla="*/ 478972 w 1262743"/>
+                <a:gd name="connsiteY1" fmla="*/ 914729 h 1175986"/>
+                <a:gd name="connsiteX2" fmla="*/ 609600 w 1262743"/>
+                <a:gd name="connsiteY2" fmla="*/ 329 h 1175986"/>
+                <a:gd name="connsiteX3" fmla="*/ 849086 w 1262743"/>
+                <a:gd name="connsiteY3" fmla="*/ 1023586 h 1175986"/>
+                <a:gd name="connsiteX4" fmla="*/ 1262743 w 1262743"/>
+                <a:gd name="connsiteY4" fmla="*/ 1154215 h 1175986"/>
+              </a:gdLst>
+              <a:ahLst/>
+              <a:cxnLst>
+                <a:cxn ang="0">
+                  <a:pos x="connsiteX0" y="connsiteY0"/>
+                </a:cxn>
+                <a:cxn ang="0">
+                  <a:pos x="connsiteX1" y="connsiteY1"/>
+                </a:cxn>
+                <a:cxn ang="0">
+                  <a:pos x="connsiteX2" y="connsiteY2"/>
+                </a:cxn>
+                <a:cxn ang="0">
+                  <a:pos x="connsiteX3" y="connsiteY3"/>
+                </a:cxn>
+                <a:cxn ang="0">
+                  <a:pos x="connsiteX4" y="connsiteY4"/>
+                </a:cxn>
+              </a:cxnLst>
+              <a:rect l="l" t="t" r="r" b="b"/>
+              <a:pathLst>
+                <a:path w="1262743" h="1175986">
+                  <a:moveTo>
+                    <a:pt x="0" y="1175986"/>
+                  </a:moveTo>
+                  <a:cubicBezTo>
+                    <a:pt x="188686" y="1143329"/>
+                    <a:pt x="377372" y="1110672"/>
+                    <a:pt x="478972" y="914729"/>
+                  </a:cubicBezTo>
+                  <a:cubicBezTo>
+                    <a:pt x="580572" y="718786"/>
+                    <a:pt x="547914" y="-17814"/>
+                    <a:pt x="609600" y="329"/>
+                  </a:cubicBezTo>
+                  <a:cubicBezTo>
+                    <a:pt x="671286" y="18472"/>
+                    <a:pt x="740229" y="831272"/>
+                    <a:pt x="849086" y="1023586"/>
+                  </a:cubicBezTo>
+                  <a:cubicBezTo>
+                    <a:pt x="957943" y="1215900"/>
+                    <a:pt x="1197429" y="1132444"/>
+                    <a:pt x="1262743" y="1154215"/>
+                  </a:cubicBezTo>
+                </a:path>
+              </a:pathLst>
+            </a:custGeom>
+            <a:noFill/>
+            <a:ln w="57150">
+              <a:solidFill>
+                <a:schemeClr val="tx1"/>
+              </a:solidFill>
+            </a:ln>
+          </p:spPr>
+          <p:style>
+            <a:lnRef idx="2">
+              <a:schemeClr val="accent1">
+                <a:shade val="15000"/>
+              </a:schemeClr>
+            </a:lnRef>
+            <a:fillRef idx="1">
+              <a:schemeClr val="accent1"/>
+            </a:fillRef>
+            <a:effectRef idx="0">
+              <a:schemeClr val="accent1"/>
+            </a:effectRef>
+            <a:fontRef idx="minor">
+              <a:schemeClr val="lt1"/>
+            </a:fontRef>
+          </p:style>
+          <p:txBody>
+            <a:bodyPr rtlCol="0" anchor="ctr"/>
+            <a:lstStyle/>
+            <a:p>
+              <a:pPr algn="ctr"/>
+              <a:endParaRPr lang="en-US" dirty="0"/>
+            </a:p>
+          </p:txBody>
+        </p:sp>
+        <p:sp>
+          <p:nvSpPr>
+            <p:cNvPr id="9" name="Rectangle : coins arrondis 8">
+              <a:extLst>
+                <a:ext uri="{FF2B5EF4-FFF2-40B4-BE49-F238E27FC236}">
+                  <a16:creationId xmlns:a16="http://schemas.microsoft.com/office/drawing/2014/main" id="{5832AC24-B752-458E-B297-9A71AF0F47B0}"/>
+                </a:ext>
+              </a:extLst>
+            </p:cNvPr>
+            <p:cNvSpPr/>
+            <p:nvPr/>
+          </p:nvSpPr>
+          <p:spPr>
+            <a:xfrm>
+              <a:off x="2593711" y="4873645"/>
+              <a:ext cx="410853" cy="283364"/>
+            </a:xfrm>
+            <a:prstGeom prst="roundRect">
+              <a:avLst/>
+            </a:prstGeom>
+            <a:noFill/>
+            <a:ln w="76200">
+              <a:solidFill>
+                <a:srgbClr val="0070C0"/>
+              </a:solidFill>
+            </a:ln>
+          </p:spPr>
+          <p:style>
+            <a:lnRef idx="2">
+              <a:schemeClr val="accent1">
+                <a:shade val="50000"/>
               </a:schemeClr>
             </a:lnRef>
             <a:fillRef idx="1">

</xml_diff>

<commit_message>
update icons for "plot_sytles" comboboxes
</commit_message>
<xml_diff>
--- a/app/ui/iconpack/icon.pptx
+++ b/app/ui/iconpack/icon.pptx
@@ -6,6 +6,9 @@
   </p:sldMasterIdLst>
   <p:sldIdLst>
     <p:sldId id="256" r:id="rId2"/>
+    <p:sldId id="257" r:id="rId3"/>
+    <p:sldId id="258" r:id="rId4"/>
+    <p:sldId id="259" r:id="rId5"/>
   </p:sldIdLst>
   <p:sldSz cx="12192000" cy="6858000"/>
   <p:notesSz cx="6858000" cy="9144000"/>
@@ -259,7 +262,7 @@
           <a:p>
             <a:fld id="{B9739118-5D76-D243-9607-339F9C0D3323}" type="datetimeFigureOut">
               <a:rPr lang="en-US" smtClean="0"/>
-              <a:t>3/25/2025</a:t>
+              <a:t>7/4/25</a:t>
             </a:fld>
             <a:endParaRPr lang="en-US"/>
           </a:p>
@@ -313,7 +316,7 @@
           <a:p>
             <a:fld id="{93A46D9C-AB76-C249-9469-514F26A85DAF}" type="slidenum">
               <a:rPr lang="en-US" smtClean="0"/>
-              <a:t>‹N°›</a:t>
+              <a:t>‹#›</a:t>
             </a:fld>
             <a:endParaRPr lang="en-US"/>
           </a:p>
@@ -457,7 +460,7 @@
           <a:p>
             <a:fld id="{B9739118-5D76-D243-9607-339F9C0D3323}" type="datetimeFigureOut">
               <a:rPr lang="en-US" smtClean="0"/>
-              <a:t>3/25/2025</a:t>
+              <a:t>7/4/25</a:t>
             </a:fld>
             <a:endParaRPr lang="en-US"/>
           </a:p>
@@ -511,7 +514,7 @@
           <a:p>
             <a:fld id="{93A46D9C-AB76-C249-9469-514F26A85DAF}" type="slidenum">
               <a:rPr lang="en-US" smtClean="0"/>
-              <a:t>‹N°›</a:t>
+              <a:t>‹#›</a:t>
             </a:fld>
             <a:endParaRPr lang="en-US"/>
           </a:p>
@@ -665,7 +668,7 @@
           <a:p>
             <a:fld id="{B9739118-5D76-D243-9607-339F9C0D3323}" type="datetimeFigureOut">
               <a:rPr lang="en-US" smtClean="0"/>
-              <a:t>3/25/2025</a:t>
+              <a:t>7/4/25</a:t>
             </a:fld>
             <a:endParaRPr lang="en-US"/>
           </a:p>
@@ -719,7 +722,7 @@
           <a:p>
             <a:fld id="{93A46D9C-AB76-C249-9469-514F26A85DAF}" type="slidenum">
               <a:rPr lang="en-US" smtClean="0"/>
-              <a:t>‹N°›</a:t>
+              <a:t>‹#›</a:t>
             </a:fld>
             <a:endParaRPr lang="en-US"/>
           </a:p>
@@ -863,7 +866,7 @@
           <a:p>
             <a:fld id="{B9739118-5D76-D243-9607-339F9C0D3323}" type="datetimeFigureOut">
               <a:rPr lang="en-US" smtClean="0"/>
-              <a:t>3/25/2025</a:t>
+              <a:t>7/4/25</a:t>
             </a:fld>
             <a:endParaRPr lang="en-US"/>
           </a:p>
@@ -917,7 +920,7 @@
           <a:p>
             <a:fld id="{93A46D9C-AB76-C249-9469-514F26A85DAF}" type="slidenum">
               <a:rPr lang="en-US" smtClean="0"/>
-              <a:t>‹N°›</a:t>
+              <a:t>‹#›</a:t>
             </a:fld>
             <a:endParaRPr lang="en-US"/>
           </a:p>
@@ -1138,7 +1141,7 @@
           <a:p>
             <a:fld id="{B9739118-5D76-D243-9607-339F9C0D3323}" type="datetimeFigureOut">
               <a:rPr lang="en-US" smtClean="0"/>
-              <a:t>3/25/2025</a:t>
+              <a:t>7/4/25</a:t>
             </a:fld>
             <a:endParaRPr lang="en-US"/>
           </a:p>
@@ -1192,7 +1195,7 @@
           <a:p>
             <a:fld id="{93A46D9C-AB76-C249-9469-514F26A85DAF}" type="slidenum">
               <a:rPr lang="en-US" smtClean="0"/>
-              <a:t>‹N°›</a:t>
+              <a:t>‹#›</a:t>
             </a:fld>
             <a:endParaRPr lang="en-US"/>
           </a:p>
@@ -1403,7 +1406,7 @@
           <a:p>
             <a:fld id="{B9739118-5D76-D243-9607-339F9C0D3323}" type="datetimeFigureOut">
               <a:rPr lang="en-US" smtClean="0"/>
-              <a:t>3/25/2025</a:t>
+              <a:t>7/4/25</a:t>
             </a:fld>
             <a:endParaRPr lang="en-US"/>
           </a:p>
@@ -1457,7 +1460,7 @@
           <a:p>
             <a:fld id="{93A46D9C-AB76-C249-9469-514F26A85DAF}" type="slidenum">
               <a:rPr lang="en-US" smtClean="0"/>
-              <a:t>‹N°›</a:t>
+              <a:t>‹#›</a:t>
             </a:fld>
             <a:endParaRPr lang="en-US"/>
           </a:p>
@@ -1815,7 +1818,7 @@
           <a:p>
             <a:fld id="{B9739118-5D76-D243-9607-339F9C0D3323}" type="datetimeFigureOut">
               <a:rPr lang="en-US" smtClean="0"/>
-              <a:t>3/25/2025</a:t>
+              <a:t>7/4/25</a:t>
             </a:fld>
             <a:endParaRPr lang="en-US"/>
           </a:p>
@@ -1869,7 +1872,7 @@
           <a:p>
             <a:fld id="{93A46D9C-AB76-C249-9469-514F26A85DAF}" type="slidenum">
               <a:rPr lang="en-US" smtClean="0"/>
-              <a:t>‹N°›</a:t>
+              <a:t>‹#›</a:t>
             </a:fld>
             <a:endParaRPr lang="en-US"/>
           </a:p>
@@ -1956,7 +1959,7 @@
           <a:p>
             <a:fld id="{B9739118-5D76-D243-9607-339F9C0D3323}" type="datetimeFigureOut">
               <a:rPr lang="en-US" smtClean="0"/>
-              <a:t>3/25/2025</a:t>
+              <a:t>7/4/25</a:t>
             </a:fld>
             <a:endParaRPr lang="en-US"/>
           </a:p>
@@ -2010,7 +2013,7 @@
           <a:p>
             <a:fld id="{93A46D9C-AB76-C249-9469-514F26A85DAF}" type="slidenum">
               <a:rPr lang="en-US" smtClean="0"/>
-              <a:t>‹N°›</a:t>
+              <a:t>‹#›</a:t>
             </a:fld>
             <a:endParaRPr lang="en-US"/>
           </a:p>
@@ -2069,7 +2072,7 @@
           <a:p>
             <a:fld id="{B9739118-5D76-D243-9607-339F9C0D3323}" type="datetimeFigureOut">
               <a:rPr lang="en-US" smtClean="0"/>
-              <a:t>3/25/2025</a:t>
+              <a:t>7/4/25</a:t>
             </a:fld>
             <a:endParaRPr lang="en-US"/>
           </a:p>
@@ -2123,7 +2126,7 @@
           <a:p>
             <a:fld id="{93A46D9C-AB76-C249-9469-514F26A85DAF}" type="slidenum">
               <a:rPr lang="en-US" smtClean="0"/>
-              <a:t>‹N°›</a:t>
+              <a:t>‹#›</a:t>
             </a:fld>
             <a:endParaRPr lang="en-US"/>
           </a:p>
@@ -2380,7 +2383,7 @@
           <a:p>
             <a:fld id="{B9739118-5D76-D243-9607-339F9C0D3323}" type="datetimeFigureOut">
               <a:rPr lang="en-US" smtClean="0"/>
-              <a:t>3/25/2025</a:t>
+              <a:t>7/4/25</a:t>
             </a:fld>
             <a:endParaRPr lang="en-US"/>
           </a:p>
@@ -2434,7 +2437,7 @@
           <a:p>
             <a:fld id="{93A46D9C-AB76-C249-9469-514F26A85DAF}" type="slidenum">
               <a:rPr lang="en-US" smtClean="0"/>
-              <a:t>‹N°›</a:t>
+              <a:t>‹#›</a:t>
             </a:fld>
             <a:endParaRPr lang="en-US"/>
           </a:p>
@@ -2668,7 +2671,7 @@
           <a:p>
             <a:fld id="{B9739118-5D76-D243-9607-339F9C0D3323}" type="datetimeFigureOut">
               <a:rPr lang="en-US" smtClean="0"/>
-              <a:t>3/25/2025</a:t>
+              <a:t>7/4/25</a:t>
             </a:fld>
             <a:endParaRPr lang="en-US"/>
           </a:p>
@@ -2722,7 +2725,7 @@
           <a:p>
             <a:fld id="{93A46D9C-AB76-C249-9469-514F26A85DAF}" type="slidenum">
               <a:rPr lang="en-US" smtClean="0"/>
-              <a:t>‹N°›</a:t>
+              <a:t>‹#›</a:t>
             </a:fld>
             <a:endParaRPr lang="en-US"/>
           </a:p>
@@ -2909,7 +2912,7 @@
           <a:p>
             <a:fld id="{B9739118-5D76-D243-9607-339F9C0D3323}" type="datetimeFigureOut">
               <a:rPr lang="en-US" smtClean="0"/>
-              <a:t>3/25/2025</a:t>
+              <a:t>7/4/25</a:t>
             </a:fld>
             <a:endParaRPr lang="en-US"/>
           </a:p>
@@ -2999,7 +3002,7 @@
           <a:p>
             <a:fld id="{93A46D9C-AB76-C249-9469-514F26A85DAF}" type="slidenum">
               <a:rPr lang="en-US" smtClean="0"/>
-              <a:t>‹N°›</a:t>
+              <a:t>‹#›</a:t>
             </a:fld>
             <a:endParaRPr lang="en-US"/>
           </a:p>
@@ -4442,6 +4445,4154 @@
 </p:sld>
 </file>
 
+<file path=ppt/slides/slide2.xml><?xml version="1.0" encoding="utf-8"?>
+<p:sld xmlns:a="http://schemas.openxmlformats.org/drawingml/2006/main" xmlns:r="http://schemas.openxmlformats.org/officeDocument/2006/relationships" xmlns:p="http://schemas.openxmlformats.org/presentationml/2006/main">
+  <p:cSld>
+    <p:spTree>
+      <p:nvGrpSpPr>
+        <p:cNvPr id="1" name=""/>
+        <p:cNvGrpSpPr/>
+        <p:nvPr/>
+      </p:nvGrpSpPr>
+      <p:grpSpPr>
+        <a:xfrm>
+          <a:off x="0" y="0"/>
+          <a:ext cx="0" cy="0"/>
+          <a:chOff x="0" y="0"/>
+          <a:chExt cx="0" cy="0"/>
+        </a:xfrm>
+      </p:grpSpPr>
+      <p:grpSp>
+        <p:nvGrpSpPr>
+          <p:cNvPr id="67" name="Group 66">
+            <a:extLst>
+              <a:ext uri="{FF2B5EF4-FFF2-40B4-BE49-F238E27FC236}">
+                <a16:creationId xmlns:a16="http://schemas.microsoft.com/office/drawing/2014/main" id="{CD1B873A-7D2A-9064-B721-10C1A86B5624}"/>
+              </a:ext>
+            </a:extLst>
+          </p:cNvPr>
+          <p:cNvGrpSpPr/>
+          <p:nvPr/>
+        </p:nvGrpSpPr>
+        <p:grpSpPr>
+          <a:xfrm>
+            <a:off x="935421" y="1608083"/>
+            <a:ext cx="3962400" cy="2627586"/>
+            <a:chOff x="935421" y="1608083"/>
+            <a:chExt cx="3962400" cy="2627586"/>
+          </a:xfrm>
+        </p:grpSpPr>
+        <p:cxnSp>
+          <p:nvCxnSpPr>
+            <p:cNvPr id="9" name="Straight Connector 8">
+              <a:extLst>
+                <a:ext uri="{FF2B5EF4-FFF2-40B4-BE49-F238E27FC236}">
+                  <a16:creationId xmlns:a16="http://schemas.microsoft.com/office/drawing/2014/main" id="{358F840D-A54E-6465-BBFF-31BA52665EDA}"/>
+                </a:ext>
+              </a:extLst>
+            </p:cNvPr>
+            <p:cNvCxnSpPr>
+              <a:cxnSpLocks/>
+            </p:cNvCxnSpPr>
+            <p:nvPr/>
+          </p:nvCxnSpPr>
+          <p:spPr>
+            <a:xfrm>
+              <a:off x="935421" y="4214649"/>
+              <a:ext cx="3962400" cy="0"/>
+            </a:xfrm>
+            <a:prstGeom prst="line">
+              <a:avLst/>
+            </a:prstGeom>
+            <a:ln w="76200"/>
+          </p:spPr>
+          <p:style>
+            <a:lnRef idx="2">
+              <a:schemeClr val="dk1"/>
+            </a:lnRef>
+            <a:fillRef idx="0">
+              <a:schemeClr val="dk1"/>
+            </a:fillRef>
+            <a:effectRef idx="1">
+              <a:schemeClr val="dk1"/>
+            </a:effectRef>
+            <a:fontRef idx="minor">
+              <a:schemeClr val="tx1"/>
+            </a:fontRef>
+          </p:style>
+        </p:cxnSp>
+        <p:cxnSp>
+          <p:nvCxnSpPr>
+            <p:cNvPr id="10" name="Straight Connector 9">
+              <a:extLst>
+                <a:ext uri="{FF2B5EF4-FFF2-40B4-BE49-F238E27FC236}">
+                  <a16:creationId xmlns:a16="http://schemas.microsoft.com/office/drawing/2014/main" id="{0F133D34-1368-3D0B-53C9-A5A9DB117BE9}"/>
+                </a:ext>
+              </a:extLst>
+            </p:cNvPr>
+            <p:cNvCxnSpPr>
+              <a:cxnSpLocks/>
+            </p:cNvCxnSpPr>
+            <p:nvPr/>
+          </p:nvCxnSpPr>
+          <p:spPr>
+            <a:xfrm flipV="1">
+              <a:off x="940676" y="1608083"/>
+              <a:ext cx="0" cy="2627586"/>
+            </a:xfrm>
+            <a:prstGeom prst="line">
+              <a:avLst/>
+            </a:prstGeom>
+            <a:ln w="76200"/>
+          </p:spPr>
+          <p:style>
+            <a:lnRef idx="2">
+              <a:schemeClr val="dk1"/>
+            </a:lnRef>
+            <a:fillRef idx="0">
+              <a:schemeClr val="dk1"/>
+            </a:fillRef>
+            <a:effectRef idx="1">
+              <a:schemeClr val="dk1"/>
+            </a:effectRef>
+            <a:fontRef idx="minor">
+              <a:schemeClr val="tx1"/>
+            </a:fontRef>
+          </p:style>
+        </p:cxnSp>
+        <p:sp>
+          <p:nvSpPr>
+            <p:cNvPr id="17" name="Rounded Rectangle 16">
+              <a:extLst>
+                <a:ext uri="{FF2B5EF4-FFF2-40B4-BE49-F238E27FC236}">
+                  <a16:creationId xmlns:a16="http://schemas.microsoft.com/office/drawing/2014/main" id="{D0EC0007-22DB-FA68-4765-32277CFA3145}"/>
+                </a:ext>
+              </a:extLst>
+            </p:cNvPr>
+            <p:cNvSpPr/>
+            <p:nvPr/>
+          </p:nvSpPr>
+          <p:spPr>
+            <a:xfrm>
+              <a:off x="1489391" y="2983173"/>
+              <a:ext cx="504497" cy="1156139"/>
+            </a:xfrm>
+            <a:prstGeom prst="roundRect">
+              <a:avLst/>
+            </a:prstGeom>
+            <a:solidFill>
+              <a:schemeClr val="tx2">
+                <a:lumMod val="50000"/>
+                <a:lumOff val="50000"/>
+              </a:schemeClr>
+            </a:solidFill>
+          </p:spPr>
+          <p:style>
+            <a:lnRef idx="2">
+              <a:schemeClr val="accent1">
+                <a:shade val="15000"/>
+              </a:schemeClr>
+            </a:lnRef>
+            <a:fillRef idx="1">
+              <a:schemeClr val="accent1"/>
+            </a:fillRef>
+            <a:effectRef idx="0">
+              <a:schemeClr val="accent1"/>
+            </a:effectRef>
+            <a:fontRef idx="minor">
+              <a:schemeClr val="lt1"/>
+            </a:fontRef>
+          </p:style>
+          <p:txBody>
+            <a:bodyPr rtlCol="0" anchor="ctr"/>
+            <a:lstStyle/>
+            <a:p>
+              <a:pPr algn="ctr"/>
+              <a:endParaRPr lang="en-US"/>
+            </a:p>
+          </p:txBody>
+        </p:sp>
+        <p:sp>
+          <p:nvSpPr>
+            <p:cNvPr id="18" name="Rounded Rectangle 17">
+              <a:extLst>
+                <a:ext uri="{FF2B5EF4-FFF2-40B4-BE49-F238E27FC236}">
+                  <a16:creationId xmlns:a16="http://schemas.microsoft.com/office/drawing/2014/main" id="{F1914DB0-430F-5494-4E90-881A1050B407}"/>
+                </a:ext>
+              </a:extLst>
+            </p:cNvPr>
+            <p:cNvSpPr/>
+            <p:nvPr/>
+          </p:nvSpPr>
+          <p:spPr>
+            <a:xfrm>
+              <a:off x="2275489" y="2592833"/>
+              <a:ext cx="504497" cy="1555532"/>
+            </a:xfrm>
+            <a:prstGeom prst="roundRect">
+              <a:avLst/>
+            </a:prstGeom>
+            <a:solidFill>
+              <a:schemeClr val="accent5">
+                <a:lumMod val="60000"/>
+                <a:lumOff val="40000"/>
+              </a:schemeClr>
+            </a:solidFill>
+          </p:spPr>
+          <p:style>
+            <a:lnRef idx="2">
+              <a:schemeClr val="accent1">
+                <a:shade val="15000"/>
+              </a:schemeClr>
+            </a:lnRef>
+            <a:fillRef idx="1">
+              <a:schemeClr val="accent1"/>
+            </a:fillRef>
+            <a:effectRef idx="0">
+              <a:schemeClr val="accent1"/>
+            </a:effectRef>
+            <a:fontRef idx="minor">
+              <a:schemeClr val="lt1"/>
+            </a:fontRef>
+          </p:style>
+          <p:txBody>
+            <a:bodyPr rtlCol="0" anchor="ctr"/>
+            <a:lstStyle/>
+            <a:p>
+              <a:pPr algn="ctr"/>
+              <a:endParaRPr lang="en-US"/>
+            </a:p>
+          </p:txBody>
+        </p:sp>
+        <p:sp>
+          <p:nvSpPr>
+            <p:cNvPr id="19" name="Rounded Rectangle 18">
+              <a:extLst>
+                <a:ext uri="{FF2B5EF4-FFF2-40B4-BE49-F238E27FC236}">
+                  <a16:creationId xmlns:a16="http://schemas.microsoft.com/office/drawing/2014/main" id="{D78ADB0A-6AC9-845E-AFF1-109D17E9BF0B}"/>
+                </a:ext>
+              </a:extLst>
+            </p:cNvPr>
+            <p:cNvSpPr/>
+            <p:nvPr/>
+          </p:nvSpPr>
+          <p:spPr>
+            <a:xfrm>
+              <a:off x="3069019" y="2297093"/>
+              <a:ext cx="504497" cy="1860325"/>
+            </a:xfrm>
+            <a:prstGeom prst="roundRect">
+              <a:avLst/>
+            </a:prstGeom>
+            <a:solidFill>
+              <a:schemeClr val="accent3">
+                <a:lumMod val="60000"/>
+                <a:lumOff val="40000"/>
+              </a:schemeClr>
+            </a:solidFill>
+          </p:spPr>
+          <p:style>
+            <a:lnRef idx="2">
+              <a:schemeClr val="accent1">
+                <a:shade val="15000"/>
+              </a:schemeClr>
+            </a:lnRef>
+            <a:fillRef idx="1">
+              <a:schemeClr val="accent1"/>
+            </a:fillRef>
+            <a:effectRef idx="0">
+              <a:schemeClr val="accent1"/>
+            </a:effectRef>
+            <a:fontRef idx="minor">
+              <a:schemeClr val="lt1"/>
+            </a:fontRef>
+          </p:style>
+          <p:txBody>
+            <a:bodyPr rtlCol="0" anchor="ctr"/>
+            <a:lstStyle/>
+            <a:p>
+              <a:pPr algn="ctr"/>
+              <a:endParaRPr lang="en-US"/>
+            </a:p>
+          </p:txBody>
+        </p:sp>
+        <p:sp>
+          <p:nvSpPr>
+            <p:cNvPr id="20" name="Rounded Rectangle 19">
+              <a:extLst>
+                <a:ext uri="{FF2B5EF4-FFF2-40B4-BE49-F238E27FC236}">
+                  <a16:creationId xmlns:a16="http://schemas.microsoft.com/office/drawing/2014/main" id="{D928BEB0-001E-68B5-E947-8DB5E53D5AAE}"/>
+                </a:ext>
+              </a:extLst>
+            </p:cNvPr>
+            <p:cNvSpPr/>
+            <p:nvPr/>
+          </p:nvSpPr>
+          <p:spPr>
+            <a:xfrm>
+              <a:off x="3862549" y="1888651"/>
+              <a:ext cx="504497" cy="2259714"/>
+            </a:xfrm>
+            <a:prstGeom prst="roundRect">
+              <a:avLst/>
+            </a:prstGeom>
+            <a:solidFill>
+              <a:schemeClr val="accent2">
+                <a:lumMod val="75000"/>
+              </a:schemeClr>
+            </a:solidFill>
+          </p:spPr>
+          <p:style>
+            <a:lnRef idx="2">
+              <a:schemeClr val="accent1">
+                <a:shade val="15000"/>
+              </a:schemeClr>
+            </a:lnRef>
+            <a:fillRef idx="1">
+              <a:schemeClr val="accent1"/>
+            </a:fillRef>
+            <a:effectRef idx="0">
+              <a:schemeClr val="accent1"/>
+            </a:effectRef>
+            <a:fontRef idx="minor">
+              <a:schemeClr val="lt1"/>
+            </a:fontRef>
+          </p:style>
+          <p:txBody>
+            <a:bodyPr rtlCol="0" anchor="ctr"/>
+            <a:lstStyle/>
+            <a:p>
+              <a:pPr algn="ctr"/>
+              <a:endParaRPr lang="en-US"/>
+            </a:p>
+          </p:txBody>
+        </p:sp>
+      </p:grpSp>
+      <p:grpSp>
+        <p:nvGrpSpPr>
+          <p:cNvPr id="66" name="Group 65">
+            <a:extLst>
+              <a:ext uri="{FF2B5EF4-FFF2-40B4-BE49-F238E27FC236}">
+                <a16:creationId xmlns:a16="http://schemas.microsoft.com/office/drawing/2014/main" id="{795332A3-1493-18A9-F781-6ACC7C7434BD}"/>
+              </a:ext>
+            </a:extLst>
+          </p:cNvPr>
+          <p:cNvGrpSpPr/>
+          <p:nvPr/>
+        </p:nvGrpSpPr>
+        <p:grpSpPr>
+          <a:xfrm>
+            <a:off x="6342993" y="1587065"/>
+            <a:ext cx="3962400" cy="2627586"/>
+            <a:chOff x="6342993" y="1587065"/>
+            <a:chExt cx="3962400" cy="2627586"/>
+          </a:xfrm>
+        </p:grpSpPr>
+        <p:cxnSp>
+          <p:nvCxnSpPr>
+            <p:cNvPr id="22" name="Straight Connector 21">
+              <a:extLst>
+                <a:ext uri="{FF2B5EF4-FFF2-40B4-BE49-F238E27FC236}">
+                  <a16:creationId xmlns:a16="http://schemas.microsoft.com/office/drawing/2014/main" id="{2852498D-322D-3BCF-DA18-6353377699B4}"/>
+                </a:ext>
+              </a:extLst>
+            </p:cNvPr>
+            <p:cNvCxnSpPr>
+              <a:cxnSpLocks/>
+            </p:cNvCxnSpPr>
+            <p:nvPr/>
+          </p:nvCxnSpPr>
+          <p:spPr>
+            <a:xfrm>
+              <a:off x="6342993" y="4193631"/>
+              <a:ext cx="3962400" cy="0"/>
+            </a:xfrm>
+            <a:prstGeom prst="line">
+              <a:avLst/>
+            </a:prstGeom>
+            <a:ln w="76200"/>
+          </p:spPr>
+          <p:style>
+            <a:lnRef idx="2">
+              <a:schemeClr val="dk1"/>
+            </a:lnRef>
+            <a:fillRef idx="0">
+              <a:schemeClr val="dk1"/>
+            </a:fillRef>
+            <a:effectRef idx="1">
+              <a:schemeClr val="dk1"/>
+            </a:effectRef>
+            <a:fontRef idx="minor">
+              <a:schemeClr val="tx1"/>
+            </a:fontRef>
+          </p:style>
+        </p:cxnSp>
+        <p:cxnSp>
+          <p:nvCxnSpPr>
+            <p:cNvPr id="23" name="Straight Connector 22">
+              <a:extLst>
+                <a:ext uri="{FF2B5EF4-FFF2-40B4-BE49-F238E27FC236}">
+                  <a16:creationId xmlns:a16="http://schemas.microsoft.com/office/drawing/2014/main" id="{13EE72AF-88D6-496E-FEEC-2A6EEC3B563D}"/>
+                </a:ext>
+              </a:extLst>
+            </p:cNvPr>
+            <p:cNvCxnSpPr>
+              <a:cxnSpLocks/>
+            </p:cNvCxnSpPr>
+            <p:nvPr/>
+          </p:nvCxnSpPr>
+          <p:spPr>
+            <a:xfrm flipV="1">
+              <a:off x="6384460" y="1587065"/>
+              <a:ext cx="0" cy="2627586"/>
+            </a:xfrm>
+            <a:prstGeom prst="line">
+              <a:avLst/>
+            </a:prstGeom>
+            <a:ln w="76200"/>
+          </p:spPr>
+          <p:style>
+            <a:lnRef idx="2">
+              <a:schemeClr val="dk1"/>
+            </a:lnRef>
+            <a:fillRef idx="0">
+              <a:schemeClr val="dk1"/>
+            </a:fillRef>
+            <a:effectRef idx="1">
+              <a:schemeClr val="dk1"/>
+            </a:effectRef>
+            <a:fontRef idx="minor">
+              <a:schemeClr val="tx1"/>
+            </a:fontRef>
+          </p:style>
+        </p:cxnSp>
+        <p:grpSp>
+          <p:nvGrpSpPr>
+            <p:cNvPr id="48" name="Group 47">
+              <a:extLst>
+                <a:ext uri="{FF2B5EF4-FFF2-40B4-BE49-F238E27FC236}">
+                  <a16:creationId xmlns:a16="http://schemas.microsoft.com/office/drawing/2014/main" id="{306D8601-6F56-45F9-209A-D0B63F0385E3}"/>
+                </a:ext>
+              </a:extLst>
+            </p:cNvPr>
+            <p:cNvGrpSpPr/>
+            <p:nvPr/>
+          </p:nvGrpSpPr>
+          <p:grpSpPr>
+            <a:xfrm>
+              <a:off x="7056336" y="1692166"/>
+              <a:ext cx="202416" cy="1736834"/>
+              <a:chOff x="7062952" y="1608083"/>
+              <a:chExt cx="202416" cy="1736834"/>
+            </a:xfrm>
+          </p:grpSpPr>
+          <p:cxnSp>
+            <p:nvCxnSpPr>
+              <p:cNvPr id="32" name="Straight Connector 31">
+                <a:extLst>
+                  <a:ext uri="{FF2B5EF4-FFF2-40B4-BE49-F238E27FC236}">
+                    <a16:creationId xmlns:a16="http://schemas.microsoft.com/office/drawing/2014/main" id="{5B21F6A2-2EC2-B70F-A7AF-8B6FAD6C1C85}"/>
+                  </a:ext>
+                </a:extLst>
+              </p:cNvPr>
+              <p:cNvCxnSpPr/>
+              <p:nvPr/>
+            </p:nvCxnSpPr>
+            <p:spPr>
+              <a:xfrm flipV="1">
+                <a:off x="7157545" y="1608083"/>
+                <a:ext cx="0" cy="1736834"/>
+              </a:xfrm>
+              <a:prstGeom prst="line">
+                <a:avLst/>
+              </a:prstGeom>
+              <a:ln w="28575"/>
+            </p:spPr>
+            <p:style>
+              <a:lnRef idx="2">
+                <a:schemeClr val="dk1"/>
+              </a:lnRef>
+              <a:fillRef idx="0">
+                <a:schemeClr val="dk1"/>
+              </a:fillRef>
+              <a:effectRef idx="1">
+                <a:schemeClr val="dk1"/>
+              </a:effectRef>
+              <a:fontRef idx="minor">
+                <a:schemeClr val="tx1"/>
+              </a:fontRef>
+            </p:style>
+          </p:cxnSp>
+          <p:cxnSp>
+            <p:nvCxnSpPr>
+              <p:cNvPr id="34" name="Straight Connector 33">
+                <a:extLst>
+                  <a:ext uri="{FF2B5EF4-FFF2-40B4-BE49-F238E27FC236}">
+                    <a16:creationId xmlns:a16="http://schemas.microsoft.com/office/drawing/2014/main" id="{C6994D5A-2B21-F347-4390-D3DAF9FAC861}"/>
+                  </a:ext>
+                </a:extLst>
+              </p:cNvPr>
+              <p:cNvCxnSpPr/>
+              <p:nvPr/>
+            </p:nvCxnSpPr>
+            <p:spPr>
+              <a:xfrm>
+                <a:off x="7062952" y="1608085"/>
+                <a:ext cx="199697" cy="0"/>
+              </a:xfrm>
+              <a:prstGeom prst="line">
+                <a:avLst/>
+              </a:prstGeom>
+              <a:ln w="28575"/>
+            </p:spPr>
+            <p:style>
+              <a:lnRef idx="2">
+                <a:schemeClr val="dk1"/>
+              </a:lnRef>
+              <a:fillRef idx="0">
+                <a:schemeClr val="dk1"/>
+              </a:fillRef>
+              <a:effectRef idx="1">
+                <a:schemeClr val="dk1"/>
+              </a:effectRef>
+              <a:fontRef idx="minor">
+                <a:schemeClr val="tx1"/>
+              </a:fontRef>
+            </p:style>
+          </p:cxnSp>
+          <p:cxnSp>
+            <p:nvCxnSpPr>
+              <p:cNvPr id="35" name="Straight Connector 34">
+                <a:extLst>
+                  <a:ext uri="{FF2B5EF4-FFF2-40B4-BE49-F238E27FC236}">
+                    <a16:creationId xmlns:a16="http://schemas.microsoft.com/office/drawing/2014/main" id="{B5646FB1-A4DD-B566-C304-CF0F1637B53F}"/>
+                  </a:ext>
+                </a:extLst>
+              </p:cNvPr>
+              <p:cNvCxnSpPr>
+                <a:cxnSpLocks/>
+              </p:cNvCxnSpPr>
+              <p:nvPr/>
+            </p:nvCxnSpPr>
+            <p:spPr>
+              <a:xfrm>
+                <a:off x="7065671" y="3344917"/>
+                <a:ext cx="199697" cy="0"/>
+              </a:xfrm>
+              <a:prstGeom prst="line">
+                <a:avLst/>
+              </a:prstGeom>
+              <a:ln w="28575"/>
+            </p:spPr>
+            <p:style>
+              <a:lnRef idx="2">
+                <a:schemeClr val="dk1"/>
+              </a:lnRef>
+              <a:fillRef idx="0">
+                <a:schemeClr val="dk1"/>
+              </a:fillRef>
+              <a:effectRef idx="1">
+                <a:schemeClr val="dk1"/>
+              </a:effectRef>
+              <a:fontRef idx="minor">
+                <a:schemeClr val="tx1"/>
+              </a:fontRef>
+            </p:style>
+          </p:cxnSp>
+        </p:grpSp>
+        <p:grpSp>
+          <p:nvGrpSpPr>
+            <p:cNvPr id="49" name="Group 48">
+              <a:extLst>
+                <a:ext uri="{FF2B5EF4-FFF2-40B4-BE49-F238E27FC236}">
+                  <a16:creationId xmlns:a16="http://schemas.microsoft.com/office/drawing/2014/main" id="{3E34C6AA-13F3-B0BC-CA26-4B26841429ED}"/>
+                </a:ext>
+              </a:extLst>
+            </p:cNvPr>
+            <p:cNvGrpSpPr/>
+            <p:nvPr/>
+          </p:nvGrpSpPr>
+          <p:grpSpPr>
+            <a:xfrm>
+              <a:off x="6982811" y="2031783"/>
+              <a:ext cx="349467" cy="798785"/>
+              <a:chOff x="6993321" y="2005510"/>
+              <a:chExt cx="349467" cy="798785"/>
+            </a:xfrm>
+          </p:grpSpPr>
+          <p:sp>
+            <p:nvSpPr>
+              <p:cNvPr id="50" name="Rounded Rectangle 49">
+                <a:extLst>
+                  <a:ext uri="{FF2B5EF4-FFF2-40B4-BE49-F238E27FC236}">
+                    <a16:creationId xmlns:a16="http://schemas.microsoft.com/office/drawing/2014/main" id="{4CE2DEE0-89FC-1911-AFD8-54EFD0530B73}"/>
+                  </a:ext>
+                </a:extLst>
+              </p:cNvPr>
+              <p:cNvSpPr/>
+              <p:nvPr/>
+            </p:nvSpPr>
+            <p:spPr>
+              <a:xfrm>
+                <a:off x="6993321" y="2005510"/>
+                <a:ext cx="349467" cy="798785"/>
+              </a:xfrm>
+              <a:prstGeom prst="roundRect">
+                <a:avLst>
+                  <a:gd name="adj" fmla="val 6251"/>
+                </a:avLst>
+              </a:prstGeom>
+              <a:solidFill>
+                <a:schemeClr val="tx2">
+                  <a:lumMod val="50000"/>
+                  <a:lumOff val="50000"/>
+                </a:schemeClr>
+              </a:solidFill>
+            </p:spPr>
+            <p:style>
+              <a:lnRef idx="2">
+                <a:schemeClr val="accent1">
+                  <a:shade val="15000"/>
+                </a:schemeClr>
+              </a:lnRef>
+              <a:fillRef idx="1">
+                <a:schemeClr val="accent1"/>
+              </a:fillRef>
+              <a:effectRef idx="0">
+                <a:schemeClr val="accent1"/>
+              </a:effectRef>
+              <a:fontRef idx="minor">
+                <a:schemeClr val="lt1"/>
+              </a:fontRef>
+            </p:style>
+            <p:txBody>
+              <a:bodyPr rtlCol="0" anchor="ctr"/>
+              <a:lstStyle/>
+              <a:p>
+                <a:pPr algn="ctr"/>
+                <a:endParaRPr lang="en-US"/>
+              </a:p>
+            </p:txBody>
+          </p:sp>
+          <p:cxnSp>
+            <p:nvCxnSpPr>
+              <p:cNvPr id="51" name="Straight Connector 50">
+                <a:extLst>
+                  <a:ext uri="{FF2B5EF4-FFF2-40B4-BE49-F238E27FC236}">
+                    <a16:creationId xmlns:a16="http://schemas.microsoft.com/office/drawing/2014/main" id="{9258C939-3600-1DDC-F461-548876A86B27}"/>
+                  </a:ext>
+                </a:extLst>
+              </p:cNvPr>
+              <p:cNvCxnSpPr>
+                <a:cxnSpLocks/>
+              </p:cNvCxnSpPr>
+              <p:nvPr/>
+            </p:nvCxnSpPr>
+            <p:spPr>
+              <a:xfrm>
+                <a:off x="7004581" y="2336499"/>
+                <a:ext cx="338207" cy="0"/>
+              </a:xfrm>
+              <a:prstGeom prst="line">
+                <a:avLst/>
+              </a:prstGeom>
+              <a:ln w="19050"/>
+            </p:spPr>
+            <p:style>
+              <a:lnRef idx="2">
+                <a:schemeClr val="dk1"/>
+              </a:lnRef>
+              <a:fillRef idx="0">
+                <a:schemeClr val="dk1"/>
+              </a:fillRef>
+              <a:effectRef idx="1">
+                <a:schemeClr val="dk1"/>
+              </a:effectRef>
+              <a:fontRef idx="minor">
+                <a:schemeClr val="tx1"/>
+              </a:fontRef>
+            </p:style>
+          </p:cxnSp>
+        </p:grpSp>
+        <p:grpSp>
+          <p:nvGrpSpPr>
+            <p:cNvPr id="52" name="Group 51">
+              <a:extLst>
+                <a:ext uri="{FF2B5EF4-FFF2-40B4-BE49-F238E27FC236}">
+                  <a16:creationId xmlns:a16="http://schemas.microsoft.com/office/drawing/2014/main" id="{C9ACE705-C45D-A2B7-8284-244A39C7C6FD}"/>
+                </a:ext>
+              </a:extLst>
+            </p:cNvPr>
+            <p:cNvGrpSpPr/>
+            <p:nvPr/>
+          </p:nvGrpSpPr>
+          <p:grpSpPr>
+            <a:xfrm>
+              <a:off x="7906807" y="2178950"/>
+              <a:ext cx="202416" cy="1392528"/>
+              <a:chOff x="7062952" y="1608083"/>
+              <a:chExt cx="202416" cy="1736834"/>
+            </a:xfrm>
+          </p:grpSpPr>
+          <p:cxnSp>
+            <p:nvCxnSpPr>
+              <p:cNvPr id="53" name="Straight Connector 52">
+                <a:extLst>
+                  <a:ext uri="{FF2B5EF4-FFF2-40B4-BE49-F238E27FC236}">
+                    <a16:creationId xmlns:a16="http://schemas.microsoft.com/office/drawing/2014/main" id="{3785D45E-A83A-9DEA-4E8B-C0B05DEF622D}"/>
+                  </a:ext>
+                </a:extLst>
+              </p:cNvPr>
+              <p:cNvCxnSpPr/>
+              <p:nvPr/>
+            </p:nvCxnSpPr>
+            <p:spPr>
+              <a:xfrm flipV="1">
+                <a:off x="7157545" y="1608083"/>
+                <a:ext cx="0" cy="1736834"/>
+              </a:xfrm>
+              <a:prstGeom prst="line">
+                <a:avLst/>
+              </a:prstGeom>
+              <a:ln w="28575"/>
+            </p:spPr>
+            <p:style>
+              <a:lnRef idx="2">
+                <a:schemeClr val="dk1"/>
+              </a:lnRef>
+              <a:fillRef idx="0">
+                <a:schemeClr val="dk1"/>
+              </a:fillRef>
+              <a:effectRef idx="1">
+                <a:schemeClr val="dk1"/>
+              </a:effectRef>
+              <a:fontRef idx="minor">
+                <a:schemeClr val="tx1"/>
+              </a:fontRef>
+            </p:style>
+          </p:cxnSp>
+          <p:cxnSp>
+            <p:nvCxnSpPr>
+              <p:cNvPr id="54" name="Straight Connector 53">
+                <a:extLst>
+                  <a:ext uri="{FF2B5EF4-FFF2-40B4-BE49-F238E27FC236}">
+                    <a16:creationId xmlns:a16="http://schemas.microsoft.com/office/drawing/2014/main" id="{4533E778-EEC8-8F0E-FC34-8247CEB8F322}"/>
+                  </a:ext>
+                </a:extLst>
+              </p:cNvPr>
+              <p:cNvCxnSpPr/>
+              <p:nvPr/>
+            </p:nvCxnSpPr>
+            <p:spPr>
+              <a:xfrm>
+                <a:off x="7062952" y="1608085"/>
+                <a:ext cx="199697" cy="0"/>
+              </a:xfrm>
+              <a:prstGeom prst="line">
+                <a:avLst/>
+              </a:prstGeom>
+              <a:ln w="28575"/>
+            </p:spPr>
+            <p:style>
+              <a:lnRef idx="2">
+                <a:schemeClr val="dk1"/>
+              </a:lnRef>
+              <a:fillRef idx="0">
+                <a:schemeClr val="dk1"/>
+              </a:fillRef>
+              <a:effectRef idx="1">
+                <a:schemeClr val="dk1"/>
+              </a:effectRef>
+              <a:fontRef idx="minor">
+                <a:schemeClr val="tx1"/>
+              </a:fontRef>
+            </p:style>
+          </p:cxnSp>
+          <p:cxnSp>
+            <p:nvCxnSpPr>
+              <p:cNvPr id="55" name="Straight Connector 54">
+                <a:extLst>
+                  <a:ext uri="{FF2B5EF4-FFF2-40B4-BE49-F238E27FC236}">
+                    <a16:creationId xmlns:a16="http://schemas.microsoft.com/office/drawing/2014/main" id="{4D108039-B1E4-E79E-8BED-714BFE0BE239}"/>
+                  </a:ext>
+                </a:extLst>
+              </p:cNvPr>
+              <p:cNvCxnSpPr>
+                <a:cxnSpLocks/>
+              </p:cNvCxnSpPr>
+              <p:nvPr/>
+            </p:nvCxnSpPr>
+            <p:spPr>
+              <a:xfrm>
+                <a:off x="7065671" y="3344917"/>
+                <a:ext cx="199697" cy="0"/>
+              </a:xfrm>
+              <a:prstGeom prst="line">
+                <a:avLst/>
+              </a:prstGeom>
+              <a:ln w="28575"/>
+            </p:spPr>
+            <p:style>
+              <a:lnRef idx="2">
+                <a:schemeClr val="dk1"/>
+              </a:lnRef>
+              <a:fillRef idx="0">
+                <a:schemeClr val="dk1"/>
+              </a:fillRef>
+              <a:effectRef idx="1">
+                <a:schemeClr val="dk1"/>
+              </a:effectRef>
+              <a:fontRef idx="minor">
+                <a:schemeClr val="tx1"/>
+              </a:fontRef>
+            </p:style>
+          </p:cxnSp>
+        </p:grpSp>
+        <p:grpSp>
+          <p:nvGrpSpPr>
+            <p:cNvPr id="56" name="Group 55">
+              <a:extLst>
+                <a:ext uri="{FF2B5EF4-FFF2-40B4-BE49-F238E27FC236}">
+                  <a16:creationId xmlns:a16="http://schemas.microsoft.com/office/drawing/2014/main" id="{66FA9D88-64DB-C5A3-FAAE-2FADC71ECEDA}"/>
+                </a:ext>
+              </a:extLst>
+            </p:cNvPr>
+            <p:cNvGrpSpPr/>
+            <p:nvPr/>
+          </p:nvGrpSpPr>
+          <p:grpSpPr>
+            <a:xfrm>
+              <a:off x="8702102" y="1799380"/>
+              <a:ext cx="202416" cy="1392528"/>
+              <a:chOff x="7062952" y="1608083"/>
+              <a:chExt cx="202416" cy="1736834"/>
+            </a:xfrm>
+          </p:grpSpPr>
+          <p:cxnSp>
+            <p:nvCxnSpPr>
+              <p:cNvPr id="57" name="Straight Connector 56">
+                <a:extLst>
+                  <a:ext uri="{FF2B5EF4-FFF2-40B4-BE49-F238E27FC236}">
+                    <a16:creationId xmlns:a16="http://schemas.microsoft.com/office/drawing/2014/main" id="{CE4B3DDF-C536-F458-CBEE-959F67CD1BFF}"/>
+                  </a:ext>
+                </a:extLst>
+              </p:cNvPr>
+              <p:cNvCxnSpPr/>
+              <p:nvPr/>
+            </p:nvCxnSpPr>
+            <p:spPr>
+              <a:xfrm flipV="1">
+                <a:off x="7157545" y="1608083"/>
+                <a:ext cx="0" cy="1736834"/>
+              </a:xfrm>
+              <a:prstGeom prst="line">
+                <a:avLst/>
+              </a:prstGeom>
+              <a:ln w="28575"/>
+            </p:spPr>
+            <p:style>
+              <a:lnRef idx="2">
+                <a:schemeClr val="dk1"/>
+              </a:lnRef>
+              <a:fillRef idx="0">
+                <a:schemeClr val="dk1"/>
+              </a:fillRef>
+              <a:effectRef idx="1">
+                <a:schemeClr val="dk1"/>
+              </a:effectRef>
+              <a:fontRef idx="minor">
+                <a:schemeClr val="tx1"/>
+              </a:fontRef>
+            </p:style>
+          </p:cxnSp>
+          <p:cxnSp>
+            <p:nvCxnSpPr>
+              <p:cNvPr id="58" name="Straight Connector 57">
+                <a:extLst>
+                  <a:ext uri="{FF2B5EF4-FFF2-40B4-BE49-F238E27FC236}">
+                    <a16:creationId xmlns:a16="http://schemas.microsoft.com/office/drawing/2014/main" id="{A532C2C7-115A-3C22-2E0E-41209D8E1D79}"/>
+                  </a:ext>
+                </a:extLst>
+              </p:cNvPr>
+              <p:cNvCxnSpPr/>
+              <p:nvPr/>
+            </p:nvCxnSpPr>
+            <p:spPr>
+              <a:xfrm>
+                <a:off x="7062952" y="1608085"/>
+                <a:ext cx="199697" cy="0"/>
+              </a:xfrm>
+              <a:prstGeom prst="line">
+                <a:avLst/>
+              </a:prstGeom>
+              <a:ln w="28575"/>
+            </p:spPr>
+            <p:style>
+              <a:lnRef idx="2">
+                <a:schemeClr val="dk1"/>
+              </a:lnRef>
+              <a:fillRef idx="0">
+                <a:schemeClr val="dk1"/>
+              </a:fillRef>
+              <a:effectRef idx="1">
+                <a:schemeClr val="dk1"/>
+              </a:effectRef>
+              <a:fontRef idx="minor">
+                <a:schemeClr val="tx1"/>
+              </a:fontRef>
+            </p:style>
+          </p:cxnSp>
+          <p:cxnSp>
+            <p:nvCxnSpPr>
+              <p:cNvPr id="59" name="Straight Connector 58">
+                <a:extLst>
+                  <a:ext uri="{FF2B5EF4-FFF2-40B4-BE49-F238E27FC236}">
+                    <a16:creationId xmlns:a16="http://schemas.microsoft.com/office/drawing/2014/main" id="{74B45F46-3EFF-F23A-28C8-B8CAABEF7EDF}"/>
+                  </a:ext>
+                </a:extLst>
+              </p:cNvPr>
+              <p:cNvCxnSpPr>
+                <a:cxnSpLocks/>
+              </p:cNvCxnSpPr>
+              <p:nvPr/>
+            </p:nvCxnSpPr>
+            <p:spPr>
+              <a:xfrm>
+                <a:off x="7065671" y="3344917"/>
+                <a:ext cx="199697" cy="0"/>
+              </a:xfrm>
+              <a:prstGeom prst="line">
+                <a:avLst/>
+              </a:prstGeom>
+              <a:ln w="28575"/>
+            </p:spPr>
+            <p:style>
+              <a:lnRef idx="2">
+                <a:schemeClr val="dk1"/>
+              </a:lnRef>
+              <a:fillRef idx="0">
+                <a:schemeClr val="dk1"/>
+              </a:fillRef>
+              <a:effectRef idx="1">
+                <a:schemeClr val="dk1"/>
+              </a:effectRef>
+              <a:fontRef idx="minor">
+                <a:schemeClr val="tx1"/>
+              </a:fontRef>
+            </p:style>
+          </p:cxnSp>
+        </p:grpSp>
+        <p:grpSp>
+          <p:nvGrpSpPr>
+            <p:cNvPr id="45" name="Group 44">
+              <a:extLst>
+                <a:ext uri="{FF2B5EF4-FFF2-40B4-BE49-F238E27FC236}">
+                  <a16:creationId xmlns:a16="http://schemas.microsoft.com/office/drawing/2014/main" id="{13318374-A3B2-5206-649A-518989F4173E}"/>
+                </a:ext>
+              </a:extLst>
+            </p:cNvPr>
+            <p:cNvGrpSpPr/>
+            <p:nvPr/>
+          </p:nvGrpSpPr>
+          <p:grpSpPr>
+            <a:xfrm>
+              <a:off x="8621962" y="2003532"/>
+              <a:ext cx="349466" cy="918344"/>
+              <a:chOff x="8609092" y="1990580"/>
+              <a:chExt cx="349466" cy="918344"/>
+            </a:xfrm>
+          </p:grpSpPr>
+          <p:sp>
+            <p:nvSpPr>
+              <p:cNvPr id="29" name="Rounded Rectangle 28">
+                <a:extLst>
+                  <a:ext uri="{FF2B5EF4-FFF2-40B4-BE49-F238E27FC236}">
+                    <a16:creationId xmlns:a16="http://schemas.microsoft.com/office/drawing/2014/main" id="{61E7D8B9-F0E4-F65F-5B21-A3FFA352409E}"/>
+                  </a:ext>
+                </a:extLst>
+              </p:cNvPr>
+              <p:cNvSpPr/>
+              <p:nvPr/>
+            </p:nvSpPr>
+            <p:spPr>
+              <a:xfrm>
+                <a:off x="8609092" y="1990580"/>
+                <a:ext cx="349466" cy="918344"/>
+              </a:xfrm>
+              <a:prstGeom prst="roundRect">
+                <a:avLst>
+                  <a:gd name="adj" fmla="val 6251"/>
+                </a:avLst>
+              </a:prstGeom>
+              <a:solidFill>
+                <a:schemeClr val="accent3">
+                  <a:lumMod val="60000"/>
+                  <a:lumOff val="40000"/>
+                </a:schemeClr>
+              </a:solidFill>
+            </p:spPr>
+            <p:style>
+              <a:lnRef idx="2">
+                <a:schemeClr val="accent1">
+                  <a:shade val="15000"/>
+                </a:schemeClr>
+              </a:lnRef>
+              <a:fillRef idx="1">
+                <a:schemeClr val="accent1"/>
+              </a:fillRef>
+              <a:effectRef idx="0">
+                <a:schemeClr val="accent1"/>
+              </a:effectRef>
+              <a:fontRef idx="minor">
+                <a:schemeClr val="lt1"/>
+              </a:fontRef>
+            </p:style>
+            <p:txBody>
+              <a:bodyPr rtlCol="0" anchor="ctr"/>
+              <a:lstStyle/>
+              <a:p>
+                <a:pPr algn="ctr"/>
+                <a:endParaRPr lang="en-US"/>
+              </a:p>
+            </p:txBody>
+          </p:sp>
+          <p:cxnSp>
+            <p:nvCxnSpPr>
+              <p:cNvPr id="42" name="Straight Connector 41">
+                <a:extLst>
+                  <a:ext uri="{FF2B5EF4-FFF2-40B4-BE49-F238E27FC236}">
+                    <a16:creationId xmlns:a16="http://schemas.microsoft.com/office/drawing/2014/main" id="{588693CD-53EC-8245-C243-2DA09A41B58F}"/>
+                  </a:ext>
+                </a:extLst>
+              </p:cNvPr>
+              <p:cNvCxnSpPr>
+                <a:cxnSpLocks/>
+              </p:cNvCxnSpPr>
+              <p:nvPr/>
+            </p:nvCxnSpPr>
+            <p:spPr>
+              <a:xfrm>
+                <a:off x="8609092" y="2352927"/>
+                <a:ext cx="338207" cy="0"/>
+              </a:xfrm>
+              <a:prstGeom prst="line">
+                <a:avLst/>
+              </a:prstGeom>
+              <a:ln w="19050"/>
+            </p:spPr>
+            <p:style>
+              <a:lnRef idx="2">
+                <a:schemeClr val="dk1"/>
+              </a:lnRef>
+              <a:fillRef idx="0">
+                <a:schemeClr val="dk1"/>
+              </a:fillRef>
+              <a:effectRef idx="1">
+                <a:schemeClr val="dk1"/>
+              </a:effectRef>
+              <a:fontRef idx="minor">
+                <a:schemeClr val="tx1"/>
+              </a:fontRef>
+            </p:style>
+          </p:cxnSp>
+        </p:grpSp>
+        <p:grpSp>
+          <p:nvGrpSpPr>
+            <p:cNvPr id="46" name="Group 45">
+              <a:extLst>
+                <a:ext uri="{FF2B5EF4-FFF2-40B4-BE49-F238E27FC236}">
+                  <a16:creationId xmlns:a16="http://schemas.microsoft.com/office/drawing/2014/main" id="{DC6542A5-B23F-FEEC-59F2-A5B8B1E9C2CA}"/>
+                </a:ext>
+              </a:extLst>
+            </p:cNvPr>
+            <p:cNvGrpSpPr/>
+            <p:nvPr/>
+          </p:nvGrpSpPr>
+          <p:grpSpPr>
+            <a:xfrm>
+              <a:off x="7819187" y="2463902"/>
+              <a:ext cx="349654" cy="918344"/>
+              <a:chOff x="7790609" y="2391758"/>
+              <a:chExt cx="349654" cy="918344"/>
+            </a:xfrm>
+          </p:grpSpPr>
+          <p:cxnSp>
+            <p:nvCxnSpPr>
+              <p:cNvPr id="41" name="Straight Connector 40">
+                <a:extLst>
+                  <a:ext uri="{FF2B5EF4-FFF2-40B4-BE49-F238E27FC236}">
+                    <a16:creationId xmlns:a16="http://schemas.microsoft.com/office/drawing/2014/main" id="{A71BAC99-8A8F-AC4B-C621-188D7128DCE7}"/>
+                  </a:ext>
+                </a:extLst>
+              </p:cNvPr>
+              <p:cNvCxnSpPr>
+                <a:cxnSpLocks/>
+              </p:cNvCxnSpPr>
+              <p:nvPr/>
+            </p:nvCxnSpPr>
+            <p:spPr>
+              <a:xfrm>
+                <a:off x="7790609" y="2874492"/>
+                <a:ext cx="338207" cy="0"/>
+              </a:xfrm>
+              <a:prstGeom prst="line">
+                <a:avLst/>
+              </a:prstGeom>
+              <a:ln w="19050"/>
+            </p:spPr>
+            <p:style>
+              <a:lnRef idx="2">
+                <a:schemeClr val="dk1"/>
+              </a:lnRef>
+              <a:fillRef idx="0">
+                <a:schemeClr val="dk1"/>
+              </a:fillRef>
+              <a:effectRef idx="1">
+                <a:schemeClr val="dk1"/>
+              </a:effectRef>
+              <a:fontRef idx="minor">
+                <a:schemeClr val="tx1"/>
+              </a:fontRef>
+            </p:style>
+          </p:cxnSp>
+          <p:sp>
+            <p:nvSpPr>
+              <p:cNvPr id="28" name="Rounded Rectangle 27">
+                <a:extLst>
+                  <a:ext uri="{FF2B5EF4-FFF2-40B4-BE49-F238E27FC236}">
+                    <a16:creationId xmlns:a16="http://schemas.microsoft.com/office/drawing/2014/main" id="{4B0FBBA1-00BF-8C2B-304B-2E81F3808133}"/>
+                  </a:ext>
+                </a:extLst>
+              </p:cNvPr>
+              <p:cNvSpPr/>
+              <p:nvPr/>
+            </p:nvSpPr>
+            <p:spPr>
+              <a:xfrm>
+                <a:off x="7790797" y="2391758"/>
+                <a:ext cx="349466" cy="918344"/>
+              </a:xfrm>
+              <a:prstGeom prst="roundRect">
+                <a:avLst>
+                  <a:gd name="adj" fmla="val 6251"/>
+                </a:avLst>
+              </a:prstGeom>
+              <a:solidFill>
+                <a:schemeClr val="accent5">
+                  <a:lumMod val="60000"/>
+                  <a:lumOff val="40000"/>
+                </a:schemeClr>
+              </a:solidFill>
+            </p:spPr>
+            <p:style>
+              <a:lnRef idx="2">
+                <a:schemeClr val="accent1">
+                  <a:shade val="15000"/>
+                </a:schemeClr>
+              </a:lnRef>
+              <a:fillRef idx="1">
+                <a:schemeClr val="accent1"/>
+              </a:fillRef>
+              <a:effectRef idx="0">
+                <a:schemeClr val="accent1"/>
+              </a:effectRef>
+              <a:fontRef idx="minor">
+                <a:schemeClr val="lt1"/>
+              </a:fontRef>
+            </p:style>
+            <p:txBody>
+              <a:bodyPr rtlCol="0" anchor="ctr"/>
+              <a:lstStyle/>
+              <a:p>
+                <a:pPr algn="ctr"/>
+                <a:endParaRPr lang="en-US"/>
+              </a:p>
+            </p:txBody>
+          </p:sp>
+        </p:grpSp>
+        <p:cxnSp>
+          <p:nvCxnSpPr>
+            <p:cNvPr id="60" name="Straight Connector 59">
+              <a:extLst>
+                <a:ext uri="{FF2B5EF4-FFF2-40B4-BE49-F238E27FC236}">
+                  <a16:creationId xmlns:a16="http://schemas.microsoft.com/office/drawing/2014/main" id="{2295CAA5-43FB-58FD-4C10-D334D064808B}"/>
+                </a:ext>
+              </a:extLst>
+            </p:cNvPr>
+            <p:cNvCxnSpPr>
+              <a:cxnSpLocks/>
+            </p:cNvCxnSpPr>
+            <p:nvPr/>
+          </p:nvCxnSpPr>
+          <p:spPr>
+            <a:xfrm>
+              <a:off x="7819187" y="2904620"/>
+              <a:ext cx="338207" cy="0"/>
+            </a:xfrm>
+            <a:prstGeom prst="line">
+              <a:avLst/>
+            </a:prstGeom>
+            <a:ln w="19050"/>
+          </p:spPr>
+          <p:style>
+            <a:lnRef idx="2">
+              <a:schemeClr val="dk1"/>
+            </a:lnRef>
+            <a:fillRef idx="0">
+              <a:schemeClr val="dk1"/>
+            </a:fillRef>
+            <a:effectRef idx="1">
+              <a:schemeClr val="dk1"/>
+            </a:effectRef>
+            <a:fontRef idx="minor">
+              <a:schemeClr val="tx1"/>
+            </a:fontRef>
+          </p:style>
+        </p:cxnSp>
+        <p:grpSp>
+          <p:nvGrpSpPr>
+            <p:cNvPr id="61" name="Group 60">
+              <a:extLst>
+                <a:ext uri="{FF2B5EF4-FFF2-40B4-BE49-F238E27FC236}">
+                  <a16:creationId xmlns:a16="http://schemas.microsoft.com/office/drawing/2014/main" id="{72ACDF41-98D2-08B3-87C8-9293A4CAD006}"/>
+                </a:ext>
+              </a:extLst>
+            </p:cNvPr>
+            <p:cNvGrpSpPr/>
+            <p:nvPr/>
+          </p:nvGrpSpPr>
+          <p:grpSpPr>
+            <a:xfrm>
+              <a:off x="9398907" y="2490027"/>
+              <a:ext cx="202416" cy="1392528"/>
+              <a:chOff x="7062952" y="1608084"/>
+              <a:chExt cx="202416" cy="1736834"/>
+            </a:xfrm>
+          </p:grpSpPr>
+          <p:cxnSp>
+            <p:nvCxnSpPr>
+              <p:cNvPr id="62" name="Straight Connector 61">
+                <a:extLst>
+                  <a:ext uri="{FF2B5EF4-FFF2-40B4-BE49-F238E27FC236}">
+                    <a16:creationId xmlns:a16="http://schemas.microsoft.com/office/drawing/2014/main" id="{C8665867-F708-A1D8-88B7-6F96E4ADD502}"/>
+                  </a:ext>
+                </a:extLst>
+              </p:cNvPr>
+              <p:cNvCxnSpPr/>
+              <p:nvPr/>
+            </p:nvCxnSpPr>
+            <p:spPr>
+              <a:xfrm flipV="1">
+                <a:off x="7157545" y="1608084"/>
+                <a:ext cx="0" cy="1736834"/>
+              </a:xfrm>
+              <a:prstGeom prst="line">
+                <a:avLst/>
+              </a:prstGeom>
+              <a:ln w="28575"/>
+            </p:spPr>
+            <p:style>
+              <a:lnRef idx="2">
+                <a:schemeClr val="dk1"/>
+              </a:lnRef>
+              <a:fillRef idx="0">
+                <a:schemeClr val="dk1"/>
+              </a:fillRef>
+              <a:effectRef idx="1">
+                <a:schemeClr val="dk1"/>
+              </a:effectRef>
+              <a:fontRef idx="minor">
+                <a:schemeClr val="tx1"/>
+              </a:fontRef>
+            </p:style>
+          </p:cxnSp>
+          <p:cxnSp>
+            <p:nvCxnSpPr>
+              <p:cNvPr id="63" name="Straight Connector 62">
+                <a:extLst>
+                  <a:ext uri="{FF2B5EF4-FFF2-40B4-BE49-F238E27FC236}">
+                    <a16:creationId xmlns:a16="http://schemas.microsoft.com/office/drawing/2014/main" id="{E6CD9331-601A-7F4F-4B1D-F142CAEDFFD4}"/>
+                  </a:ext>
+                </a:extLst>
+              </p:cNvPr>
+              <p:cNvCxnSpPr/>
+              <p:nvPr/>
+            </p:nvCxnSpPr>
+            <p:spPr>
+              <a:xfrm>
+                <a:off x="7062952" y="1608085"/>
+                <a:ext cx="199697" cy="0"/>
+              </a:xfrm>
+              <a:prstGeom prst="line">
+                <a:avLst/>
+              </a:prstGeom>
+              <a:ln w="28575"/>
+            </p:spPr>
+            <p:style>
+              <a:lnRef idx="2">
+                <a:schemeClr val="dk1"/>
+              </a:lnRef>
+              <a:fillRef idx="0">
+                <a:schemeClr val="dk1"/>
+              </a:fillRef>
+              <a:effectRef idx="1">
+                <a:schemeClr val="dk1"/>
+              </a:effectRef>
+              <a:fontRef idx="minor">
+                <a:schemeClr val="tx1"/>
+              </a:fontRef>
+            </p:style>
+          </p:cxnSp>
+          <p:cxnSp>
+            <p:nvCxnSpPr>
+              <p:cNvPr id="64" name="Straight Connector 63">
+                <a:extLst>
+                  <a:ext uri="{FF2B5EF4-FFF2-40B4-BE49-F238E27FC236}">
+                    <a16:creationId xmlns:a16="http://schemas.microsoft.com/office/drawing/2014/main" id="{A554F919-2DB4-D6BE-D6AA-EA883F9D04C4}"/>
+                  </a:ext>
+                </a:extLst>
+              </p:cNvPr>
+              <p:cNvCxnSpPr>
+                <a:cxnSpLocks/>
+              </p:cNvCxnSpPr>
+              <p:nvPr/>
+            </p:nvCxnSpPr>
+            <p:spPr>
+              <a:xfrm>
+                <a:off x="7065671" y="3344917"/>
+                <a:ext cx="199697" cy="0"/>
+              </a:xfrm>
+              <a:prstGeom prst="line">
+                <a:avLst/>
+              </a:prstGeom>
+              <a:ln w="28575"/>
+            </p:spPr>
+            <p:style>
+              <a:lnRef idx="2">
+                <a:schemeClr val="dk1"/>
+              </a:lnRef>
+              <a:fillRef idx="0">
+                <a:schemeClr val="dk1"/>
+              </a:fillRef>
+              <a:effectRef idx="1">
+                <a:schemeClr val="dk1"/>
+              </a:effectRef>
+              <a:fontRef idx="minor">
+                <a:schemeClr val="tx1"/>
+              </a:fontRef>
+            </p:style>
+          </p:cxnSp>
+        </p:grpSp>
+        <p:grpSp>
+          <p:nvGrpSpPr>
+            <p:cNvPr id="44" name="Group 43">
+              <a:extLst>
+                <a:ext uri="{FF2B5EF4-FFF2-40B4-BE49-F238E27FC236}">
+                  <a16:creationId xmlns:a16="http://schemas.microsoft.com/office/drawing/2014/main" id="{A0CE2009-16CB-E68C-CD45-832F90358EB1}"/>
+                </a:ext>
+              </a:extLst>
+            </p:cNvPr>
+            <p:cNvGrpSpPr/>
+            <p:nvPr/>
+          </p:nvGrpSpPr>
+          <p:grpSpPr>
+            <a:xfrm>
+              <a:off x="9325383" y="2627876"/>
+              <a:ext cx="349467" cy="918344"/>
+              <a:chOff x="9122981" y="2664369"/>
+              <a:chExt cx="349467" cy="918344"/>
+            </a:xfrm>
+          </p:grpSpPr>
+          <p:sp>
+            <p:nvSpPr>
+              <p:cNvPr id="30" name="Rounded Rectangle 29">
+                <a:extLst>
+                  <a:ext uri="{FF2B5EF4-FFF2-40B4-BE49-F238E27FC236}">
+                    <a16:creationId xmlns:a16="http://schemas.microsoft.com/office/drawing/2014/main" id="{50206EED-782B-F916-1A14-12E4C6573D7E}"/>
+                  </a:ext>
+                </a:extLst>
+              </p:cNvPr>
+              <p:cNvSpPr/>
+              <p:nvPr/>
+            </p:nvSpPr>
+            <p:spPr>
+              <a:xfrm>
+                <a:off x="9122981" y="2664369"/>
+                <a:ext cx="349467" cy="918344"/>
+              </a:xfrm>
+              <a:prstGeom prst="roundRect">
+                <a:avLst>
+                  <a:gd name="adj" fmla="val 6251"/>
+                </a:avLst>
+              </a:prstGeom>
+              <a:solidFill>
+                <a:schemeClr val="accent2">
+                  <a:lumMod val="75000"/>
+                </a:schemeClr>
+              </a:solidFill>
+            </p:spPr>
+            <p:style>
+              <a:lnRef idx="2">
+                <a:schemeClr val="accent1">
+                  <a:shade val="15000"/>
+                </a:schemeClr>
+              </a:lnRef>
+              <a:fillRef idx="1">
+                <a:schemeClr val="accent1"/>
+              </a:fillRef>
+              <a:effectRef idx="0">
+                <a:schemeClr val="accent1"/>
+              </a:effectRef>
+              <a:fontRef idx="minor">
+                <a:schemeClr val="lt1"/>
+              </a:fontRef>
+            </p:style>
+            <p:txBody>
+              <a:bodyPr rtlCol="0" anchor="ctr"/>
+              <a:lstStyle/>
+              <a:p>
+                <a:pPr algn="ctr"/>
+                <a:endParaRPr lang="en-US"/>
+              </a:p>
+            </p:txBody>
+          </p:sp>
+          <p:cxnSp>
+            <p:nvCxnSpPr>
+              <p:cNvPr id="43" name="Straight Connector 42">
+                <a:extLst>
+                  <a:ext uri="{FF2B5EF4-FFF2-40B4-BE49-F238E27FC236}">
+                    <a16:creationId xmlns:a16="http://schemas.microsoft.com/office/drawing/2014/main" id="{39884FF7-DFF6-4021-A393-842740D81128}"/>
+                  </a:ext>
+                </a:extLst>
+              </p:cNvPr>
+              <p:cNvCxnSpPr>
+                <a:cxnSpLocks/>
+              </p:cNvCxnSpPr>
+              <p:nvPr/>
+            </p:nvCxnSpPr>
+            <p:spPr>
+              <a:xfrm>
+                <a:off x="9128610" y="3126735"/>
+                <a:ext cx="338207" cy="0"/>
+              </a:xfrm>
+              <a:prstGeom prst="line">
+                <a:avLst/>
+              </a:prstGeom>
+              <a:ln w="19050"/>
+            </p:spPr>
+            <p:style>
+              <a:lnRef idx="2">
+                <a:schemeClr val="dk1"/>
+              </a:lnRef>
+              <a:fillRef idx="0">
+                <a:schemeClr val="dk1"/>
+              </a:fillRef>
+              <a:effectRef idx="1">
+                <a:schemeClr val="dk1"/>
+              </a:effectRef>
+              <a:fontRef idx="minor">
+                <a:schemeClr val="tx1"/>
+              </a:fontRef>
+            </p:style>
+          </p:cxnSp>
+        </p:grpSp>
+      </p:grpSp>
+    </p:spTree>
+    <p:extLst>
+      <p:ext uri="{BB962C8B-B14F-4D97-AF65-F5344CB8AC3E}">
+        <p14:creationId xmlns:p14="http://schemas.microsoft.com/office/powerpoint/2010/main" val="1158525925"/>
+      </p:ext>
+    </p:extLst>
+  </p:cSld>
+  <p:clrMapOvr>
+    <a:masterClrMapping/>
+  </p:clrMapOvr>
+</p:sld>
+</file>
+
+<file path=ppt/slides/slide3.xml><?xml version="1.0" encoding="utf-8"?>
+<p:sld xmlns:a="http://schemas.openxmlformats.org/drawingml/2006/main" xmlns:r="http://schemas.openxmlformats.org/officeDocument/2006/relationships" xmlns:p="http://schemas.openxmlformats.org/presentationml/2006/main">
+  <p:cSld>
+    <p:spTree>
+      <p:nvGrpSpPr>
+        <p:cNvPr id="1" name="">
+          <a:extLst>
+            <a:ext uri="{FF2B5EF4-FFF2-40B4-BE49-F238E27FC236}">
+              <a16:creationId xmlns:a16="http://schemas.microsoft.com/office/drawing/2014/main" id="{1205AE87-5BE7-AE49-C2AE-FD582CB95A05}"/>
+            </a:ext>
+          </a:extLst>
+        </p:cNvPr>
+        <p:cNvGrpSpPr/>
+        <p:nvPr/>
+      </p:nvGrpSpPr>
+      <p:grpSpPr>
+        <a:xfrm>
+          <a:off x="0" y="0"/>
+          <a:ext cx="0" cy="0"/>
+          <a:chOff x="0" y="0"/>
+          <a:chExt cx="0" cy="0"/>
+        </a:xfrm>
+      </p:grpSpPr>
+      <p:grpSp>
+        <p:nvGrpSpPr>
+          <p:cNvPr id="27" name="Group 26">
+            <a:extLst>
+              <a:ext uri="{FF2B5EF4-FFF2-40B4-BE49-F238E27FC236}">
+                <a16:creationId xmlns:a16="http://schemas.microsoft.com/office/drawing/2014/main" id="{C5D31023-4661-13BC-BD0E-8670B78E02F0}"/>
+              </a:ext>
+            </a:extLst>
+          </p:cNvPr>
+          <p:cNvGrpSpPr/>
+          <p:nvPr/>
+        </p:nvGrpSpPr>
+        <p:grpSpPr>
+          <a:xfrm>
+            <a:off x="7197095" y="429293"/>
+            <a:ext cx="3962400" cy="2627586"/>
+            <a:chOff x="6342993" y="1587065"/>
+            <a:chExt cx="3962400" cy="2627586"/>
+          </a:xfrm>
+        </p:grpSpPr>
+        <p:cxnSp>
+          <p:nvCxnSpPr>
+            <p:cNvPr id="22" name="Straight Connector 21">
+              <a:extLst>
+                <a:ext uri="{FF2B5EF4-FFF2-40B4-BE49-F238E27FC236}">
+                  <a16:creationId xmlns:a16="http://schemas.microsoft.com/office/drawing/2014/main" id="{FF17CDF5-5A3F-C4D9-E4E5-D63BE2E6157A}"/>
+                </a:ext>
+              </a:extLst>
+            </p:cNvPr>
+            <p:cNvCxnSpPr>
+              <a:cxnSpLocks/>
+            </p:cNvCxnSpPr>
+            <p:nvPr/>
+          </p:nvCxnSpPr>
+          <p:spPr>
+            <a:xfrm>
+              <a:off x="6342993" y="4193631"/>
+              <a:ext cx="3962400" cy="0"/>
+            </a:xfrm>
+            <a:prstGeom prst="line">
+              <a:avLst/>
+            </a:prstGeom>
+            <a:ln w="76200"/>
+          </p:spPr>
+          <p:style>
+            <a:lnRef idx="2">
+              <a:schemeClr val="dk1"/>
+            </a:lnRef>
+            <a:fillRef idx="0">
+              <a:schemeClr val="dk1"/>
+            </a:fillRef>
+            <a:effectRef idx="1">
+              <a:schemeClr val="dk1"/>
+            </a:effectRef>
+            <a:fontRef idx="minor">
+              <a:schemeClr val="tx1"/>
+            </a:fontRef>
+          </p:style>
+        </p:cxnSp>
+        <p:cxnSp>
+          <p:nvCxnSpPr>
+            <p:cNvPr id="23" name="Straight Connector 22">
+              <a:extLst>
+                <a:ext uri="{FF2B5EF4-FFF2-40B4-BE49-F238E27FC236}">
+                  <a16:creationId xmlns:a16="http://schemas.microsoft.com/office/drawing/2014/main" id="{7F6E9969-3E89-01ED-7C4C-24510CF15458}"/>
+                </a:ext>
+              </a:extLst>
+            </p:cNvPr>
+            <p:cNvCxnSpPr>
+              <a:cxnSpLocks/>
+            </p:cNvCxnSpPr>
+            <p:nvPr/>
+          </p:nvCxnSpPr>
+          <p:spPr>
+            <a:xfrm flipV="1">
+              <a:off x="6384460" y="1587065"/>
+              <a:ext cx="0" cy="2627586"/>
+            </a:xfrm>
+            <a:prstGeom prst="line">
+              <a:avLst/>
+            </a:prstGeom>
+            <a:ln w="76200"/>
+          </p:spPr>
+          <p:style>
+            <a:lnRef idx="2">
+              <a:schemeClr val="dk1"/>
+            </a:lnRef>
+            <a:fillRef idx="0">
+              <a:schemeClr val="dk1"/>
+            </a:fillRef>
+            <a:effectRef idx="1">
+              <a:schemeClr val="dk1"/>
+            </a:effectRef>
+            <a:fontRef idx="minor">
+              <a:schemeClr val="tx1"/>
+            </a:fontRef>
+          </p:style>
+        </p:cxnSp>
+        <p:grpSp>
+          <p:nvGrpSpPr>
+            <p:cNvPr id="48" name="Group 47">
+              <a:extLst>
+                <a:ext uri="{FF2B5EF4-FFF2-40B4-BE49-F238E27FC236}">
+                  <a16:creationId xmlns:a16="http://schemas.microsoft.com/office/drawing/2014/main" id="{A7E46BAA-BD83-249B-5120-C1905F83C5CA}"/>
+                </a:ext>
+              </a:extLst>
+            </p:cNvPr>
+            <p:cNvGrpSpPr/>
+            <p:nvPr/>
+          </p:nvGrpSpPr>
+          <p:grpSpPr>
+            <a:xfrm>
+              <a:off x="7056336" y="1692166"/>
+              <a:ext cx="202416" cy="1736834"/>
+              <a:chOff x="7062952" y="1608083"/>
+              <a:chExt cx="202416" cy="1736834"/>
+            </a:xfrm>
+          </p:grpSpPr>
+          <p:cxnSp>
+            <p:nvCxnSpPr>
+              <p:cNvPr id="32" name="Straight Connector 31">
+                <a:extLst>
+                  <a:ext uri="{FF2B5EF4-FFF2-40B4-BE49-F238E27FC236}">
+                    <a16:creationId xmlns:a16="http://schemas.microsoft.com/office/drawing/2014/main" id="{02CA2536-62E5-1DF8-0A0C-59B1CCE66F54}"/>
+                  </a:ext>
+                </a:extLst>
+              </p:cNvPr>
+              <p:cNvCxnSpPr/>
+              <p:nvPr/>
+            </p:nvCxnSpPr>
+            <p:spPr>
+              <a:xfrm flipV="1">
+                <a:off x="7157545" y="1608083"/>
+                <a:ext cx="0" cy="1736834"/>
+              </a:xfrm>
+              <a:prstGeom prst="line">
+                <a:avLst/>
+              </a:prstGeom>
+              <a:ln w="28575"/>
+            </p:spPr>
+            <p:style>
+              <a:lnRef idx="2">
+                <a:schemeClr val="dk1"/>
+              </a:lnRef>
+              <a:fillRef idx="0">
+                <a:schemeClr val="dk1"/>
+              </a:fillRef>
+              <a:effectRef idx="1">
+                <a:schemeClr val="dk1"/>
+              </a:effectRef>
+              <a:fontRef idx="minor">
+                <a:schemeClr val="tx1"/>
+              </a:fontRef>
+            </p:style>
+          </p:cxnSp>
+          <p:cxnSp>
+            <p:nvCxnSpPr>
+              <p:cNvPr id="34" name="Straight Connector 33">
+                <a:extLst>
+                  <a:ext uri="{FF2B5EF4-FFF2-40B4-BE49-F238E27FC236}">
+                    <a16:creationId xmlns:a16="http://schemas.microsoft.com/office/drawing/2014/main" id="{22EAC751-B812-5D74-CFF6-0F256ABCC39D}"/>
+                  </a:ext>
+                </a:extLst>
+              </p:cNvPr>
+              <p:cNvCxnSpPr/>
+              <p:nvPr/>
+            </p:nvCxnSpPr>
+            <p:spPr>
+              <a:xfrm>
+                <a:off x="7062952" y="1608085"/>
+                <a:ext cx="199697" cy="0"/>
+              </a:xfrm>
+              <a:prstGeom prst="line">
+                <a:avLst/>
+              </a:prstGeom>
+              <a:ln w="28575"/>
+            </p:spPr>
+            <p:style>
+              <a:lnRef idx="2">
+                <a:schemeClr val="dk1"/>
+              </a:lnRef>
+              <a:fillRef idx="0">
+                <a:schemeClr val="dk1"/>
+              </a:fillRef>
+              <a:effectRef idx="1">
+                <a:schemeClr val="dk1"/>
+              </a:effectRef>
+              <a:fontRef idx="minor">
+                <a:schemeClr val="tx1"/>
+              </a:fontRef>
+            </p:style>
+          </p:cxnSp>
+          <p:cxnSp>
+            <p:nvCxnSpPr>
+              <p:cNvPr id="35" name="Straight Connector 34">
+                <a:extLst>
+                  <a:ext uri="{FF2B5EF4-FFF2-40B4-BE49-F238E27FC236}">
+                    <a16:creationId xmlns:a16="http://schemas.microsoft.com/office/drawing/2014/main" id="{66F42BB6-CF81-CCF5-6D2D-442CFA27C251}"/>
+                  </a:ext>
+                </a:extLst>
+              </p:cNvPr>
+              <p:cNvCxnSpPr>
+                <a:cxnSpLocks/>
+              </p:cNvCxnSpPr>
+              <p:nvPr/>
+            </p:nvCxnSpPr>
+            <p:spPr>
+              <a:xfrm>
+                <a:off x="7065671" y="3344917"/>
+                <a:ext cx="199697" cy="0"/>
+              </a:xfrm>
+              <a:prstGeom prst="line">
+                <a:avLst/>
+              </a:prstGeom>
+              <a:ln w="28575"/>
+            </p:spPr>
+            <p:style>
+              <a:lnRef idx="2">
+                <a:schemeClr val="dk1"/>
+              </a:lnRef>
+              <a:fillRef idx="0">
+                <a:schemeClr val="dk1"/>
+              </a:fillRef>
+              <a:effectRef idx="1">
+                <a:schemeClr val="dk1"/>
+              </a:effectRef>
+              <a:fontRef idx="minor">
+                <a:schemeClr val="tx1"/>
+              </a:fontRef>
+            </p:style>
+          </p:cxnSp>
+        </p:grpSp>
+        <p:grpSp>
+          <p:nvGrpSpPr>
+            <p:cNvPr id="52" name="Group 51">
+              <a:extLst>
+                <a:ext uri="{FF2B5EF4-FFF2-40B4-BE49-F238E27FC236}">
+                  <a16:creationId xmlns:a16="http://schemas.microsoft.com/office/drawing/2014/main" id="{E53E7EBF-82B2-B34F-C374-70EC60510F23}"/>
+                </a:ext>
+              </a:extLst>
+            </p:cNvPr>
+            <p:cNvGrpSpPr/>
+            <p:nvPr/>
+          </p:nvGrpSpPr>
+          <p:grpSpPr>
+            <a:xfrm>
+              <a:off x="7906807" y="2178950"/>
+              <a:ext cx="202416" cy="1392528"/>
+              <a:chOff x="7062952" y="1608083"/>
+              <a:chExt cx="202416" cy="1736834"/>
+            </a:xfrm>
+          </p:grpSpPr>
+          <p:cxnSp>
+            <p:nvCxnSpPr>
+              <p:cNvPr id="53" name="Straight Connector 52">
+                <a:extLst>
+                  <a:ext uri="{FF2B5EF4-FFF2-40B4-BE49-F238E27FC236}">
+                    <a16:creationId xmlns:a16="http://schemas.microsoft.com/office/drawing/2014/main" id="{23E4316C-EA43-CEDB-CFD0-3DB4C3EEBBEE}"/>
+                  </a:ext>
+                </a:extLst>
+              </p:cNvPr>
+              <p:cNvCxnSpPr/>
+              <p:nvPr/>
+            </p:nvCxnSpPr>
+            <p:spPr>
+              <a:xfrm flipV="1">
+                <a:off x="7157545" y="1608083"/>
+                <a:ext cx="0" cy="1736834"/>
+              </a:xfrm>
+              <a:prstGeom prst="line">
+                <a:avLst/>
+              </a:prstGeom>
+              <a:ln w="28575"/>
+            </p:spPr>
+            <p:style>
+              <a:lnRef idx="2">
+                <a:schemeClr val="dk1"/>
+              </a:lnRef>
+              <a:fillRef idx="0">
+                <a:schemeClr val="dk1"/>
+              </a:fillRef>
+              <a:effectRef idx="1">
+                <a:schemeClr val="dk1"/>
+              </a:effectRef>
+              <a:fontRef idx="minor">
+                <a:schemeClr val="tx1"/>
+              </a:fontRef>
+            </p:style>
+          </p:cxnSp>
+          <p:cxnSp>
+            <p:nvCxnSpPr>
+              <p:cNvPr id="54" name="Straight Connector 53">
+                <a:extLst>
+                  <a:ext uri="{FF2B5EF4-FFF2-40B4-BE49-F238E27FC236}">
+                    <a16:creationId xmlns:a16="http://schemas.microsoft.com/office/drawing/2014/main" id="{E67945F6-0A86-81DB-4B62-A4837637465E}"/>
+                  </a:ext>
+                </a:extLst>
+              </p:cNvPr>
+              <p:cNvCxnSpPr/>
+              <p:nvPr/>
+            </p:nvCxnSpPr>
+            <p:spPr>
+              <a:xfrm>
+                <a:off x="7062952" y="1608085"/>
+                <a:ext cx="199697" cy="0"/>
+              </a:xfrm>
+              <a:prstGeom prst="line">
+                <a:avLst/>
+              </a:prstGeom>
+              <a:ln w="28575"/>
+            </p:spPr>
+            <p:style>
+              <a:lnRef idx="2">
+                <a:schemeClr val="dk1"/>
+              </a:lnRef>
+              <a:fillRef idx="0">
+                <a:schemeClr val="dk1"/>
+              </a:fillRef>
+              <a:effectRef idx="1">
+                <a:schemeClr val="dk1"/>
+              </a:effectRef>
+              <a:fontRef idx="minor">
+                <a:schemeClr val="tx1"/>
+              </a:fontRef>
+            </p:style>
+          </p:cxnSp>
+          <p:cxnSp>
+            <p:nvCxnSpPr>
+              <p:cNvPr id="55" name="Straight Connector 54">
+                <a:extLst>
+                  <a:ext uri="{FF2B5EF4-FFF2-40B4-BE49-F238E27FC236}">
+                    <a16:creationId xmlns:a16="http://schemas.microsoft.com/office/drawing/2014/main" id="{3966A4BD-8687-20A5-6089-275138979998}"/>
+                  </a:ext>
+                </a:extLst>
+              </p:cNvPr>
+              <p:cNvCxnSpPr>
+                <a:cxnSpLocks/>
+              </p:cNvCxnSpPr>
+              <p:nvPr/>
+            </p:nvCxnSpPr>
+            <p:spPr>
+              <a:xfrm>
+                <a:off x="7065671" y="3344917"/>
+                <a:ext cx="199697" cy="0"/>
+              </a:xfrm>
+              <a:prstGeom prst="line">
+                <a:avLst/>
+              </a:prstGeom>
+              <a:ln w="28575"/>
+            </p:spPr>
+            <p:style>
+              <a:lnRef idx="2">
+                <a:schemeClr val="dk1"/>
+              </a:lnRef>
+              <a:fillRef idx="0">
+                <a:schemeClr val="dk1"/>
+              </a:fillRef>
+              <a:effectRef idx="1">
+                <a:schemeClr val="dk1"/>
+              </a:effectRef>
+              <a:fontRef idx="minor">
+                <a:schemeClr val="tx1"/>
+              </a:fontRef>
+            </p:style>
+          </p:cxnSp>
+        </p:grpSp>
+        <p:grpSp>
+          <p:nvGrpSpPr>
+            <p:cNvPr id="56" name="Group 55">
+              <a:extLst>
+                <a:ext uri="{FF2B5EF4-FFF2-40B4-BE49-F238E27FC236}">
+                  <a16:creationId xmlns:a16="http://schemas.microsoft.com/office/drawing/2014/main" id="{7A808FBE-E1F6-0545-07D6-26239BE717A6}"/>
+                </a:ext>
+              </a:extLst>
+            </p:cNvPr>
+            <p:cNvGrpSpPr/>
+            <p:nvPr/>
+          </p:nvGrpSpPr>
+          <p:grpSpPr>
+            <a:xfrm>
+              <a:off x="8702102" y="1799380"/>
+              <a:ext cx="202416" cy="1392528"/>
+              <a:chOff x="7062952" y="1608083"/>
+              <a:chExt cx="202416" cy="1736834"/>
+            </a:xfrm>
+          </p:grpSpPr>
+          <p:cxnSp>
+            <p:nvCxnSpPr>
+              <p:cNvPr id="57" name="Straight Connector 56">
+                <a:extLst>
+                  <a:ext uri="{FF2B5EF4-FFF2-40B4-BE49-F238E27FC236}">
+                    <a16:creationId xmlns:a16="http://schemas.microsoft.com/office/drawing/2014/main" id="{FFF27666-B063-2F29-AD11-80B52241E553}"/>
+                  </a:ext>
+                </a:extLst>
+              </p:cNvPr>
+              <p:cNvCxnSpPr/>
+              <p:nvPr/>
+            </p:nvCxnSpPr>
+            <p:spPr>
+              <a:xfrm flipV="1">
+                <a:off x="7157545" y="1608083"/>
+                <a:ext cx="0" cy="1736834"/>
+              </a:xfrm>
+              <a:prstGeom prst="line">
+                <a:avLst/>
+              </a:prstGeom>
+              <a:ln w="28575"/>
+            </p:spPr>
+            <p:style>
+              <a:lnRef idx="2">
+                <a:schemeClr val="dk1"/>
+              </a:lnRef>
+              <a:fillRef idx="0">
+                <a:schemeClr val="dk1"/>
+              </a:fillRef>
+              <a:effectRef idx="1">
+                <a:schemeClr val="dk1"/>
+              </a:effectRef>
+              <a:fontRef idx="minor">
+                <a:schemeClr val="tx1"/>
+              </a:fontRef>
+            </p:style>
+          </p:cxnSp>
+          <p:cxnSp>
+            <p:nvCxnSpPr>
+              <p:cNvPr id="58" name="Straight Connector 57">
+                <a:extLst>
+                  <a:ext uri="{FF2B5EF4-FFF2-40B4-BE49-F238E27FC236}">
+                    <a16:creationId xmlns:a16="http://schemas.microsoft.com/office/drawing/2014/main" id="{1A99E5DB-918B-1677-DFC9-655B61614EB8}"/>
+                  </a:ext>
+                </a:extLst>
+              </p:cNvPr>
+              <p:cNvCxnSpPr/>
+              <p:nvPr/>
+            </p:nvCxnSpPr>
+            <p:spPr>
+              <a:xfrm>
+                <a:off x="7062952" y="1608085"/>
+                <a:ext cx="199697" cy="0"/>
+              </a:xfrm>
+              <a:prstGeom prst="line">
+                <a:avLst/>
+              </a:prstGeom>
+              <a:ln w="28575"/>
+            </p:spPr>
+            <p:style>
+              <a:lnRef idx="2">
+                <a:schemeClr val="dk1"/>
+              </a:lnRef>
+              <a:fillRef idx="0">
+                <a:schemeClr val="dk1"/>
+              </a:fillRef>
+              <a:effectRef idx="1">
+                <a:schemeClr val="dk1"/>
+              </a:effectRef>
+              <a:fontRef idx="minor">
+                <a:schemeClr val="tx1"/>
+              </a:fontRef>
+            </p:style>
+          </p:cxnSp>
+          <p:cxnSp>
+            <p:nvCxnSpPr>
+              <p:cNvPr id="59" name="Straight Connector 58">
+                <a:extLst>
+                  <a:ext uri="{FF2B5EF4-FFF2-40B4-BE49-F238E27FC236}">
+                    <a16:creationId xmlns:a16="http://schemas.microsoft.com/office/drawing/2014/main" id="{BE6F6DD8-E881-B8E8-9E11-D2462B2ACF5D}"/>
+                  </a:ext>
+                </a:extLst>
+              </p:cNvPr>
+              <p:cNvCxnSpPr>
+                <a:cxnSpLocks/>
+              </p:cNvCxnSpPr>
+              <p:nvPr/>
+            </p:nvCxnSpPr>
+            <p:spPr>
+              <a:xfrm>
+                <a:off x="7065671" y="3344917"/>
+                <a:ext cx="199697" cy="0"/>
+              </a:xfrm>
+              <a:prstGeom prst="line">
+                <a:avLst/>
+              </a:prstGeom>
+              <a:ln w="28575"/>
+            </p:spPr>
+            <p:style>
+              <a:lnRef idx="2">
+                <a:schemeClr val="dk1"/>
+              </a:lnRef>
+              <a:fillRef idx="0">
+                <a:schemeClr val="dk1"/>
+              </a:fillRef>
+              <a:effectRef idx="1">
+                <a:schemeClr val="dk1"/>
+              </a:effectRef>
+              <a:fontRef idx="minor">
+                <a:schemeClr val="tx1"/>
+              </a:fontRef>
+            </p:style>
+          </p:cxnSp>
+        </p:grpSp>
+        <p:grpSp>
+          <p:nvGrpSpPr>
+            <p:cNvPr id="61" name="Group 60">
+              <a:extLst>
+                <a:ext uri="{FF2B5EF4-FFF2-40B4-BE49-F238E27FC236}">
+                  <a16:creationId xmlns:a16="http://schemas.microsoft.com/office/drawing/2014/main" id="{88F15583-38AB-AFE2-E47E-47DC855CFDD2}"/>
+                </a:ext>
+              </a:extLst>
+            </p:cNvPr>
+            <p:cNvGrpSpPr/>
+            <p:nvPr/>
+          </p:nvGrpSpPr>
+          <p:grpSpPr>
+            <a:xfrm>
+              <a:off x="9398907" y="2490027"/>
+              <a:ext cx="202416" cy="1392528"/>
+              <a:chOff x="7062952" y="1608084"/>
+              <a:chExt cx="202416" cy="1736834"/>
+            </a:xfrm>
+          </p:grpSpPr>
+          <p:cxnSp>
+            <p:nvCxnSpPr>
+              <p:cNvPr id="62" name="Straight Connector 61">
+                <a:extLst>
+                  <a:ext uri="{FF2B5EF4-FFF2-40B4-BE49-F238E27FC236}">
+                    <a16:creationId xmlns:a16="http://schemas.microsoft.com/office/drawing/2014/main" id="{4FCEBEFF-2945-A68E-07AE-F444257CA519}"/>
+                  </a:ext>
+                </a:extLst>
+              </p:cNvPr>
+              <p:cNvCxnSpPr/>
+              <p:nvPr/>
+            </p:nvCxnSpPr>
+            <p:spPr>
+              <a:xfrm flipV="1">
+                <a:off x="7157545" y="1608084"/>
+                <a:ext cx="0" cy="1736834"/>
+              </a:xfrm>
+              <a:prstGeom prst="line">
+                <a:avLst/>
+              </a:prstGeom>
+              <a:ln w="28575"/>
+            </p:spPr>
+            <p:style>
+              <a:lnRef idx="2">
+                <a:schemeClr val="dk1"/>
+              </a:lnRef>
+              <a:fillRef idx="0">
+                <a:schemeClr val="dk1"/>
+              </a:fillRef>
+              <a:effectRef idx="1">
+                <a:schemeClr val="dk1"/>
+              </a:effectRef>
+              <a:fontRef idx="minor">
+                <a:schemeClr val="tx1"/>
+              </a:fontRef>
+            </p:style>
+          </p:cxnSp>
+          <p:cxnSp>
+            <p:nvCxnSpPr>
+              <p:cNvPr id="63" name="Straight Connector 62">
+                <a:extLst>
+                  <a:ext uri="{FF2B5EF4-FFF2-40B4-BE49-F238E27FC236}">
+                    <a16:creationId xmlns:a16="http://schemas.microsoft.com/office/drawing/2014/main" id="{31D0CA0F-64E0-A41E-BD23-18BCB79B2235}"/>
+                  </a:ext>
+                </a:extLst>
+              </p:cNvPr>
+              <p:cNvCxnSpPr/>
+              <p:nvPr/>
+            </p:nvCxnSpPr>
+            <p:spPr>
+              <a:xfrm>
+                <a:off x="7062952" y="1608085"/>
+                <a:ext cx="199697" cy="0"/>
+              </a:xfrm>
+              <a:prstGeom prst="line">
+                <a:avLst/>
+              </a:prstGeom>
+              <a:ln w="28575"/>
+            </p:spPr>
+            <p:style>
+              <a:lnRef idx="2">
+                <a:schemeClr val="dk1"/>
+              </a:lnRef>
+              <a:fillRef idx="0">
+                <a:schemeClr val="dk1"/>
+              </a:fillRef>
+              <a:effectRef idx="1">
+                <a:schemeClr val="dk1"/>
+              </a:effectRef>
+              <a:fontRef idx="minor">
+                <a:schemeClr val="tx1"/>
+              </a:fontRef>
+            </p:style>
+          </p:cxnSp>
+          <p:cxnSp>
+            <p:nvCxnSpPr>
+              <p:cNvPr id="64" name="Straight Connector 63">
+                <a:extLst>
+                  <a:ext uri="{FF2B5EF4-FFF2-40B4-BE49-F238E27FC236}">
+                    <a16:creationId xmlns:a16="http://schemas.microsoft.com/office/drawing/2014/main" id="{85ACA2E9-9686-0075-E595-A66FDB6221E3}"/>
+                  </a:ext>
+                </a:extLst>
+              </p:cNvPr>
+              <p:cNvCxnSpPr>
+                <a:cxnSpLocks/>
+              </p:cNvCxnSpPr>
+              <p:nvPr/>
+            </p:nvCxnSpPr>
+            <p:spPr>
+              <a:xfrm>
+                <a:off x="7065671" y="3344917"/>
+                <a:ext cx="199697" cy="0"/>
+              </a:xfrm>
+              <a:prstGeom prst="line">
+                <a:avLst/>
+              </a:prstGeom>
+              <a:ln w="28575"/>
+            </p:spPr>
+            <p:style>
+              <a:lnRef idx="2">
+                <a:schemeClr val="dk1"/>
+              </a:lnRef>
+              <a:fillRef idx="0">
+                <a:schemeClr val="dk1"/>
+              </a:fillRef>
+              <a:effectRef idx="1">
+                <a:schemeClr val="dk1"/>
+              </a:effectRef>
+              <a:fontRef idx="minor">
+                <a:schemeClr val="tx1"/>
+              </a:fontRef>
+            </p:style>
+          </p:cxnSp>
+        </p:grpSp>
+        <p:sp>
+          <p:nvSpPr>
+            <p:cNvPr id="21" name="Oval 20">
+              <a:extLst>
+                <a:ext uri="{FF2B5EF4-FFF2-40B4-BE49-F238E27FC236}">
+                  <a16:creationId xmlns:a16="http://schemas.microsoft.com/office/drawing/2014/main" id="{89D2DDC5-BBAE-A022-A2A3-81935A6F8367}"/>
+                </a:ext>
+              </a:extLst>
+            </p:cNvPr>
+            <p:cNvSpPr/>
+            <p:nvPr/>
+          </p:nvSpPr>
+          <p:spPr>
+            <a:xfrm>
+              <a:off x="6976089" y="2319613"/>
+              <a:ext cx="353259" cy="353259"/>
+            </a:xfrm>
+            <a:prstGeom prst="ellipse">
+              <a:avLst/>
+            </a:prstGeom>
+            <a:solidFill>
+              <a:schemeClr val="tx2">
+                <a:lumMod val="50000"/>
+                <a:lumOff val="50000"/>
+              </a:schemeClr>
+            </a:solidFill>
+          </p:spPr>
+          <p:style>
+            <a:lnRef idx="2">
+              <a:schemeClr val="accent1">
+                <a:shade val="15000"/>
+              </a:schemeClr>
+            </a:lnRef>
+            <a:fillRef idx="1">
+              <a:schemeClr val="accent1"/>
+            </a:fillRef>
+            <a:effectRef idx="0">
+              <a:schemeClr val="accent1"/>
+            </a:effectRef>
+            <a:fontRef idx="minor">
+              <a:schemeClr val="lt1"/>
+            </a:fontRef>
+          </p:style>
+          <p:txBody>
+            <a:bodyPr rtlCol="0" anchor="ctr"/>
+            <a:lstStyle/>
+            <a:p>
+              <a:pPr algn="ctr"/>
+              <a:endParaRPr lang="en-US"/>
+            </a:p>
+          </p:txBody>
+        </p:sp>
+        <p:sp>
+          <p:nvSpPr>
+            <p:cNvPr id="24" name="Oval 23">
+              <a:extLst>
+                <a:ext uri="{FF2B5EF4-FFF2-40B4-BE49-F238E27FC236}">
+                  <a16:creationId xmlns:a16="http://schemas.microsoft.com/office/drawing/2014/main" id="{EF5F8DE9-24D7-6CBB-3CB6-41DFC154E2B4}"/>
+                </a:ext>
+              </a:extLst>
+            </p:cNvPr>
+            <p:cNvSpPr/>
+            <p:nvPr/>
+          </p:nvSpPr>
+          <p:spPr>
+            <a:xfrm>
+              <a:off x="7836788" y="2672317"/>
+              <a:ext cx="353265" cy="353265"/>
+            </a:xfrm>
+            <a:prstGeom prst="ellipse">
+              <a:avLst/>
+            </a:prstGeom>
+            <a:solidFill>
+              <a:schemeClr val="accent5">
+                <a:lumMod val="60000"/>
+                <a:lumOff val="40000"/>
+              </a:schemeClr>
+            </a:solidFill>
+          </p:spPr>
+          <p:style>
+            <a:lnRef idx="2">
+              <a:schemeClr val="accent1">
+                <a:shade val="15000"/>
+              </a:schemeClr>
+            </a:lnRef>
+            <a:fillRef idx="1">
+              <a:schemeClr val="accent1"/>
+            </a:fillRef>
+            <a:effectRef idx="0">
+              <a:schemeClr val="accent1"/>
+            </a:effectRef>
+            <a:fontRef idx="minor">
+              <a:schemeClr val="lt1"/>
+            </a:fontRef>
+          </p:style>
+          <p:txBody>
+            <a:bodyPr rtlCol="0" anchor="ctr"/>
+            <a:lstStyle/>
+            <a:p>
+              <a:pPr algn="ctr"/>
+              <a:endParaRPr lang="en-US"/>
+            </a:p>
+          </p:txBody>
+        </p:sp>
+        <p:sp>
+          <p:nvSpPr>
+            <p:cNvPr id="25" name="Oval 24">
+              <a:extLst>
+                <a:ext uri="{FF2B5EF4-FFF2-40B4-BE49-F238E27FC236}">
+                  <a16:creationId xmlns:a16="http://schemas.microsoft.com/office/drawing/2014/main" id="{F6BDC030-E7D6-EDAE-E37F-82ED0F47E7E5}"/>
+                </a:ext>
+              </a:extLst>
+            </p:cNvPr>
+            <p:cNvSpPr/>
+            <p:nvPr/>
+          </p:nvSpPr>
+          <p:spPr>
+            <a:xfrm>
+              <a:off x="8614515" y="2296016"/>
+              <a:ext cx="364359" cy="364359"/>
+            </a:xfrm>
+            <a:prstGeom prst="ellipse">
+              <a:avLst/>
+            </a:prstGeom>
+            <a:solidFill>
+              <a:schemeClr val="accent3">
+                <a:lumMod val="60000"/>
+                <a:lumOff val="40000"/>
+              </a:schemeClr>
+            </a:solidFill>
+          </p:spPr>
+          <p:style>
+            <a:lnRef idx="2">
+              <a:schemeClr val="accent1">
+                <a:shade val="15000"/>
+              </a:schemeClr>
+            </a:lnRef>
+            <a:fillRef idx="1">
+              <a:schemeClr val="accent1"/>
+            </a:fillRef>
+            <a:effectRef idx="0">
+              <a:schemeClr val="accent1"/>
+            </a:effectRef>
+            <a:fontRef idx="minor">
+              <a:schemeClr val="lt1"/>
+            </a:fontRef>
+          </p:style>
+          <p:txBody>
+            <a:bodyPr rtlCol="0" anchor="ctr"/>
+            <a:lstStyle/>
+            <a:p>
+              <a:pPr algn="ctr"/>
+              <a:endParaRPr lang="en-US"/>
+            </a:p>
+          </p:txBody>
+        </p:sp>
+        <p:sp>
+          <p:nvSpPr>
+            <p:cNvPr id="26" name="Oval 25">
+              <a:extLst>
+                <a:ext uri="{FF2B5EF4-FFF2-40B4-BE49-F238E27FC236}">
+                  <a16:creationId xmlns:a16="http://schemas.microsoft.com/office/drawing/2014/main" id="{520EB93A-9FF9-4784-D6CB-BDBB8D56D976}"/>
+                </a:ext>
+              </a:extLst>
+            </p:cNvPr>
+            <p:cNvSpPr/>
+            <p:nvPr/>
+          </p:nvSpPr>
+          <p:spPr>
+            <a:xfrm>
+              <a:off x="9333221" y="2985123"/>
+              <a:ext cx="320557" cy="320557"/>
+            </a:xfrm>
+            <a:prstGeom prst="ellipse">
+              <a:avLst/>
+            </a:prstGeom>
+            <a:solidFill>
+              <a:schemeClr val="accent2">
+                <a:lumMod val="75000"/>
+              </a:schemeClr>
+            </a:solidFill>
+          </p:spPr>
+          <p:style>
+            <a:lnRef idx="2">
+              <a:schemeClr val="accent1">
+                <a:shade val="15000"/>
+              </a:schemeClr>
+            </a:lnRef>
+            <a:fillRef idx="1">
+              <a:schemeClr val="accent1"/>
+            </a:fillRef>
+            <a:effectRef idx="0">
+              <a:schemeClr val="accent1"/>
+            </a:effectRef>
+            <a:fontRef idx="minor">
+              <a:schemeClr val="lt1"/>
+            </a:fontRef>
+          </p:style>
+          <p:txBody>
+            <a:bodyPr rtlCol="0" anchor="ctr"/>
+            <a:lstStyle/>
+            <a:p>
+              <a:pPr algn="ctr"/>
+              <a:endParaRPr lang="en-US"/>
+            </a:p>
+          </p:txBody>
+        </p:sp>
+      </p:grpSp>
+      <p:grpSp>
+        <p:nvGrpSpPr>
+          <p:cNvPr id="67" name="Group 66">
+            <a:extLst>
+              <a:ext uri="{FF2B5EF4-FFF2-40B4-BE49-F238E27FC236}">
+                <a16:creationId xmlns:a16="http://schemas.microsoft.com/office/drawing/2014/main" id="{EA80072C-6B33-4A32-5996-362D7679A303}"/>
+              </a:ext>
+            </a:extLst>
+          </p:cNvPr>
+          <p:cNvGrpSpPr/>
+          <p:nvPr/>
+        </p:nvGrpSpPr>
+        <p:grpSpPr>
+          <a:xfrm>
+            <a:off x="745298" y="304384"/>
+            <a:ext cx="3962400" cy="2627586"/>
+            <a:chOff x="935421" y="1608083"/>
+            <a:chExt cx="3962400" cy="2627586"/>
+          </a:xfrm>
+        </p:grpSpPr>
+        <p:cxnSp>
+          <p:nvCxnSpPr>
+            <p:cNvPr id="9" name="Straight Connector 8">
+              <a:extLst>
+                <a:ext uri="{FF2B5EF4-FFF2-40B4-BE49-F238E27FC236}">
+                  <a16:creationId xmlns:a16="http://schemas.microsoft.com/office/drawing/2014/main" id="{32297897-D92E-793D-46D9-BDAE4EC0ED96}"/>
+                </a:ext>
+              </a:extLst>
+            </p:cNvPr>
+            <p:cNvCxnSpPr>
+              <a:cxnSpLocks/>
+            </p:cNvCxnSpPr>
+            <p:nvPr/>
+          </p:nvCxnSpPr>
+          <p:spPr>
+            <a:xfrm>
+              <a:off x="935421" y="4214649"/>
+              <a:ext cx="3962400" cy="0"/>
+            </a:xfrm>
+            <a:prstGeom prst="line">
+              <a:avLst/>
+            </a:prstGeom>
+            <a:ln w="76200"/>
+          </p:spPr>
+          <p:style>
+            <a:lnRef idx="2">
+              <a:schemeClr val="dk1"/>
+            </a:lnRef>
+            <a:fillRef idx="0">
+              <a:schemeClr val="dk1"/>
+            </a:fillRef>
+            <a:effectRef idx="1">
+              <a:schemeClr val="dk1"/>
+            </a:effectRef>
+            <a:fontRef idx="minor">
+              <a:schemeClr val="tx1"/>
+            </a:fontRef>
+          </p:style>
+        </p:cxnSp>
+        <p:cxnSp>
+          <p:nvCxnSpPr>
+            <p:cNvPr id="10" name="Straight Connector 9">
+              <a:extLst>
+                <a:ext uri="{FF2B5EF4-FFF2-40B4-BE49-F238E27FC236}">
+                  <a16:creationId xmlns:a16="http://schemas.microsoft.com/office/drawing/2014/main" id="{F4D7C357-AD20-A095-3745-1942979D3E21}"/>
+                </a:ext>
+              </a:extLst>
+            </p:cNvPr>
+            <p:cNvCxnSpPr>
+              <a:cxnSpLocks/>
+            </p:cNvCxnSpPr>
+            <p:nvPr/>
+          </p:nvCxnSpPr>
+          <p:spPr>
+            <a:xfrm flipV="1">
+              <a:off x="940676" y="1608083"/>
+              <a:ext cx="0" cy="2627586"/>
+            </a:xfrm>
+            <a:prstGeom prst="line">
+              <a:avLst/>
+            </a:prstGeom>
+            <a:ln w="76200"/>
+          </p:spPr>
+          <p:style>
+            <a:lnRef idx="2">
+              <a:schemeClr val="dk1"/>
+            </a:lnRef>
+            <a:fillRef idx="0">
+              <a:schemeClr val="dk1"/>
+            </a:fillRef>
+            <a:effectRef idx="1">
+              <a:schemeClr val="dk1"/>
+            </a:effectRef>
+            <a:fontRef idx="minor">
+              <a:schemeClr val="tx1"/>
+            </a:fontRef>
+          </p:style>
+        </p:cxnSp>
+      </p:grpSp>
+      <p:cxnSp>
+        <p:nvCxnSpPr>
+          <p:cNvPr id="81" name="Straight Connector 80">
+            <a:extLst>
+              <a:ext uri="{FF2B5EF4-FFF2-40B4-BE49-F238E27FC236}">
+                <a16:creationId xmlns:a16="http://schemas.microsoft.com/office/drawing/2014/main" id="{D39F9992-C215-2286-8565-6F4EBEA5A2BF}"/>
+              </a:ext>
+            </a:extLst>
+          </p:cNvPr>
+          <p:cNvCxnSpPr/>
+          <p:nvPr/>
+        </p:nvCxnSpPr>
+        <p:spPr>
+          <a:xfrm flipV="1">
+            <a:off x="869839" y="1429008"/>
+            <a:ext cx="914400" cy="1251865"/>
+          </a:xfrm>
+          <a:prstGeom prst="line">
+            <a:avLst/>
+          </a:prstGeom>
+          <a:ln w="57150">
+            <a:solidFill>
+              <a:schemeClr val="tx2">
+                <a:lumMod val="50000"/>
+                <a:lumOff val="50000"/>
+              </a:schemeClr>
+            </a:solidFill>
+          </a:ln>
+        </p:spPr>
+        <p:style>
+          <a:lnRef idx="2">
+            <a:schemeClr val="dk1"/>
+          </a:lnRef>
+          <a:fillRef idx="0">
+            <a:schemeClr val="dk1"/>
+          </a:fillRef>
+          <a:effectRef idx="1">
+            <a:schemeClr val="dk1"/>
+          </a:effectRef>
+          <a:fontRef idx="minor">
+            <a:schemeClr val="tx1"/>
+          </a:fontRef>
+        </p:style>
+      </p:cxnSp>
+      <p:cxnSp>
+        <p:nvCxnSpPr>
+          <p:cNvPr id="82" name="Straight Connector 81">
+            <a:extLst>
+              <a:ext uri="{FF2B5EF4-FFF2-40B4-BE49-F238E27FC236}">
+                <a16:creationId xmlns:a16="http://schemas.microsoft.com/office/drawing/2014/main" id="{8C6B4A8A-C4F0-6ADC-64ED-64F95CD05828}"/>
+              </a:ext>
+            </a:extLst>
+          </p:cNvPr>
+          <p:cNvCxnSpPr>
+            <a:cxnSpLocks/>
+          </p:cNvCxnSpPr>
+          <p:nvPr/>
+        </p:nvCxnSpPr>
+        <p:spPr>
+          <a:xfrm flipH="1" flipV="1">
+            <a:off x="1739294" y="1431040"/>
+            <a:ext cx="1112129" cy="167010"/>
+          </a:xfrm>
+          <a:prstGeom prst="line">
+            <a:avLst/>
+          </a:prstGeom>
+          <a:ln w="57150">
+            <a:solidFill>
+              <a:schemeClr val="tx2">
+                <a:lumMod val="50000"/>
+                <a:lumOff val="50000"/>
+              </a:schemeClr>
+            </a:solidFill>
+          </a:ln>
+        </p:spPr>
+        <p:style>
+          <a:lnRef idx="2">
+            <a:schemeClr val="dk1"/>
+          </a:lnRef>
+          <a:fillRef idx="0">
+            <a:schemeClr val="dk1"/>
+          </a:fillRef>
+          <a:effectRef idx="1">
+            <a:schemeClr val="dk1"/>
+          </a:effectRef>
+          <a:fontRef idx="minor">
+            <a:schemeClr val="tx1"/>
+          </a:fontRef>
+        </p:style>
+      </p:cxnSp>
+      <p:cxnSp>
+        <p:nvCxnSpPr>
+          <p:cNvPr id="84" name="Straight Connector 83">
+            <a:extLst>
+              <a:ext uri="{FF2B5EF4-FFF2-40B4-BE49-F238E27FC236}">
+                <a16:creationId xmlns:a16="http://schemas.microsoft.com/office/drawing/2014/main" id="{7A3E794F-6660-F20C-70CD-6274A83DD430}"/>
+              </a:ext>
+            </a:extLst>
+          </p:cNvPr>
+          <p:cNvCxnSpPr>
+            <a:cxnSpLocks/>
+          </p:cNvCxnSpPr>
+          <p:nvPr/>
+        </p:nvCxnSpPr>
+        <p:spPr>
+          <a:xfrm flipV="1">
+            <a:off x="2826510" y="866599"/>
+            <a:ext cx="1195468" cy="736427"/>
+          </a:xfrm>
+          <a:prstGeom prst="line">
+            <a:avLst/>
+          </a:prstGeom>
+          <a:ln w="57150">
+            <a:solidFill>
+              <a:schemeClr val="tx2">
+                <a:lumMod val="50000"/>
+                <a:lumOff val="50000"/>
+              </a:schemeClr>
+            </a:solidFill>
+          </a:ln>
+        </p:spPr>
+        <p:style>
+          <a:lnRef idx="2">
+            <a:schemeClr val="dk1"/>
+          </a:lnRef>
+          <a:fillRef idx="0">
+            <a:schemeClr val="dk1"/>
+          </a:fillRef>
+          <a:effectRef idx="1">
+            <a:schemeClr val="dk1"/>
+          </a:effectRef>
+          <a:fontRef idx="minor">
+            <a:schemeClr val="tx1"/>
+          </a:fontRef>
+        </p:style>
+      </p:cxnSp>
+      <p:cxnSp>
+        <p:nvCxnSpPr>
+          <p:cNvPr id="86" name="Straight Connector 85">
+            <a:extLst>
+              <a:ext uri="{FF2B5EF4-FFF2-40B4-BE49-F238E27FC236}">
+                <a16:creationId xmlns:a16="http://schemas.microsoft.com/office/drawing/2014/main" id="{477B9ED8-44B0-4265-25F1-A250EB1ADC75}"/>
+              </a:ext>
+            </a:extLst>
+          </p:cNvPr>
+          <p:cNvCxnSpPr>
+            <a:cxnSpLocks/>
+          </p:cNvCxnSpPr>
+          <p:nvPr/>
+        </p:nvCxnSpPr>
+        <p:spPr>
+          <a:xfrm flipV="1">
+            <a:off x="869839" y="1824112"/>
+            <a:ext cx="1055832" cy="856761"/>
+          </a:xfrm>
+          <a:prstGeom prst="line">
+            <a:avLst/>
+          </a:prstGeom>
+          <a:ln w="57150">
+            <a:solidFill>
+              <a:schemeClr val="accent5">
+                <a:lumMod val="60000"/>
+                <a:lumOff val="40000"/>
+              </a:schemeClr>
+            </a:solidFill>
+          </a:ln>
+        </p:spPr>
+        <p:style>
+          <a:lnRef idx="2">
+            <a:schemeClr val="dk1"/>
+          </a:lnRef>
+          <a:fillRef idx="0">
+            <a:schemeClr val="dk1"/>
+          </a:fillRef>
+          <a:effectRef idx="1">
+            <a:schemeClr val="dk1"/>
+          </a:effectRef>
+          <a:fontRef idx="minor">
+            <a:schemeClr val="tx1"/>
+          </a:fontRef>
+        </p:style>
+      </p:cxnSp>
+      <p:cxnSp>
+        <p:nvCxnSpPr>
+          <p:cNvPr id="87" name="Straight Connector 86">
+            <a:extLst>
+              <a:ext uri="{FF2B5EF4-FFF2-40B4-BE49-F238E27FC236}">
+                <a16:creationId xmlns:a16="http://schemas.microsoft.com/office/drawing/2014/main" id="{5C29AAF3-0D32-8AA0-82FC-FACE841E700F}"/>
+              </a:ext>
+            </a:extLst>
+          </p:cNvPr>
+          <p:cNvCxnSpPr>
+            <a:cxnSpLocks/>
+          </p:cNvCxnSpPr>
+          <p:nvPr/>
+        </p:nvCxnSpPr>
+        <p:spPr>
+          <a:xfrm flipH="1" flipV="1">
+            <a:off x="1900147" y="1829088"/>
+            <a:ext cx="1034204" cy="126756"/>
+          </a:xfrm>
+          <a:prstGeom prst="line">
+            <a:avLst/>
+          </a:prstGeom>
+          <a:ln w="57150">
+            <a:solidFill>
+              <a:schemeClr val="accent5">
+                <a:lumMod val="60000"/>
+                <a:lumOff val="40000"/>
+              </a:schemeClr>
+            </a:solidFill>
+          </a:ln>
+        </p:spPr>
+        <p:style>
+          <a:lnRef idx="2">
+            <a:schemeClr val="dk1"/>
+          </a:lnRef>
+          <a:fillRef idx="0">
+            <a:schemeClr val="dk1"/>
+          </a:fillRef>
+          <a:effectRef idx="1">
+            <a:schemeClr val="dk1"/>
+          </a:effectRef>
+          <a:fontRef idx="minor">
+            <a:schemeClr val="tx1"/>
+          </a:fontRef>
+        </p:style>
+      </p:cxnSp>
+      <p:cxnSp>
+        <p:nvCxnSpPr>
+          <p:cNvPr id="88" name="Straight Connector 87">
+            <a:extLst>
+              <a:ext uri="{FF2B5EF4-FFF2-40B4-BE49-F238E27FC236}">
+                <a16:creationId xmlns:a16="http://schemas.microsoft.com/office/drawing/2014/main" id="{D5A40400-6D20-66D0-9142-13437333C576}"/>
+              </a:ext>
+            </a:extLst>
+          </p:cNvPr>
+          <p:cNvCxnSpPr>
+            <a:cxnSpLocks/>
+          </p:cNvCxnSpPr>
+          <p:nvPr/>
+        </p:nvCxnSpPr>
+        <p:spPr>
+          <a:xfrm flipV="1">
+            <a:off x="2910059" y="952467"/>
+            <a:ext cx="1183809" cy="1023959"/>
+          </a:xfrm>
+          <a:prstGeom prst="line">
+            <a:avLst/>
+          </a:prstGeom>
+          <a:ln w="57150">
+            <a:solidFill>
+              <a:schemeClr val="accent5">
+                <a:lumMod val="60000"/>
+                <a:lumOff val="40000"/>
+              </a:schemeClr>
+            </a:solidFill>
+          </a:ln>
+        </p:spPr>
+        <p:style>
+          <a:lnRef idx="2">
+            <a:schemeClr val="dk1"/>
+          </a:lnRef>
+          <a:fillRef idx="0">
+            <a:schemeClr val="dk1"/>
+          </a:fillRef>
+          <a:effectRef idx="1">
+            <a:schemeClr val="dk1"/>
+          </a:effectRef>
+          <a:fontRef idx="minor">
+            <a:schemeClr val="tx1"/>
+          </a:fontRef>
+        </p:style>
+      </p:cxnSp>
+      <p:cxnSp>
+        <p:nvCxnSpPr>
+          <p:cNvPr id="104" name="Straight Connector 103">
+            <a:extLst>
+              <a:ext uri="{FF2B5EF4-FFF2-40B4-BE49-F238E27FC236}">
+                <a16:creationId xmlns:a16="http://schemas.microsoft.com/office/drawing/2014/main" id="{86E4885C-3E60-F840-B0E8-97E9C170B90C}"/>
+              </a:ext>
+            </a:extLst>
+          </p:cNvPr>
+          <p:cNvCxnSpPr>
+            <a:cxnSpLocks/>
+          </p:cNvCxnSpPr>
+          <p:nvPr/>
+        </p:nvCxnSpPr>
+        <p:spPr>
+          <a:xfrm flipV="1">
+            <a:off x="888085" y="2088273"/>
+            <a:ext cx="1208843" cy="592600"/>
+          </a:xfrm>
+          <a:prstGeom prst="line">
+            <a:avLst/>
+          </a:prstGeom>
+          <a:ln w="57150">
+            <a:solidFill>
+              <a:schemeClr val="accent3">
+                <a:lumMod val="60000"/>
+                <a:lumOff val="40000"/>
+              </a:schemeClr>
+            </a:solidFill>
+          </a:ln>
+        </p:spPr>
+        <p:style>
+          <a:lnRef idx="2">
+            <a:schemeClr val="dk1"/>
+          </a:lnRef>
+          <a:fillRef idx="0">
+            <a:schemeClr val="dk1"/>
+          </a:fillRef>
+          <a:effectRef idx="1">
+            <a:schemeClr val="dk1"/>
+          </a:effectRef>
+          <a:fontRef idx="minor">
+            <a:schemeClr val="tx1"/>
+          </a:fontRef>
+        </p:style>
+      </p:cxnSp>
+      <p:cxnSp>
+        <p:nvCxnSpPr>
+          <p:cNvPr id="105" name="Straight Connector 104">
+            <a:extLst>
+              <a:ext uri="{FF2B5EF4-FFF2-40B4-BE49-F238E27FC236}">
+                <a16:creationId xmlns:a16="http://schemas.microsoft.com/office/drawing/2014/main" id="{0D283514-23C6-7A17-043B-FF7B8430C4F5}"/>
+              </a:ext>
+            </a:extLst>
+          </p:cNvPr>
+          <p:cNvCxnSpPr>
+            <a:cxnSpLocks/>
+          </p:cNvCxnSpPr>
+          <p:nvPr/>
+        </p:nvCxnSpPr>
+        <p:spPr>
+          <a:xfrm flipH="1" flipV="1">
+            <a:off x="2091034" y="2090182"/>
+            <a:ext cx="1034204" cy="126756"/>
+          </a:xfrm>
+          <a:prstGeom prst="line">
+            <a:avLst/>
+          </a:prstGeom>
+          <a:ln w="57150">
+            <a:solidFill>
+              <a:schemeClr val="accent3">
+                <a:lumMod val="60000"/>
+                <a:lumOff val="40000"/>
+              </a:schemeClr>
+            </a:solidFill>
+          </a:ln>
+        </p:spPr>
+        <p:style>
+          <a:lnRef idx="2">
+            <a:schemeClr val="dk1"/>
+          </a:lnRef>
+          <a:fillRef idx="0">
+            <a:schemeClr val="dk1"/>
+          </a:fillRef>
+          <a:effectRef idx="1">
+            <a:schemeClr val="dk1"/>
+          </a:effectRef>
+          <a:fontRef idx="minor">
+            <a:schemeClr val="tx1"/>
+          </a:fontRef>
+        </p:style>
+      </p:cxnSp>
+      <p:cxnSp>
+        <p:nvCxnSpPr>
+          <p:cNvPr id="106" name="Straight Connector 105">
+            <a:extLst>
+              <a:ext uri="{FF2B5EF4-FFF2-40B4-BE49-F238E27FC236}">
+                <a16:creationId xmlns:a16="http://schemas.microsoft.com/office/drawing/2014/main" id="{6CF98749-500B-9443-5D7B-C08952C2573A}"/>
+              </a:ext>
+            </a:extLst>
+          </p:cNvPr>
+          <p:cNvCxnSpPr>
+            <a:cxnSpLocks/>
+          </p:cNvCxnSpPr>
+          <p:nvPr/>
+        </p:nvCxnSpPr>
+        <p:spPr>
+          <a:xfrm flipV="1">
+            <a:off x="3116059" y="1081996"/>
+            <a:ext cx="1135350" cy="1126730"/>
+          </a:xfrm>
+          <a:prstGeom prst="line">
+            <a:avLst/>
+          </a:prstGeom>
+          <a:ln w="57150">
+            <a:solidFill>
+              <a:schemeClr val="accent3">
+                <a:lumMod val="60000"/>
+                <a:lumOff val="40000"/>
+              </a:schemeClr>
+            </a:solidFill>
+          </a:ln>
+        </p:spPr>
+        <p:style>
+          <a:lnRef idx="2">
+            <a:schemeClr val="dk1"/>
+          </a:lnRef>
+          <a:fillRef idx="0">
+            <a:schemeClr val="dk1"/>
+          </a:fillRef>
+          <a:effectRef idx="1">
+            <a:schemeClr val="dk1"/>
+          </a:effectRef>
+          <a:fontRef idx="minor">
+            <a:schemeClr val="tx1"/>
+          </a:fontRef>
+        </p:style>
+      </p:cxnSp>
+      <p:cxnSp>
+        <p:nvCxnSpPr>
+          <p:cNvPr id="110" name="Straight Connector 109">
+            <a:extLst>
+              <a:ext uri="{FF2B5EF4-FFF2-40B4-BE49-F238E27FC236}">
+                <a16:creationId xmlns:a16="http://schemas.microsoft.com/office/drawing/2014/main" id="{C499ED20-E52A-F5DE-3362-A3C54315A994}"/>
+              </a:ext>
+            </a:extLst>
+          </p:cNvPr>
+          <p:cNvCxnSpPr>
+            <a:cxnSpLocks/>
+          </p:cNvCxnSpPr>
+          <p:nvPr/>
+        </p:nvCxnSpPr>
+        <p:spPr>
+          <a:xfrm flipV="1">
+            <a:off x="888085" y="2413138"/>
+            <a:ext cx="1592958" cy="274756"/>
+          </a:xfrm>
+          <a:prstGeom prst="line">
+            <a:avLst/>
+          </a:prstGeom>
+          <a:ln w="57150">
+            <a:solidFill>
+              <a:schemeClr val="accent2">
+                <a:lumMod val="75000"/>
+              </a:schemeClr>
+            </a:solidFill>
+          </a:ln>
+        </p:spPr>
+        <p:style>
+          <a:lnRef idx="2">
+            <a:schemeClr val="dk1"/>
+          </a:lnRef>
+          <a:fillRef idx="0">
+            <a:schemeClr val="dk1"/>
+          </a:fillRef>
+          <a:effectRef idx="1">
+            <a:schemeClr val="dk1"/>
+          </a:effectRef>
+          <a:fontRef idx="minor">
+            <a:schemeClr val="tx1"/>
+          </a:fontRef>
+        </p:style>
+      </p:cxnSp>
+      <p:cxnSp>
+        <p:nvCxnSpPr>
+          <p:cNvPr id="111" name="Straight Connector 110">
+            <a:extLst>
+              <a:ext uri="{FF2B5EF4-FFF2-40B4-BE49-F238E27FC236}">
+                <a16:creationId xmlns:a16="http://schemas.microsoft.com/office/drawing/2014/main" id="{AAD7C02A-86E4-7A4B-C4B0-DE3681BADE34}"/>
+              </a:ext>
+            </a:extLst>
+          </p:cNvPr>
+          <p:cNvCxnSpPr>
+            <a:cxnSpLocks/>
+          </p:cNvCxnSpPr>
+          <p:nvPr/>
+        </p:nvCxnSpPr>
+        <p:spPr>
+          <a:xfrm flipH="1" flipV="1">
+            <a:off x="2447501" y="2408423"/>
+            <a:ext cx="1034204" cy="126756"/>
+          </a:xfrm>
+          <a:prstGeom prst="line">
+            <a:avLst/>
+          </a:prstGeom>
+          <a:ln w="57150">
+            <a:solidFill>
+              <a:schemeClr val="accent2">
+                <a:lumMod val="75000"/>
+              </a:schemeClr>
+            </a:solidFill>
+          </a:ln>
+        </p:spPr>
+        <p:style>
+          <a:lnRef idx="2">
+            <a:schemeClr val="dk1"/>
+          </a:lnRef>
+          <a:fillRef idx="0">
+            <a:schemeClr val="dk1"/>
+          </a:fillRef>
+          <a:effectRef idx="1">
+            <a:schemeClr val="dk1"/>
+          </a:effectRef>
+          <a:fontRef idx="minor">
+            <a:schemeClr val="tx1"/>
+          </a:fontRef>
+        </p:style>
+      </p:cxnSp>
+      <p:cxnSp>
+        <p:nvCxnSpPr>
+          <p:cNvPr id="112" name="Straight Connector 111">
+            <a:extLst>
+              <a:ext uri="{FF2B5EF4-FFF2-40B4-BE49-F238E27FC236}">
+                <a16:creationId xmlns:a16="http://schemas.microsoft.com/office/drawing/2014/main" id="{6958868B-200A-5B87-5714-4BA0FD591748}"/>
+              </a:ext>
+            </a:extLst>
+          </p:cNvPr>
+          <p:cNvCxnSpPr>
+            <a:cxnSpLocks/>
+          </p:cNvCxnSpPr>
+          <p:nvPr/>
+        </p:nvCxnSpPr>
+        <p:spPr>
+          <a:xfrm flipV="1">
+            <a:off x="3458065" y="1526557"/>
+            <a:ext cx="1183809" cy="1023959"/>
+          </a:xfrm>
+          <a:prstGeom prst="line">
+            <a:avLst/>
+          </a:prstGeom>
+          <a:ln w="57150">
+            <a:solidFill>
+              <a:schemeClr val="accent2">
+                <a:lumMod val="75000"/>
+              </a:schemeClr>
+            </a:solidFill>
+          </a:ln>
+        </p:spPr>
+        <p:style>
+          <a:lnRef idx="2">
+            <a:schemeClr val="dk1"/>
+          </a:lnRef>
+          <a:fillRef idx="0">
+            <a:schemeClr val="dk1"/>
+          </a:fillRef>
+          <a:effectRef idx="1">
+            <a:schemeClr val="dk1"/>
+          </a:effectRef>
+          <a:fontRef idx="minor">
+            <a:schemeClr val="tx1"/>
+          </a:fontRef>
+        </p:style>
+      </p:cxnSp>
+    </p:spTree>
+    <p:extLst>
+      <p:ext uri="{BB962C8B-B14F-4D97-AF65-F5344CB8AC3E}">
+        <p14:creationId xmlns:p14="http://schemas.microsoft.com/office/powerpoint/2010/main" val="2472339375"/>
+      </p:ext>
+    </p:extLst>
+  </p:cSld>
+  <p:clrMapOvr>
+    <a:masterClrMapping/>
+  </p:clrMapOvr>
+</p:sld>
+</file>
+
+<file path=ppt/slides/slide4.xml><?xml version="1.0" encoding="utf-8"?>
+<p:sld xmlns:a="http://schemas.openxmlformats.org/drawingml/2006/main" xmlns:r="http://schemas.openxmlformats.org/officeDocument/2006/relationships" xmlns:p="http://schemas.openxmlformats.org/presentationml/2006/main">
+  <p:cSld>
+    <p:spTree>
+      <p:nvGrpSpPr>
+        <p:cNvPr id="1" name="">
+          <a:extLst>
+            <a:ext uri="{FF2B5EF4-FFF2-40B4-BE49-F238E27FC236}">
+              <a16:creationId xmlns:a16="http://schemas.microsoft.com/office/drawing/2014/main" id="{66CE6B80-4DAF-450A-9326-FEC2D7A185C8}"/>
+            </a:ext>
+          </a:extLst>
+        </p:cNvPr>
+        <p:cNvGrpSpPr/>
+        <p:nvPr/>
+      </p:nvGrpSpPr>
+      <p:grpSpPr>
+        <a:xfrm>
+          <a:off x="0" y="0"/>
+          <a:ext cx="0" cy="0"/>
+          <a:chOff x="0" y="0"/>
+          <a:chExt cx="0" cy="0"/>
+        </a:xfrm>
+      </p:grpSpPr>
+      <p:grpSp>
+        <p:nvGrpSpPr>
+          <p:cNvPr id="8" name="Group 7">
+            <a:extLst>
+              <a:ext uri="{FF2B5EF4-FFF2-40B4-BE49-F238E27FC236}">
+                <a16:creationId xmlns:a16="http://schemas.microsoft.com/office/drawing/2014/main" id="{FFF93C70-0155-2ECF-C437-90B0E68D5A3A}"/>
+              </a:ext>
+            </a:extLst>
+          </p:cNvPr>
+          <p:cNvGrpSpPr/>
+          <p:nvPr/>
+        </p:nvGrpSpPr>
+        <p:grpSpPr>
+          <a:xfrm>
+            <a:off x="935421" y="1608083"/>
+            <a:ext cx="3962400" cy="2627586"/>
+            <a:chOff x="935421" y="1608083"/>
+            <a:chExt cx="3962400" cy="2627586"/>
+          </a:xfrm>
+        </p:grpSpPr>
+        <p:grpSp>
+          <p:nvGrpSpPr>
+            <p:cNvPr id="79" name="Group 78">
+              <a:extLst>
+                <a:ext uri="{FF2B5EF4-FFF2-40B4-BE49-F238E27FC236}">
+                  <a16:creationId xmlns:a16="http://schemas.microsoft.com/office/drawing/2014/main" id="{80D967F5-1833-BFB0-2DD7-0BC9F3D99CDB}"/>
+                </a:ext>
+              </a:extLst>
+            </p:cNvPr>
+            <p:cNvGrpSpPr/>
+            <p:nvPr/>
+          </p:nvGrpSpPr>
+          <p:grpSpPr>
+            <a:xfrm>
+              <a:off x="935421" y="1608083"/>
+              <a:ext cx="3962400" cy="2627586"/>
+              <a:chOff x="935421" y="1608083"/>
+              <a:chExt cx="3962400" cy="2627586"/>
+            </a:xfrm>
+          </p:grpSpPr>
+          <p:grpSp>
+            <p:nvGrpSpPr>
+              <p:cNvPr id="67" name="Group 66">
+                <a:extLst>
+                  <a:ext uri="{FF2B5EF4-FFF2-40B4-BE49-F238E27FC236}">
+                    <a16:creationId xmlns:a16="http://schemas.microsoft.com/office/drawing/2014/main" id="{6154E40E-73FB-47AC-3602-6F23A3882500}"/>
+                  </a:ext>
+                </a:extLst>
+              </p:cNvPr>
+              <p:cNvGrpSpPr/>
+              <p:nvPr/>
+            </p:nvGrpSpPr>
+            <p:grpSpPr>
+              <a:xfrm>
+                <a:off x="935421" y="1608083"/>
+                <a:ext cx="3962400" cy="2627586"/>
+                <a:chOff x="935421" y="1608083"/>
+                <a:chExt cx="3962400" cy="2627586"/>
+              </a:xfrm>
+            </p:grpSpPr>
+            <p:cxnSp>
+              <p:nvCxnSpPr>
+                <p:cNvPr id="9" name="Straight Connector 8">
+                  <a:extLst>
+                    <a:ext uri="{FF2B5EF4-FFF2-40B4-BE49-F238E27FC236}">
+                      <a16:creationId xmlns:a16="http://schemas.microsoft.com/office/drawing/2014/main" id="{3E5A4D9D-FCD6-9F5D-6B44-3DA45FBBD5E6}"/>
+                    </a:ext>
+                  </a:extLst>
+                </p:cNvPr>
+                <p:cNvCxnSpPr>
+                  <a:cxnSpLocks/>
+                </p:cNvCxnSpPr>
+                <p:nvPr/>
+              </p:nvCxnSpPr>
+              <p:spPr>
+                <a:xfrm>
+                  <a:off x="935421" y="4214649"/>
+                  <a:ext cx="3962400" cy="0"/>
+                </a:xfrm>
+                <a:prstGeom prst="line">
+                  <a:avLst/>
+                </a:prstGeom>
+                <a:ln w="76200"/>
+              </p:spPr>
+              <p:style>
+                <a:lnRef idx="2">
+                  <a:schemeClr val="dk1"/>
+                </a:lnRef>
+                <a:fillRef idx="0">
+                  <a:schemeClr val="dk1"/>
+                </a:fillRef>
+                <a:effectRef idx="1">
+                  <a:schemeClr val="dk1"/>
+                </a:effectRef>
+                <a:fontRef idx="minor">
+                  <a:schemeClr val="tx1"/>
+                </a:fontRef>
+              </p:style>
+            </p:cxnSp>
+            <p:cxnSp>
+              <p:nvCxnSpPr>
+                <p:cNvPr id="10" name="Straight Connector 9">
+                  <a:extLst>
+                    <a:ext uri="{FF2B5EF4-FFF2-40B4-BE49-F238E27FC236}">
+                      <a16:creationId xmlns:a16="http://schemas.microsoft.com/office/drawing/2014/main" id="{01E512A2-6C54-DF6A-9D13-8FA9A39312B1}"/>
+                    </a:ext>
+                  </a:extLst>
+                </p:cNvPr>
+                <p:cNvCxnSpPr>
+                  <a:cxnSpLocks/>
+                </p:cNvCxnSpPr>
+                <p:nvPr/>
+              </p:nvCxnSpPr>
+              <p:spPr>
+                <a:xfrm flipV="1">
+                  <a:off x="940676" y="1608083"/>
+                  <a:ext cx="0" cy="2627586"/>
+                </a:xfrm>
+                <a:prstGeom prst="line">
+                  <a:avLst/>
+                </a:prstGeom>
+                <a:ln w="76200"/>
+              </p:spPr>
+              <p:style>
+                <a:lnRef idx="2">
+                  <a:schemeClr val="dk1"/>
+                </a:lnRef>
+                <a:fillRef idx="0">
+                  <a:schemeClr val="dk1"/>
+                </a:fillRef>
+                <a:effectRef idx="1">
+                  <a:schemeClr val="dk1"/>
+                </a:effectRef>
+                <a:fontRef idx="minor">
+                  <a:schemeClr val="tx1"/>
+                </a:fontRef>
+              </p:style>
+            </p:cxnSp>
+          </p:grpSp>
+          <p:sp>
+            <p:nvSpPr>
+              <p:cNvPr id="37" name="Oval 36">
+                <a:extLst>
+                  <a:ext uri="{FF2B5EF4-FFF2-40B4-BE49-F238E27FC236}">
+                    <a16:creationId xmlns:a16="http://schemas.microsoft.com/office/drawing/2014/main" id="{798835D4-6B1C-2748-E144-2FC285D3C2A7}"/>
+                  </a:ext>
+                </a:extLst>
+              </p:cNvPr>
+              <p:cNvSpPr/>
+              <p:nvPr/>
+            </p:nvSpPr>
+            <p:spPr>
+              <a:xfrm>
+                <a:off x="4110664" y="2893113"/>
+                <a:ext cx="394160" cy="394160"/>
+              </a:xfrm>
+              <a:prstGeom prst="ellipse">
+                <a:avLst/>
+              </a:prstGeom>
+              <a:solidFill>
+                <a:schemeClr val="tx2">
+                  <a:lumMod val="50000"/>
+                  <a:lumOff val="50000"/>
+                </a:schemeClr>
+              </a:solidFill>
+            </p:spPr>
+            <p:style>
+              <a:lnRef idx="2">
+                <a:schemeClr val="accent1">
+                  <a:shade val="15000"/>
+                </a:schemeClr>
+              </a:lnRef>
+              <a:fillRef idx="1">
+                <a:schemeClr val="accent1"/>
+              </a:fillRef>
+              <a:effectRef idx="0">
+                <a:schemeClr val="accent1"/>
+              </a:effectRef>
+              <a:fontRef idx="minor">
+                <a:schemeClr val="lt1"/>
+              </a:fontRef>
+            </p:style>
+            <p:txBody>
+              <a:bodyPr rtlCol="0" anchor="ctr"/>
+              <a:lstStyle/>
+              <a:p>
+                <a:pPr algn="ctr"/>
+                <a:endParaRPr lang="en-US"/>
+              </a:p>
+            </p:txBody>
+          </p:sp>
+          <p:sp>
+            <p:nvSpPr>
+              <p:cNvPr id="39" name="Oval 38">
+                <a:extLst>
+                  <a:ext uri="{FF2B5EF4-FFF2-40B4-BE49-F238E27FC236}">
+                    <a16:creationId xmlns:a16="http://schemas.microsoft.com/office/drawing/2014/main" id="{15030FFE-90DC-A468-342A-F43A0D1B64F2}"/>
+                  </a:ext>
+                </a:extLst>
+              </p:cNvPr>
+              <p:cNvSpPr/>
+              <p:nvPr/>
+            </p:nvSpPr>
+            <p:spPr>
+              <a:xfrm>
+                <a:off x="3756900" y="3387146"/>
+                <a:ext cx="394160" cy="394160"/>
+              </a:xfrm>
+              <a:prstGeom prst="ellipse">
+                <a:avLst/>
+              </a:prstGeom>
+              <a:solidFill>
+                <a:schemeClr val="tx2">
+                  <a:lumMod val="50000"/>
+                  <a:lumOff val="50000"/>
+                </a:schemeClr>
+              </a:solidFill>
+            </p:spPr>
+            <p:style>
+              <a:lnRef idx="2">
+                <a:schemeClr val="accent1">
+                  <a:shade val="15000"/>
+                </a:schemeClr>
+              </a:lnRef>
+              <a:fillRef idx="1">
+                <a:schemeClr val="accent1"/>
+              </a:fillRef>
+              <a:effectRef idx="0">
+                <a:schemeClr val="accent1"/>
+              </a:effectRef>
+              <a:fontRef idx="minor">
+                <a:schemeClr val="lt1"/>
+              </a:fontRef>
+            </p:style>
+            <p:txBody>
+              <a:bodyPr rtlCol="0" anchor="ctr"/>
+              <a:lstStyle/>
+              <a:p>
+                <a:pPr algn="ctr"/>
+                <a:endParaRPr lang="en-US"/>
+              </a:p>
+            </p:txBody>
+          </p:sp>
+          <p:sp>
+            <p:nvSpPr>
+              <p:cNvPr id="40" name="Oval 39">
+                <a:extLst>
+                  <a:ext uri="{FF2B5EF4-FFF2-40B4-BE49-F238E27FC236}">
+                    <a16:creationId xmlns:a16="http://schemas.microsoft.com/office/drawing/2014/main" id="{F0709A34-3A69-1217-F0BE-C368D19FA838}"/>
+                  </a:ext>
+                </a:extLst>
+              </p:cNvPr>
+              <p:cNvSpPr/>
+              <p:nvPr/>
+            </p:nvSpPr>
+            <p:spPr>
+              <a:xfrm>
+                <a:off x="1742627" y="3374398"/>
+                <a:ext cx="394160" cy="394160"/>
+              </a:xfrm>
+              <a:prstGeom prst="ellipse">
+                <a:avLst/>
+              </a:prstGeom>
+              <a:solidFill>
+                <a:schemeClr val="tx2">
+                  <a:lumMod val="50000"/>
+                  <a:lumOff val="50000"/>
+                </a:schemeClr>
+              </a:solidFill>
+            </p:spPr>
+            <p:style>
+              <a:lnRef idx="2">
+                <a:schemeClr val="accent1">
+                  <a:shade val="15000"/>
+                </a:schemeClr>
+              </a:lnRef>
+              <a:fillRef idx="1">
+                <a:schemeClr val="accent1"/>
+              </a:fillRef>
+              <a:effectRef idx="0">
+                <a:schemeClr val="accent1"/>
+              </a:effectRef>
+              <a:fontRef idx="minor">
+                <a:schemeClr val="lt1"/>
+              </a:fontRef>
+            </p:style>
+            <p:txBody>
+              <a:bodyPr rtlCol="0" anchor="ctr"/>
+              <a:lstStyle/>
+              <a:p>
+                <a:pPr algn="ctr"/>
+                <a:endParaRPr lang="en-US"/>
+              </a:p>
+            </p:txBody>
+          </p:sp>
+          <p:sp>
+            <p:nvSpPr>
+              <p:cNvPr id="47" name="Oval 46">
+                <a:extLst>
+                  <a:ext uri="{FF2B5EF4-FFF2-40B4-BE49-F238E27FC236}">
+                    <a16:creationId xmlns:a16="http://schemas.microsoft.com/office/drawing/2014/main" id="{E4197155-F22A-B557-86E5-0E6451A06B56}"/>
+                  </a:ext>
+                </a:extLst>
+              </p:cNvPr>
+              <p:cNvSpPr/>
+              <p:nvPr/>
+            </p:nvSpPr>
+            <p:spPr>
+              <a:xfrm>
+                <a:off x="2347278" y="3108600"/>
+                <a:ext cx="394160" cy="394160"/>
+              </a:xfrm>
+              <a:prstGeom prst="ellipse">
+                <a:avLst/>
+              </a:prstGeom>
+              <a:solidFill>
+                <a:schemeClr val="tx2">
+                  <a:lumMod val="50000"/>
+                  <a:lumOff val="50000"/>
+                </a:schemeClr>
+              </a:solidFill>
+            </p:spPr>
+            <p:style>
+              <a:lnRef idx="2">
+                <a:schemeClr val="accent1">
+                  <a:shade val="15000"/>
+                </a:schemeClr>
+              </a:lnRef>
+              <a:fillRef idx="1">
+                <a:schemeClr val="accent1"/>
+              </a:fillRef>
+              <a:effectRef idx="0">
+                <a:schemeClr val="accent1"/>
+              </a:effectRef>
+              <a:fontRef idx="minor">
+                <a:schemeClr val="lt1"/>
+              </a:fontRef>
+            </p:style>
+            <p:txBody>
+              <a:bodyPr rtlCol="0" anchor="ctr"/>
+              <a:lstStyle/>
+              <a:p>
+                <a:pPr algn="ctr"/>
+                <a:endParaRPr lang="en-US"/>
+              </a:p>
+            </p:txBody>
+          </p:sp>
+          <p:sp>
+            <p:nvSpPr>
+              <p:cNvPr id="65" name="Oval 64">
+                <a:extLst>
+                  <a:ext uri="{FF2B5EF4-FFF2-40B4-BE49-F238E27FC236}">
+                    <a16:creationId xmlns:a16="http://schemas.microsoft.com/office/drawing/2014/main" id="{3B547674-9359-B8F4-7FB2-B768DB3317BB}"/>
+                  </a:ext>
+                </a:extLst>
+              </p:cNvPr>
+              <p:cNvSpPr/>
+              <p:nvPr/>
+            </p:nvSpPr>
+            <p:spPr>
+              <a:xfrm>
+                <a:off x="2278686" y="3696969"/>
+                <a:ext cx="394160" cy="394160"/>
+              </a:xfrm>
+              <a:prstGeom prst="ellipse">
+                <a:avLst/>
+              </a:prstGeom>
+              <a:solidFill>
+                <a:schemeClr val="tx2">
+                  <a:lumMod val="50000"/>
+                  <a:lumOff val="50000"/>
+                </a:schemeClr>
+              </a:solidFill>
+            </p:spPr>
+            <p:style>
+              <a:lnRef idx="2">
+                <a:schemeClr val="accent1">
+                  <a:shade val="15000"/>
+                </a:schemeClr>
+              </a:lnRef>
+              <a:fillRef idx="1">
+                <a:schemeClr val="accent1"/>
+              </a:fillRef>
+              <a:effectRef idx="0">
+                <a:schemeClr val="accent1"/>
+              </a:effectRef>
+              <a:fontRef idx="minor">
+                <a:schemeClr val="lt1"/>
+              </a:fontRef>
+            </p:style>
+            <p:txBody>
+              <a:bodyPr rtlCol="0" anchor="ctr"/>
+              <a:lstStyle/>
+              <a:p>
+                <a:pPr algn="ctr"/>
+                <a:endParaRPr lang="en-US"/>
+              </a:p>
+            </p:txBody>
+          </p:sp>
+          <p:sp>
+            <p:nvSpPr>
+              <p:cNvPr id="68" name="Oval 67">
+                <a:extLst>
+                  <a:ext uri="{FF2B5EF4-FFF2-40B4-BE49-F238E27FC236}">
+                    <a16:creationId xmlns:a16="http://schemas.microsoft.com/office/drawing/2014/main" id="{AAB54A7C-39FC-F4CB-21AA-05314558E5DA}"/>
+                  </a:ext>
+                </a:extLst>
+              </p:cNvPr>
+              <p:cNvSpPr/>
+              <p:nvPr/>
+            </p:nvSpPr>
+            <p:spPr>
+              <a:xfrm>
+                <a:off x="1600728" y="3603818"/>
+                <a:ext cx="394160" cy="394160"/>
+              </a:xfrm>
+              <a:prstGeom prst="ellipse">
+                <a:avLst/>
+              </a:prstGeom>
+              <a:solidFill>
+                <a:schemeClr val="tx2">
+                  <a:lumMod val="50000"/>
+                  <a:lumOff val="50000"/>
+                </a:schemeClr>
+              </a:solidFill>
+            </p:spPr>
+            <p:style>
+              <a:lnRef idx="2">
+                <a:schemeClr val="accent1">
+                  <a:shade val="15000"/>
+                </a:schemeClr>
+              </a:lnRef>
+              <a:fillRef idx="1">
+                <a:schemeClr val="accent1"/>
+              </a:fillRef>
+              <a:effectRef idx="0">
+                <a:schemeClr val="accent1"/>
+              </a:effectRef>
+              <a:fontRef idx="minor">
+                <a:schemeClr val="lt1"/>
+              </a:fontRef>
+            </p:style>
+            <p:txBody>
+              <a:bodyPr rtlCol="0" anchor="ctr"/>
+              <a:lstStyle/>
+              <a:p>
+                <a:pPr algn="ctr"/>
+                <a:endParaRPr lang="en-US"/>
+              </a:p>
+            </p:txBody>
+          </p:sp>
+          <p:sp>
+            <p:nvSpPr>
+              <p:cNvPr id="69" name="Oval 68">
+                <a:extLst>
+                  <a:ext uri="{FF2B5EF4-FFF2-40B4-BE49-F238E27FC236}">
+                    <a16:creationId xmlns:a16="http://schemas.microsoft.com/office/drawing/2014/main" id="{5E02A24D-F9AC-A8E1-4211-93366023C740}"/>
+                  </a:ext>
+                </a:extLst>
+              </p:cNvPr>
+              <p:cNvSpPr/>
+              <p:nvPr/>
+            </p:nvSpPr>
+            <p:spPr>
+              <a:xfrm>
+                <a:off x="4133542" y="1655734"/>
+                <a:ext cx="394160" cy="394160"/>
+              </a:xfrm>
+              <a:prstGeom prst="ellipse">
+                <a:avLst/>
+              </a:prstGeom>
+              <a:solidFill>
+                <a:schemeClr val="tx2">
+                  <a:lumMod val="50000"/>
+                  <a:lumOff val="50000"/>
+                </a:schemeClr>
+              </a:solidFill>
+            </p:spPr>
+            <p:style>
+              <a:lnRef idx="2">
+                <a:schemeClr val="accent1">
+                  <a:shade val="15000"/>
+                </a:schemeClr>
+              </a:lnRef>
+              <a:fillRef idx="1">
+                <a:schemeClr val="accent1"/>
+              </a:fillRef>
+              <a:effectRef idx="0">
+                <a:schemeClr val="accent1"/>
+              </a:effectRef>
+              <a:fontRef idx="minor">
+                <a:schemeClr val="lt1"/>
+              </a:fontRef>
+            </p:style>
+            <p:txBody>
+              <a:bodyPr rtlCol="0" anchor="ctr"/>
+              <a:lstStyle/>
+              <a:p>
+                <a:pPr algn="ctr"/>
+                <a:endParaRPr lang="en-US"/>
+              </a:p>
+            </p:txBody>
+          </p:sp>
+          <p:sp>
+            <p:nvSpPr>
+              <p:cNvPr id="70" name="Oval 69">
+                <a:extLst>
+                  <a:ext uri="{FF2B5EF4-FFF2-40B4-BE49-F238E27FC236}">
+                    <a16:creationId xmlns:a16="http://schemas.microsoft.com/office/drawing/2014/main" id="{4D700433-98A0-5888-19E9-0681907DD709}"/>
+                  </a:ext>
+                </a:extLst>
+              </p:cNvPr>
+              <p:cNvSpPr/>
+              <p:nvPr/>
+            </p:nvSpPr>
+            <p:spPr>
+              <a:xfrm>
+                <a:off x="3750790" y="2568666"/>
+                <a:ext cx="394160" cy="394160"/>
+              </a:xfrm>
+              <a:prstGeom prst="ellipse">
+                <a:avLst/>
+              </a:prstGeom>
+              <a:solidFill>
+                <a:schemeClr val="tx2">
+                  <a:lumMod val="50000"/>
+                  <a:lumOff val="50000"/>
+                </a:schemeClr>
+              </a:solidFill>
+            </p:spPr>
+            <p:style>
+              <a:lnRef idx="2">
+                <a:schemeClr val="accent1">
+                  <a:shade val="15000"/>
+                </a:schemeClr>
+              </a:lnRef>
+              <a:fillRef idx="1">
+                <a:schemeClr val="accent1"/>
+              </a:fillRef>
+              <a:effectRef idx="0">
+                <a:schemeClr val="accent1"/>
+              </a:effectRef>
+              <a:fontRef idx="minor">
+                <a:schemeClr val="lt1"/>
+              </a:fontRef>
+            </p:style>
+            <p:txBody>
+              <a:bodyPr rtlCol="0" anchor="ctr"/>
+              <a:lstStyle/>
+              <a:p>
+                <a:pPr algn="ctr"/>
+                <a:endParaRPr lang="en-US"/>
+              </a:p>
+            </p:txBody>
+          </p:sp>
+          <p:sp>
+            <p:nvSpPr>
+              <p:cNvPr id="71" name="Oval 70">
+                <a:extLst>
+                  <a:ext uri="{FF2B5EF4-FFF2-40B4-BE49-F238E27FC236}">
+                    <a16:creationId xmlns:a16="http://schemas.microsoft.com/office/drawing/2014/main" id="{71E27B67-FD11-03B7-7C1F-7855C03CA6D2}"/>
+                  </a:ext>
+                </a:extLst>
+              </p:cNvPr>
+              <p:cNvSpPr/>
+              <p:nvPr/>
+            </p:nvSpPr>
+            <p:spPr>
+              <a:xfrm>
+                <a:off x="4010486" y="2163737"/>
+                <a:ext cx="394160" cy="394160"/>
+              </a:xfrm>
+              <a:prstGeom prst="ellipse">
+                <a:avLst/>
+              </a:prstGeom>
+              <a:solidFill>
+                <a:schemeClr val="tx2">
+                  <a:lumMod val="50000"/>
+                  <a:lumOff val="50000"/>
+                </a:schemeClr>
+              </a:solidFill>
+            </p:spPr>
+            <p:style>
+              <a:lnRef idx="2">
+                <a:schemeClr val="accent1">
+                  <a:shade val="15000"/>
+                </a:schemeClr>
+              </a:lnRef>
+              <a:fillRef idx="1">
+                <a:schemeClr val="accent1"/>
+              </a:fillRef>
+              <a:effectRef idx="0">
+                <a:schemeClr val="accent1"/>
+              </a:effectRef>
+              <a:fontRef idx="minor">
+                <a:schemeClr val="lt1"/>
+              </a:fontRef>
+            </p:style>
+            <p:txBody>
+              <a:bodyPr rtlCol="0" anchor="ctr"/>
+              <a:lstStyle/>
+              <a:p>
+                <a:pPr algn="ctr"/>
+                <a:endParaRPr lang="en-US"/>
+              </a:p>
+            </p:txBody>
+          </p:sp>
+          <p:sp>
+            <p:nvSpPr>
+              <p:cNvPr id="72" name="Oval 71">
+                <a:extLst>
+                  <a:ext uri="{FF2B5EF4-FFF2-40B4-BE49-F238E27FC236}">
+                    <a16:creationId xmlns:a16="http://schemas.microsoft.com/office/drawing/2014/main" id="{7C56DC82-A9ED-7CA4-C01C-801FB69B077E}"/>
+                  </a:ext>
+                </a:extLst>
+              </p:cNvPr>
+              <p:cNvSpPr/>
+              <p:nvPr/>
+            </p:nvSpPr>
+            <p:spPr>
+              <a:xfrm>
+                <a:off x="3364114" y="3455362"/>
+                <a:ext cx="394160" cy="394160"/>
+              </a:xfrm>
+              <a:prstGeom prst="ellipse">
+                <a:avLst/>
+              </a:prstGeom>
+              <a:solidFill>
+                <a:schemeClr val="tx2">
+                  <a:lumMod val="50000"/>
+                  <a:lumOff val="50000"/>
+                </a:schemeClr>
+              </a:solidFill>
+            </p:spPr>
+            <p:style>
+              <a:lnRef idx="2">
+                <a:schemeClr val="accent1">
+                  <a:shade val="15000"/>
+                </a:schemeClr>
+              </a:lnRef>
+              <a:fillRef idx="1">
+                <a:schemeClr val="accent1"/>
+              </a:fillRef>
+              <a:effectRef idx="0">
+                <a:schemeClr val="accent1"/>
+              </a:effectRef>
+              <a:fontRef idx="minor">
+                <a:schemeClr val="lt1"/>
+              </a:fontRef>
+            </p:style>
+            <p:txBody>
+              <a:bodyPr rtlCol="0" anchor="ctr"/>
+              <a:lstStyle/>
+              <a:p>
+                <a:pPr algn="ctr"/>
+                <a:endParaRPr lang="en-US"/>
+              </a:p>
+            </p:txBody>
+          </p:sp>
+          <p:sp>
+            <p:nvSpPr>
+              <p:cNvPr id="73" name="Oval 72">
+                <a:extLst>
+                  <a:ext uri="{FF2B5EF4-FFF2-40B4-BE49-F238E27FC236}">
+                    <a16:creationId xmlns:a16="http://schemas.microsoft.com/office/drawing/2014/main" id="{13CF257D-A4F7-A958-C8E9-3296771B9B0F}"/>
+                  </a:ext>
+                </a:extLst>
+              </p:cNvPr>
+              <p:cNvSpPr/>
+              <p:nvPr/>
+            </p:nvSpPr>
+            <p:spPr>
+              <a:xfrm>
+                <a:off x="3220064" y="2882266"/>
+                <a:ext cx="394160" cy="394160"/>
+              </a:xfrm>
+              <a:prstGeom prst="ellipse">
+                <a:avLst/>
+              </a:prstGeom>
+              <a:solidFill>
+                <a:schemeClr val="tx2">
+                  <a:lumMod val="50000"/>
+                  <a:lumOff val="50000"/>
+                </a:schemeClr>
+              </a:solidFill>
+            </p:spPr>
+            <p:style>
+              <a:lnRef idx="2">
+                <a:schemeClr val="accent1">
+                  <a:shade val="15000"/>
+                </a:schemeClr>
+              </a:lnRef>
+              <a:fillRef idx="1">
+                <a:schemeClr val="accent1"/>
+              </a:fillRef>
+              <a:effectRef idx="0">
+                <a:schemeClr val="accent1"/>
+              </a:effectRef>
+              <a:fontRef idx="minor">
+                <a:schemeClr val="lt1"/>
+              </a:fontRef>
+            </p:style>
+            <p:txBody>
+              <a:bodyPr rtlCol="0" anchor="ctr"/>
+              <a:lstStyle/>
+              <a:p>
+                <a:pPr algn="ctr"/>
+                <a:endParaRPr lang="en-US"/>
+              </a:p>
+            </p:txBody>
+          </p:sp>
+          <p:sp>
+            <p:nvSpPr>
+              <p:cNvPr id="74" name="Oval 73">
+                <a:extLst>
+                  <a:ext uri="{FF2B5EF4-FFF2-40B4-BE49-F238E27FC236}">
+                    <a16:creationId xmlns:a16="http://schemas.microsoft.com/office/drawing/2014/main" id="{649691C8-79E8-573E-9FC4-D22218DD2CB6}"/>
+                  </a:ext>
+                </a:extLst>
+              </p:cNvPr>
+              <p:cNvSpPr/>
+              <p:nvPr/>
+            </p:nvSpPr>
+            <p:spPr>
+              <a:xfrm>
+                <a:off x="4266063" y="2527716"/>
+                <a:ext cx="394160" cy="394160"/>
+              </a:xfrm>
+              <a:prstGeom prst="ellipse">
+                <a:avLst/>
+              </a:prstGeom>
+              <a:solidFill>
+                <a:schemeClr val="tx2">
+                  <a:lumMod val="50000"/>
+                  <a:lumOff val="50000"/>
+                </a:schemeClr>
+              </a:solidFill>
+            </p:spPr>
+            <p:style>
+              <a:lnRef idx="2">
+                <a:schemeClr val="accent1">
+                  <a:shade val="15000"/>
+                </a:schemeClr>
+              </a:lnRef>
+              <a:fillRef idx="1">
+                <a:schemeClr val="accent1"/>
+              </a:fillRef>
+              <a:effectRef idx="0">
+                <a:schemeClr val="accent1"/>
+              </a:effectRef>
+              <a:fontRef idx="minor">
+                <a:schemeClr val="lt1"/>
+              </a:fontRef>
+            </p:style>
+            <p:txBody>
+              <a:bodyPr rtlCol="0" anchor="ctr"/>
+              <a:lstStyle/>
+              <a:p>
+                <a:pPr algn="ctr"/>
+                <a:endParaRPr lang="en-US"/>
+              </a:p>
+            </p:txBody>
+          </p:sp>
+          <p:sp>
+            <p:nvSpPr>
+              <p:cNvPr id="75" name="Oval 74">
+                <a:extLst>
+                  <a:ext uri="{FF2B5EF4-FFF2-40B4-BE49-F238E27FC236}">
+                    <a16:creationId xmlns:a16="http://schemas.microsoft.com/office/drawing/2014/main" id="{C993A932-3F3B-841B-D612-6FBF17C919B8}"/>
+                  </a:ext>
+                </a:extLst>
+              </p:cNvPr>
+              <p:cNvSpPr/>
+              <p:nvPr/>
+            </p:nvSpPr>
+            <p:spPr>
+              <a:xfrm>
+                <a:off x="3629677" y="2899574"/>
+                <a:ext cx="394160" cy="394160"/>
+              </a:xfrm>
+              <a:prstGeom prst="ellipse">
+                <a:avLst/>
+              </a:prstGeom>
+              <a:solidFill>
+                <a:schemeClr val="tx2">
+                  <a:lumMod val="50000"/>
+                  <a:lumOff val="50000"/>
+                </a:schemeClr>
+              </a:solidFill>
+            </p:spPr>
+            <p:style>
+              <a:lnRef idx="2">
+                <a:schemeClr val="accent1">
+                  <a:shade val="15000"/>
+                </a:schemeClr>
+              </a:lnRef>
+              <a:fillRef idx="1">
+                <a:schemeClr val="accent1"/>
+              </a:fillRef>
+              <a:effectRef idx="0">
+                <a:schemeClr val="accent1"/>
+              </a:effectRef>
+              <a:fontRef idx="minor">
+                <a:schemeClr val="lt1"/>
+              </a:fontRef>
+            </p:style>
+            <p:txBody>
+              <a:bodyPr rtlCol="0" anchor="ctr"/>
+              <a:lstStyle/>
+              <a:p>
+                <a:pPr algn="ctr"/>
+                <a:endParaRPr lang="en-US"/>
+              </a:p>
+            </p:txBody>
+          </p:sp>
+          <p:sp>
+            <p:nvSpPr>
+              <p:cNvPr id="76" name="Oval 75">
+                <a:extLst>
+                  <a:ext uri="{FF2B5EF4-FFF2-40B4-BE49-F238E27FC236}">
+                    <a16:creationId xmlns:a16="http://schemas.microsoft.com/office/drawing/2014/main" id="{39C58183-0101-D0B8-F3D4-8463008220A0}"/>
+                  </a:ext>
+                </a:extLst>
+              </p:cNvPr>
+              <p:cNvSpPr/>
+              <p:nvPr/>
+            </p:nvSpPr>
+            <p:spPr>
+              <a:xfrm>
+                <a:off x="2758826" y="3093047"/>
+                <a:ext cx="394160" cy="394160"/>
+              </a:xfrm>
+              <a:prstGeom prst="ellipse">
+                <a:avLst/>
+              </a:prstGeom>
+              <a:solidFill>
+                <a:schemeClr val="tx2">
+                  <a:lumMod val="50000"/>
+                  <a:lumOff val="50000"/>
+                </a:schemeClr>
+              </a:solidFill>
+            </p:spPr>
+            <p:style>
+              <a:lnRef idx="2">
+                <a:schemeClr val="accent1">
+                  <a:shade val="15000"/>
+                </a:schemeClr>
+              </a:lnRef>
+              <a:fillRef idx="1">
+                <a:schemeClr val="accent1"/>
+              </a:fillRef>
+              <a:effectRef idx="0">
+                <a:schemeClr val="accent1"/>
+              </a:effectRef>
+              <a:fontRef idx="minor">
+                <a:schemeClr val="lt1"/>
+              </a:fontRef>
+            </p:style>
+            <p:txBody>
+              <a:bodyPr rtlCol="0" anchor="ctr"/>
+              <a:lstStyle/>
+              <a:p>
+                <a:pPr algn="ctr"/>
+                <a:endParaRPr lang="en-US"/>
+              </a:p>
+            </p:txBody>
+          </p:sp>
+          <p:sp>
+            <p:nvSpPr>
+              <p:cNvPr id="77" name="Oval 76">
+                <a:extLst>
+                  <a:ext uri="{FF2B5EF4-FFF2-40B4-BE49-F238E27FC236}">
+                    <a16:creationId xmlns:a16="http://schemas.microsoft.com/office/drawing/2014/main" id="{F81CACAD-066B-DE88-4D27-30E2BB2C1CED}"/>
+                  </a:ext>
+                </a:extLst>
+              </p:cNvPr>
+              <p:cNvSpPr/>
+              <p:nvPr/>
+            </p:nvSpPr>
+            <p:spPr>
+              <a:xfrm>
+                <a:off x="1111969" y="3685474"/>
+                <a:ext cx="394160" cy="394160"/>
+              </a:xfrm>
+              <a:prstGeom prst="ellipse">
+                <a:avLst/>
+              </a:prstGeom>
+              <a:solidFill>
+                <a:schemeClr val="tx2">
+                  <a:lumMod val="50000"/>
+                  <a:lumOff val="50000"/>
+                </a:schemeClr>
+              </a:solidFill>
+            </p:spPr>
+            <p:style>
+              <a:lnRef idx="2">
+                <a:schemeClr val="accent1">
+                  <a:shade val="15000"/>
+                </a:schemeClr>
+              </a:lnRef>
+              <a:fillRef idx="1">
+                <a:schemeClr val="accent1"/>
+              </a:fillRef>
+              <a:effectRef idx="0">
+                <a:schemeClr val="accent1"/>
+              </a:effectRef>
+              <a:fontRef idx="minor">
+                <a:schemeClr val="lt1"/>
+              </a:fontRef>
+            </p:style>
+            <p:txBody>
+              <a:bodyPr rtlCol="0" anchor="ctr"/>
+              <a:lstStyle/>
+              <a:p>
+                <a:pPr algn="ctr"/>
+                <a:endParaRPr lang="en-US"/>
+              </a:p>
+            </p:txBody>
+          </p:sp>
+          <p:sp>
+            <p:nvSpPr>
+              <p:cNvPr id="78" name="Oval 77">
+                <a:extLst>
+                  <a:ext uri="{FF2B5EF4-FFF2-40B4-BE49-F238E27FC236}">
+                    <a16:creationId xmlns:a16="http://schemas.microsoft.com/office/drawing/2014/main" id="{27899501-7E7B-E43F-095C-DAF9B18CEED6}"/>
+                  </a:ext>
+                </a:extLst>
+              </p:cNvPr>
+              <p:cNvSpPr/>
+              <p:nvPr/>
+            </p:nvSpPr>
+            <p:spPr>
+              <a:xfrm>
+                <a:off x="2965403" y="3429200"/>
+                <a:ext cx="394160" cy="394160"/>
+              </a:xfrm>
+              <a:prstGeom prst="ellipse">
+                <a:avLst/>
+              </a:prstGeom>
+              <a:solidFill>
+                <a:schemeClr val="tx2">
+                  <a:lumMod val="50000"/>
+                  <a:lumOff val="50000"/>
+                </a:schemeClr>
+              </a:solidFill>
+            </p:spPr>
+            <p:style>
+              <a:lnRef idx="2">
+                <a:schemeClr val="accent1">
+                  <a:shade val="15000"/>
+                </a:schemeClr>
+              </a:lnRef>
+              <a:fillRef idx="1">
+                <a:schemeClr val="accent1"/>
+              </a:fillRef>
+              <a:effectRef idx="0">
+                <a:schemeClr val="accent1"/>
+              </a:effectRef>
+              <a:fontRef idx="minor">
+                <a:schemeClr val="lt1"/>
+              </a:fontRef>
+            </p:style>
+            <p:txBody>
+              <a:bodyPr rtlCol="0" anchor="ctr"/>
+              <a:lstStyle/>
+              <a:p>
+                <a:pPr algn="ctr"/>
+                <a:endParaRPr lang="en-US"/>
+              </a:p>
+            </p:txBody>
+          </p:sp>
+        </p:grpSp>
+        <p:sp>
+          <p:nvSpPr>
+            <p:cNvPr id="7" name="Freeform 6">
+              <a:extLst>
+                <a:ext uri="{FF2B5EF4-FFF2-40B4-BE49-F238E27FC236}">
+                  <a16:creationId xmlns:a16="http://schemas.microsoft.com/office/drawing/2014/main" id="{E0ED927A-1FB0-BAB3-0A9F-295287472489}"/>
+                </a:ext>
+              </a:extLst>
+            </p:cNvPr>
+            <p:cNvSpPr/>
+            <p:nvPr/>
+          </p:nvSpPr>
+          <p:spPr>
+            <a:xfrm>
+              <a:off x="1376127" y="1729212"/>
+              <a:ext cx="3349782" cy="2127564"/>
+            </a:xfrm>
+            <a:custGeom>
+              <a:avLst/>
+              <a:gdLst>
+                <a:gd name="connsiteX0" fmla="*/ 0 w 3349782"/>
+                <a:gd name="connsiteY0" fmla="*/ 2127564 h 2127564"/>
+                <a:gd name="connsiteX1" fmla="*/ 2308633 w 3349782"/>
+                <a:gd name="connsiteY1" fmla="*/ 1575303 h 2127564"/>
+                <a:gd name="connsiteX2" fmla="*/ 3349782 w 3349782"/>
+                <a:gd name="connsiteY2" fmla="*/ 0 h 2127564"/>
+              </a:gdLst>
+              <a:ahLst/>
+              <a:cxnLst>
+                <a:cxn ang="0">
+                  <a:pos x="connsiteX0" y="connsiteY0"/>
+                </a:cxn>
+                <a:cxn ang="0">
+                  <a:pos x="connsiteX1" y="connsiteY1"/>
+                </a:cxn>
+                <a:cxn ang="0">
+                  <a:pos x="connsiteX2" y="connsiteY2"/>
+                </a:cxn>
+              </a:cxnLst>
+              <a:rect l="l" t="t" r="r" b="b"/>
+              <a:pathLst>
+                <a:path w="3349782" h="2127564">
+                  <a:moveTo>
+                    <a:pt x="0" y="2127564"/>
+                  </a:moveTo>
+                  <a:cubicBezTo>
+                    <a:pt x="875168" y="2028730"/>
+                    <a:pt x="1750336" y="1929897"/>
+                    <a:pt x="2308633" y="1575303"/>
+                  </a:cubicBezTo>
+                  <a:cubicBezTo>
+                    <a:pt x="2866930" y="1220709"/>
+                    <a:pt x="3185311" y="251988"/>
+                    <a:pt x="3349782" y="0"/>
+                  </a:cubicBezTo>
+                </a:path>
+              </a:pathLst>
+            </a:custGeom>
+            <a:noFill/>
+            <a:ln w="57150">
+              <a:solidFill>
+                <a:srgbClr val="FF0000"/>
+              </a:solidFill>
+            </a:ln>
+          </p:spPr>
+          <p:style>
+            <a:lnRef idx="2">
+              <a:schemeClr val="accent1">
+                <a:shade val="15000"/>
+              </a:schemeClr>
+            </a:lnRef>
+            <a:fillRef idx="1">
+              <a:schemeClr val="accent1"/>
+            </a:fillRef>
+            <a:effectRef idx="0">
+              <a:schemeClr val="accent1"/>
+            </a:effectRef>
+            <a:fontRef idx="minor">
+              <a:schemeClr val="lt1"/>
+            </a:fontRef>
+          </p:style>
+          <p:txBody>
+            <a:bodyPr rtlCol="0" anchor="ctr"/>
+            <a:lstStyle/>
+            <a:p>
+              <a:pPr algn="ctr"/>
+              <a:endParaRPr lang="en-US"/>
+            </a:p>
+          </p:txBody>
+        </p:sp>
+      </p:grpSp>
+      <p:pic>
+        <p:nvPicPr>
+          <p:cNvPr id="12" name="Picture 11">
+            <a:extLst>
+              <a:ext uri="{FF2B5EF4-FFF2-40B4-BE49-F238E27FC236}">
+                <a16:creationId xmlns:a16="http://schemas.microsoft.com/office/drawing/2014/main" id="{1E63FC69-69E3-C16D-8FE7-5F6315D33B62}"/>
+              </a:ext>
+            </a:extLst>
+          </p:cNvPr>
+          <p:cNvPicPr>
+            <a:picLocks noChangeAspect="1"/>
+          </p:cNvPicPr>
+          <p:nvPr/>
+        </p:nvPicPr>
+        <p:blipFill>
+          <a:blip r:embed="rId2"/>
+          <a:stretch>
+            <a:fillRect/>
+          </a:stretch>
+        </p:blipFill>
+        <p:spPr>
+          <a:xfrm>
+            <a:off x="7483324" y="-281755"/>
+            <a:ext cx="4401495" cy="3435581"/>
+          </a:xfrm>
+          <a:prstGeom prst="rect">
+            <a:avLst/>
+          </a:prstGeom>
+        </p:spPr>
+      </p:pic>
+      <p:pic>
+        <p:nvPicPr>
+          <p:cNvPr id="13" name="Picture 12">
+            <a:extLst>
+              <a:ext uri="{FF2B5EF4-FFF2-40B4-BE49-F238E27FC236}">
+                <a16:creationId xmlns:a16="http://schemas.microsoft.com/office/drawing/2014/main" id="{2A644DF4-CE00-47C4-99F6-BA687EC68972}"/>
+              </a:ext>
+            </a:extLst>
+          </p:cNvPr>
+          <p:cNvPicPr>
+            <a:picLocks noChangeAspect="1"/>
+          </p:cNvPicPr>
+          <p:nvPr/>
+        </p:nvPicPr>
+        <p:blipFill>
+          <a:blip r:embed="rId3"/>
+          <a:stretch>
+            <a:fillRect/>
+          </a:stretch>
+        </p:blipFill>
+        <p:spPr>
+          <a:xfrm>
+            <a:off x="6792119" y="2724796"/>
+            <a:ext cx="5092700" cy="3975100"/>
+          </a:xfrm>
+          <a:prstGeom prst="rect">
+            <a:avLst/>
+          </a:prstGeom>
+        </p:spPr>
+      </p:pic>
+    </p:spTree>
+    <p:extLst>
+      <p:ext uri="{BB962C8B-B14F-4D97-AF65-F5344CB8AC3E}">
+        <p14:creationId xmlns:p14="http://schemas.microsoft.com/office/powerpoint/2010/main" val="1449988058"/>
+      </p:ext>
+    </p:extLst>
+  </p:cSld>
+  <p:clrMapOvr>
+    <a:masterClrMapping/>
+  </p:clrMapOvr>
+</p:sld>
+</file>
+
 <file path=ppt/theme/theme1.xml><?xml version="1.0" encoding="utf-8"?>
 <a:theme xmlns:a="http://schemas.openxmlformats.org/drawingml/2006/main" name="Office Theme">
   <a:themeElements>

</xml_diff>

<commit_message>
update icons for plot styles
</commit_message>
<xml_diff>
--- a/app/ui/iconpack/icon.pptx
+++ b/app/ui/iconpack/icon.pptx
@@ -6777,10 +6777,10 @@
       </p:grpSp>
       <p:grpSp>
         <p:nvGrpSpPr>
-          <p:cNvPr id="67" name="Group 66">
+          <p:cNvPr id="120" name="Group 119">
             <a:extLst>
               <a:ext uri="{FF2B5EF4-FFF2-40B4-BE49-F238E27FC236}">
-                <a16:creationId xmlns:a16="http://schemas.microsoft.com/office/drawing/2014/main" id="{EA80072C-6B33-4A32-5996-362D7679A303}"/>
+                <a16:creationId xmlns:a16="http://schemas.microsoft.com/office/drawing/2014/main" id="{D768D617-9973-ABBA-0A4E-F6FE52A858D8}"/>
               </a:ext>
             </a:extLst>
           </p:cNvPr>
@@ -6791,33 +6791,137 @@
           <a:xfrm>
             <a:off x="745298" y="304384"/>
             <a:ext cx="3962400" cy="2627586"/>
-            <a:chOff x="935421" y="1608083"/>
+            <a:chOff x="745298" y="304384"/>
             <a:chExt cx="3962400" cy="2627586"/>
           </a:xfrm>
         </p:grpSpPr>
-        <p:cxnSp>
-          <p:nvCxnSpPr>
-            <p:cNvPr id="9" name="Straight Connector 8">
+        <p:grpSp>
+          <p:nvGrpSpPr>
+            <p:cNvPr id="67" name="Group 66">
               <a:extLst>
                 <a:ext uri="{FF2B5EF4-FFF2-40B4-BE49-F238E27FC236}">
-                  <a16:creationId xmlns:a16="http://schemas.microsoft.com/office/drawing/2014/main" id="{32297897-D92E-793D-46D9-BDAE4EC0ED96}"/>
+                  <a16:creationId xmlns:a16="http://schemas.microsoft.com/office/drawing/2014/main" id="{EA80072C-6B33-4A32-5996-362D7679A303}"/>
                 </a:ext>
               </a:extLst>
             </p:cNvPr>
-            <p:cNvCxnSpPr>
-              <a:cxnSpLocks/>
-            </p:cNvCxnSpPr>
+            <p:cNvGrpSpPr/>
+            <p:nvPr/>
+          </p:nvGrpSpPr>
+          <p:grpSpPr>
+            <a:xfrm>
+              <a:off x="745298" y="304384"/>
+              <a:ext cx="3962400" cy="2627586"/>
+              <a:chOff x="935421" y="1608083"/>
+              <a:chExt cx="3962400" cy="2627586"/>
+            </a:xfrm>
+          </p:grpSpPr>
+          <p:cxnSp>
+            <p:nvCxnSpPr>
+              <p:cNvPr id="9" name="Straight Connector 8">
+                <a:extLst>
+                  <a:ext uri="{FF2B5EF4-FFF2-40B4-BE49-F238E27FC236}">
+                    <a16:creationId xmlns:a16="http://schemas.microsoft.com/office/drawing/2014/main" id="{32297897-D92E-793D-46D9-BDAE4EC0ED96}"/>
+                  </a:ext>
+                </a:extLst>
+              </p:cNvPr>
+              <p:cNvCxnSpPr>
+                <a:cxnSpLocks/>
+              </p:cNvCxnSpPr>
+              <p:nvPr/>
+            </p:nvCxnSpPr>
+            <p:spPr>
+              <a:xfrm>
+                <a:off x="935421" y="4214649"/>
+                <a:ext cx="3962400" cy="0"/>
+              </a:xfrm>
+              <a:prstGeom prst="line">
+                <a:avLst/>
+              </a:prstGeom>
+              <a:ln w="76200"/>
+            </p:spPr>
+            <p:style>
+              <a:lnRef idx="2">
+                <a:schemeClr val="dk1"/>
+              </a:lnRef>
+              <a:fillRef idx="0">
+                <a:schemeClr val="dk1"/>
+              </a:fillRef>
+              <a:effectRef idx="1">
+                <a:schemeClr val="dk1"/>
+              </a:effectRef>
+              <a:fontRef idx="minor">
+                <a:schemeClr val="tx1"/>
+              </a:fontRef>
+            </p:style>
+          </p:cxnSp>
+          <p:cxnSp>
+            <p:nvCxnSpPr>
+              <p:cNvPr id="10" name="Straight Connector 9">
+                <a:extLst>
+                  <a:ext uri="{FF2B5EF4-FFF2-40B4-BE49-F238E27FC236}">
+                    <a16:creationId xmlns:a16="http://schemas.microsoft.com/office/drawing/2014/main" id="{F4D7C357-AD20-A095-3745-1942979D3E21}"/>
+                  </a:ext>
+                </a:extLst>
+              </p:cNvPr>
+              <p:cNvCxnSpPr>
+                <a:cxnSpLocks/>
+              </p:cNvCxnSpPr>
+              <p:nvPr/>
+            </p:nvCxnSpPr>
+            <p:spPr>
+              <a:xfrm flipV="1">
+                <a:off x="940676" y="1608083"/>
+                <a:ext cx="0" cy="2627586"/>
+              </a:xfrm>
+              <a:prstGeom prst="line">
+                <a:avLst/>
+              </a:prstGeom>
+              <a:ln w="76200"/>
+            </p:spPr>
+            <p:style>
+              <a:lnRef idx="2">
+                <a:schemeClr val="dk1"/>
+              </a:lnRef>
+              <a:fillRef idx="0">
+                <a:schemeClr val="dk1"/>
+              </a:fillRef>
+              <a:effectRef idx="1">
+                <a:schemeClr val="dk1"/>
+              </a:effectRef>
+              <a:fontRef idx="minor">
+                <a:schemeClr val="tx1"/>
+              </a:fontRef>
+            </p:style>
+          </p:cxnSp>
+        </p:grpSp>
+        <p:cxnSp>
+          <p:nvCxnSpPr>
+            <p:cNvPr id="81" name="Straight Connector 80">
+              <a:extLst>
+                <a:ext uri="{FF2B5EF4-FFF2-40B4-BE49-F238E27FC236}">
+                  <a16:creationId xmlns:a16="http://schemas.microsoft.com/office/drawing/2014/main" id="{D39F9992-C215-2286-8565-6F4EBEA5A2BF}"/>
+                </a:ext>
+              </a:extLst>
+            </p:cNvPr>
+            <p:cNvCxnSpPr/>
             <p:nvPr/>
           </p:nvCxnSpPr>
           <p:spPr>
-            <a:xfrm>
-              <a:off x="935421" y="4214649"/>
-              <a:ext cx="3962400" cy="0"/>
+            <a:xfrm flipV="1">
+              <a:off x="869839" y="1429008"/>
+              <a:ext cx="914400" cy="1251865"/>
             </a:xfrm>
             <a:prstGeom prst="line">
               <a:avLst/>
             </a:prstGeom>
-            <a:ln w="76200"/>
+            <a:ln w="57150">
+              <a:solidFill>
+                <a:schemeClr val="tx2">
+                  <a:lumMod val="50000"/>
+                  <a:lumOff val="50000"/>
+                </a:schemeClr>
+              </a:solidFill>
+            </a:ln>
           </p:spPr>
           <p:style>
             <a:lnRef idx="2">
@@ -6836,10 +6940,56 @@
         </p:cxnSp>
         <p:cxnSp>
           <p:nvCxnSpPr>
-            <p:cNvPr id="10" name="Straight Connector 9">
+            <p:cNvPr id="82" name="Straight Connector 81">
               <a:extLst>
                 <a:ext uri="{FF2B5EF4-FFF2-40B4-BE49-F238E27FC236}">
-                  <a16:creationId xmlns:a16="http://schemas.microsoft.com/office/drawing/2014/main" id="{F4D7C357-AD20-A095-3745-1942979D3E21}"/>
+                  <a16:creationId xmlns:a16="http://schemas.microsoft.com/office/drawing/2014/main" id="{8C6B4A8A-C4F0-6ADC-64ED-64F95CD05828}"/>
+                </a:ext>
+              </a:extLst>
+            </p:cNvPr>
+            <p:cNvCxnSpPr>
+              <a:cxnSpLocks/>
+            </p:cNvCxnSpPr>
+            <p:nvPr/>
+          </p:nvCxnSpPr>
+          <p:spPr>
+            <a:xfrm flipH="1" flipV="1">
+              <a:off x="1739294" y="1431040"/>
+              <a:ext cx="1112129" cy="167010"/>
+            </a:xfrm>
+            <a:prstGeom prst="line">
+              <a:avLst/>
+            </a:prstGeom>
+            <a:ln w="57150">
+              <a:solidFill>
+                <a:schemeClr val="tx2">
+                  <a:lumMod val="50000"/>
+                  <a:lumOff val="50000"/>
+                </a:schemeClr>
+              </a:solidFill>
+            </a:ln>
+          </p:spPr>
+          <p:style>
+            <a:lnRef idx="2">
+              <a:schemeClr val="dk1"/>
+            </a:lnRef>
+            <a:fillRef idx="0">
+              <a:schemeClr val="dk1"/>
+            </a:fillRef>
+            <a:effectRef idx="1">
+              <a:schemeClr val="dk1"/>
+            </a:effectRef>
+            <a:fontRef idx="minor">
+              <a:schemeClr val="tx1"/>
+            </a:fontRef>
+          </p:style>
+        </p:cxnSp>
+        <p:cxnSp>
+          <p:nvCxnSpPr>
+            <p:cNvPr id="84" name="Straight Connector 83">
+              <a:extLst>
+                <a:ext uri="{FF2B5EF4-FFF2-40B4-BE49-F238E27FC236}">
+                  <a16:creationId xmlns:a16="http://schemas.microsoft.com/office/drawing/2014/main" id="{7A3E794F-6660-F20C-70CD-6274A83DD430}"/>
                 </a:ext>
               </a:extLst>
             </p:cNvPr>
@@ -6850,13 +7000,431 @@
           </p:nvCxnSpPr>
           <p:spPr>
             <a:xfrm flipV="1">
-              <a:off x="940676" y="1608083"/>
-              <a:ext cx="0" cy="2627586"/>
+              <a:off x="2826510" y="866599"/>
+              <a:ext cx="1195468" cy="736427"/>
             </a:xfrm>
             <a:prstGeom prst="line">
               <a:avLst/>
             </a:prstGeom>
-            <a:ln w="76200"/>
+            <a:ln w="57150">
+              <a:solidFill>
+                <a:schemeClr val="tx2">
+                  <a:lumMod val="50000"/>
+                  <a:lumOff val="50000"/>
+                </a:schemeClr>
+              </a:solidFill>
+            </a:ln>
+          </p:spPr>
+          <p:style>
+            <a:lnRef idx="2">
+              <a:schemeClr val="dk1"/>
+            </a:lnRef>
+            <a:fillRef idx="0">
+              <a:schemeClr val="dk1"/>
+            </a:fillRef>
+            <a:effectRef idx="1">
+              <a:schemeClr val="dk1"/>
+            </a:effectRef>
+            <a:fontRef idx="minor">
+              <a:schemeClr val="tx1"/>
+            </a:fontRef>
+          </p:style>
+        </p:cxnSp>
+        <p:cxnSp>
+          <p:nvCxnSpPr>
+            <p:cNvPr id="86" name="Straight Connector 85">
+              <a:extLst>
+                <a:ext uri="{FF2B5EF4-FFF2-40B4-BE49-F238E27FC236}">
+                  <a16:creationId xmlns:a16="http://schemas.microsoft.com/office/drawing/2014/main" id="{477B9ED8-44B0-4265-25F1-A250EB1ADC75}"/>
+                </a:ext>
+              </a:extLst>
+            </p:cNvPr>
+            <p:cNvCxnSpPr>
+              <a:cxnSpLocks/>
+            </p:cNvCxnSpPr>
+            <p:nvPr/>
+          </p:nvCxnSpPr>
+          <p:spPr>
+            <a:xfrm flipV="1">
+              <a:off x="869839" y="1824112"/>
+              <a:ext cx="1055832" cy="856761"/>
+            </a:xfrm>
+            <a:prstGeom prst="line">
+              <a:avLst/>
+            </a:prstGeom>
+            <a:ln w="57150">
+              <a:solidFill>
+                <a:schemeClr val="accent5">
+                  <a:lumMod val="60000"/>
+                  <a:lumOff val="40000"/>
+                </a:schemeClr>
+              </a:solidFill>
+            </a:ln>
+          </p:spPr>
+          <p:style>
+            <a:lnRef idx="2">
+              <a:schemeClr val="dk1"/>
+            </a:lnRef>
+            <a:fillRef idx="0">
+              <a:schemeClr val="dk1"/>
+            </a:fillRef>
+            <a:effectRef idx="1">
+              <a:schemeClr val="dk1"/>
+            </a:effectRef>
+            <a:fontRef idx="minor">
+              <a:schemeClr val="tx1"/>
+            </a:fontRef>
+          </p:style>
+        </p:cxnSp>
+        <p:cxnSp>
+          <p:nvCxnSpPr>
+            <p:cNvPr id="87" name="Straight Connector 86">
+              <a:extLst>
+                <a:ext uri="{FF2B5EF4-FFF2-40B4-BE49-F238E27FC236}">
+                  <a16:creationId xmlns:a16="http://schemas.microsoft.com/office/drawing/2014/main" id="{5C29AAF3-0D32-8AA0-82FC-FACE841E700F}"/>
+                </a:ext>
+              </a:extLst>
+            </p:cNvPr>
+            <p:cNvCxnSpPr>
+              <a:cxnSpLocks/>
+            </p:cNvCxnSpPr>
+            <p:nvPr/>
+          </p:nvCxnSpPr>
+          <p:spPr>
+            <a:xfrm flipH="1" flipV="1">
+              <a:off x="1900147" y="1829088"/>
+              <a:ext cx="1034204" cy="126756"/>
+            </a:xfrm>
+            <a:prstGeom prst="line">
+              <a:avLst/>
+            </a:prstGeom>
+            <a:ln w="57150">
+              <a:solidFill>
+                <a:schemeClr val="accent5">
+                  <a:lumMod val="60000"/>
+                  <a:lumOff val="40000"/>
+                </a:schemeClr>
+              </a:solidFill>
+            </a:ln>
+          </p:spPr>
+          <p:style>
+            <a:lnRef idx="2">
+              <a:schemeClr val="dk1"/>
+            </a:lnRef>
+            <a:fillRef idx="0">
+              <a:schemeClr val="dk1"/>
+            </a:fillRef>
+            <a:effectRef idx="1">
+              <a:schemeClr val="dk1"/>
+            </a:effectRef>
+            <a:fontRef idx="minor">
+              <a:schemeClr val="tx1"/>
+            </a:fontRef>
+          </p:style>
+        </p:cxnSp>
+        <p:cxnSp>
+          <p:nvCxnSpPr>
+            <p:cNvPr id="88" name="Straight Connector 87">
+              <a:extLst>
+                <a:ext uri="{FF2B5EF4-FFF2-40B4-BE49-F238E27FC236}">
+                  <a16:creationId xmlns:a16="http://schemas.microsoft.com/office/drawing/2014/main" id="{D5A40400-6D20-66D0-9142-13437333C576}"/>
+                </a:ext>
+              </a:extLst>
+            </p:cNvPr>
+            <p:cNvCxnSpPr>
+              <a:cxnSpLocks/>
+            </p:cNvCxnSpPr>
+            <p:nvPr/>
+          </p:nvCxnSpPr>
+          <p:spPr>
+            <a:xfrm flipV="1">
+              <a:off x="2910059" y="952467"/>
+              <a:ext cx="1183809" cy="1023959"/>
+            </a:xfrm>
+            <a:prstGeom prst="line">
+              <a:avLst/>
+            </a:prstGeom>
+            <a:ln w="57150">
+              <a:solidFill>
+                <a:schemeClr val="accent5">
+                  <a:lumMod val="60000"/>
+                  <a:lumOff val="40000"/>
+                </a:schemeClr>
+              </a:solidFill>
+            </a:ln>
+          </p:spPr>
+          <p:style>
+            <a:lnRef idx="2">
+              <a:schemeClr val="dk1"/>
+            </a:lnRef>
+            <a:fillRef idx="0">
+              <a:schemeClr val="dk1"/>
+            </a:fillRef>
+            <a:effectRef idx="1">
+              <a:schemeClr val="dk1"/>
+            </a:effectRef>
+            <a:fontRef idx="minor">
+              <a:schemeClr val="tx1"/>
+            </a:fontRef>
+          </p:style>
+        </p:cxnSp>
+        <p:cxnSp>
+          <p:nvCxnSpPr>
+            <p:cNvPr id="104" name="Straight Connector 103">
+              <a:extLst>
+                <a:ext uri="{FF2B5EF4-FFF2-40B4-BE49-F238E27FC236}">
+                  <a16:creationId xmlns:a16="http://schemas.microsoft.com/office/drawing/2014/main" id="{86E4885C-3E60-F840-B0E8-97E9C170B90C}"/>
+                </a:ext>
+              </a:extLst>
+            </p:cNvPr>
+            <p:cNvCxnSpPr>
+              <a:cxnSpLocks/>
+            </p:cNvCxnSpPr>
+            <p:nvPr/>
+          </p:nvCxnSpPr>
+          <p:spPr>
+            <a:xfrm flipV="1">
+              <a:off x="888085" y="2088273"/>
+              <a:ext cx="1208843" cy="592600"/>
+            </a:xfrm>
+            <a:prstGeom prst="line">
+              <a:avLst/>
+            </a:prstGeom>
+            <a:ln w="57150">
+              <a:solidFill>
+                <a:schemeClr val="accent3">
+                  <a:lumMod val="60000"/>
+                  <a:lumOff val="40000"/>
+                </a:schemeClr>
+              </a:solidFill>
+            </a:ln>
+          </p:spPr>
+          <p:style>
+            <a:lnRef idx="2">
+              <a:schemeClr val="dk1"/>
+            </a:lnRef>
+            <a:fillRef idx="0">
+              <a:schemeClr val="dk1"/>
+            </a:fillRef>
+            <a:effectRef idx="1">
+              <a:schemeClr val="dk1"/>
+            </a:effectRef>
+            <a:fontRef idx="minor">
+              <a:schemeClr val="tx1"/>
+            </a:fontRef>
+          </p:style>
+        </p:cxnSp>
+        <p:cxnSp>
+          <p:nvCxnSpPr>
+            <p:cNvPr id="105" name="Straight Connector 104">
+              <a:extLst>
+                <a:ext uri="{FF2B5EF4-FFF2-40B4-BE49-F238E27FC236}">
+                  <a16:creationId xmlns:a16="http://schemas.microsoft.com/office/drawing/2014/main" id="{0D283514-23C6-7A17-043B-FF7B8430C4F5}"/>
+                </a:ext>
+              </a:extLst>
+            </p:cNvPr>
+            <p:cNvCxnSpPr>
+              <a:cxnSpLocks/>
+            </p:cNvCxnSpPr>
+            <p:nvPr/>
+          </p:nvCxnSpPr>
+          <p:spPr>
+            <a:xfrm flipH="1" flipV="1">
+              <a:off x="2091034" y="2090182"/>
+              <a:ext cx="1034204" cy="126756"/>
+            </a:xfrm>
+            <a:prstGeom prst="line">
+              <a:avLst/>
+            </a:prstGeom>
+            <a:ln w="57150">
+              <a:solidFill>
+                <a:schemeClr val="accent3">
+                  <a:lumMod val="60000"/>
+                  <a:lumOff val="40000"/>
+                </a:schemeClr>
+              </a:solidFill>
+            </a:ln>
+          </p:spPr>
+          <p:style>
+            <a:lnRef idx="2">
+              <a:schemeClr val="dk1"/>
+            </a:lnRef>
+            <a:fillRef idx="0">
+              <a:schemeClr val="dk1"/>
+            </a:fillRef>
+            <a:effectRef idx="1">
+              <a:schemeClr val="dk1"/>
+            </a:effectRef>
+            <a:fontRef idx="minor">
+              <a:schemeClr val="tx1"/>
+            </a:fontRef>
+          </p:style>
+        </p:cxnSp>
+        <p:cxnSp>
+          <p:nvCxnSpPr>
+            <p:cNvPr id="106" name="Straight Connector 105">
+              <a:extLst>
+                <a:ext uri="{FF2B5EF4-FFF2-40B4-BE49-F238E27FC236}">
+                  <a16:creationId xmlns:a16="http://schemas.microsoft.com/office/drawing/2014/main" id="{6CF98749-500B-9443-5D7B-C08952C2573A}"/>
+                </a:ext>
+              </a:extLst>
+            </p:cNvPr>
+            <p:cNvCxnSpPr>
+              <a:cxnSpLocks/>
+            </p:cNvCxnSpPr>
+            <p:nvPr/>
+          </p:nvCxnSpPr>
+          <p:spPr>
+            <a:xfrm flipV="1">
+              <a:off x="3116059" y="1081996"/>
+              <a:ext cx="1135350" cy="1126730"/>
+            </a:xfrm>
+            <a:prstGeom prst="line">
+              <a:avLst/>
+            </a:prstGeom>
+            <a:ln w="57150">
+              <a:solidFill>
+                <a:schemeClr val="accent3">
+                  <a:lumMod val="60000"/>
+                  <a:lumOff val="40000"/>
+                </a:schemeClr>
+              </a:solidFill>
+            </a:ln>
+          </p:spPr>
+          <p:style>
+            <a:lnRef idx="2">
+              <a:schemeClr val="dk1"/>
+            </a:lnRef>
+            <a:fillRef idx="0">
+              <a:schemeClr val="dk1"/>
+            </a:fillRef>
+            <a:effectRef idx="1">
+              <a:schemeClr val="dk1"/>
+            </a:effectRef>
+            <a:fontRef idx="minor">
+              <a:schemeClr val="tx1"/>
+            </a:fontRef>
+          </p:style>
+        </p:cxnSp>
+        <p:cxnSp>
+          <p:nvCxnSpPr>
+            <p:cNvPr id="110" name="Straight Connector 109">
+              <a:extLst>
+                <a:ext uri="{FF2B5EF4-FFF2-40B4-BE49-F238E27FC236}">
+                  <a16:creationId xmlns:a16="http://schemas.microsoft.com/office/drawing/2014/main" id="{C499ED20-E52A-F5DE-3362-A3C54315A994}"/>
+                </a:ext>
+              </a:extLst>
+            </p:cNvPr>
+            <p:cNvCxnSpPr>
+              <a:cxnSpLocks/>
+            </p:cNvCxnSpPr>
+            <p:nvPr/>
+          </p:nvCxnSpPr>
+          <p:spPr>
+            <a:xfrm flipV="1">
+              <a:off x="888085" y="2413138"/>
+              <a:ext cx="1592958" cy="274756"/>
+            </a:xfrm>
+            <a:prstGeom prst="line">
+              <a:avLst/>
+            </a:prstGeom>
+            <a:ln w="57150">
+              <a:solidFill>
+                <a:schemeClr val="accent2">
+                  <a:lumMod val="75000"/>
+                </a:schemeClr>
+              </a:solidFill>
+            </a:ln>
+          </p:spPr>
+          <p:style>
+            <a:lnRef idx="2">
+              <a:schemeClr val="dk1"/>
+            </a:lnRef>
+            <a:fillRef idx="0">
+              <a:schemeClr val="dk1"/>
+            </a:fillRef>
+            <a:effectRef idx="1">
+              <a:schemeClr val="dk1"/>
+            </a:effectRef>
+            <a:fontRef idx="minor">
+              <a:schemeClr val="tx1"/>
+            </a:fontRef>
+          </p:style>
+        </p:cxnSp>
+        <p:cxnSp>
+          <p:nvCxnSpPr>
+            <p:cNvPr id="111" name="Straight Connector 110">
+              <a:extLst>
+                <a:ext uri="{FF2B5EF4-FFF2-40B4-BE49-F238E27FC236}">
+                  <a16:creationId xmlns:a16="http://schemas.microsoft.com/office/drawing/2014/main" id="{AAD7C02A-86E4-7A4B-C4B0-DE3681BADE34}"/>
+                </a:ext>
+              </a:extLst>
+            </p:cNvPr>
+            <p:cNvCxnSpPr>
+              <a:cxnSpLocks/>
+            </p:cNvCxnSpPr>
+            <p:nvPr/>
+          </p:nvCxnSpPr>
+          <p:spPr>
+            <a:xfrm flipH="1" flipV="1">
+              <a:off x="2447501" y="2408423"/>
+              <a:ext cx="1034204" cy="126756"/>
+            </a:xfrm>
+            <a:prstGeom prst="line">
+              <a:avLst/>
+            </a:prstGeom>
+            <a:ln w="57150">
+              <a:solidFill>
+                <a:schemeClr val="accent2">
+                  <a:lumMod val="75000"/>
+                </a:schemeClr>
+              </a:solidFill>
+            </a:ln>
+          </p:spPr>
+          <p:style>
+            <a:lnRef idx="2">
+              <a:schemeClr val="dk1"/>
+            </a:lnRef>
+            <a:fillRef idx="0">
+              <a:schemeClr val="dk1"/>
+            </a:fillRef>
+            <a:effectRef idx="1">
+              <a:schemeClr val="dk1"/>
+            </a:effectRef>
+            <a:fontRef idx="minor">
+              <a:schemeClr val="tx1"/>
+            </a:fontRef>
+          </p:style>
+        </p:cxnSp>
+        <p:cxnSp>
+          <p:nvCxnSpPr>
+            <p:cNvPr id="112" name="Straight Connector 111">
+              <a:extLst>
+                <a:ext uri="{FF2B5EF4-FFF2-40B4-BE49-F238E27FC236}">
+                  <a16:creationId xmlns:a16="http://schemas.microsoft.com/office/drawing/2014/main" id="{6958868B-200A-5B87-5714-4BA0FD591748}"/>
+                </a:ext>
+              </a:extLst>
+            </p:cNvPr>
+            <p:cNvCxnSpPr>
+              <a:cxnSpLocks/>
+            </p:cNvCxnSpPr>
+            <p:nvPr/>
+          </p:nvCxnSpPr>
+          <p:spPr>
+            <a:xfrm flipV="1">
+              <a:off x="3458065" y="1526557"/>
+              <a:ext cx="1183809" cy="1023959"/>
+            </a:xfrm>
+            <a:prstGeom prst="line">
+              <a:avLst/>
+            </a:prstGeom>
+            <a:ln w="57150">
+              <a:solidFill>
+                <a:schemeClr val="accent2">
+                  <a:lumMod val="75000"/>
+                </a:schemeClr>
+              </a:solidFill>
+            </a:ln>
           </p:spPr>
           <p:style>
             <a:lnRef idx="2">
@@ -6874,553 +7442,6 @@
           </p:style>
         </p:cxnSp>
       </p:grpSp>
-      <p:cxnSp>
-        <p:nvCxnSpPr>
-          <p:cNvPr id="81" name="Straight Connector 80">
-            <a:extLst>
-              <a:ext uri="{FF2B5EF4-FFF2-40B4-BE49-F238E27FC236}">
-                <a16:creationId xmlns:a16="http://schemas.microsoft.com/office/drawing/2014/main" id="{D39F9992-C215-2286-8565-6F4EBEA5A2BF}"/>
-              </a:ext>
-            </a:extLst>
-          </p:cNvPr>
-          <p:cNvCxnSpPr/>
-          <p:nvPr/>
-        </p:nvCxnSpPr>
-        <p:spPr>
-          <a:xfrm flipV="1">
-            <a:off x="869839" y="1429008"/>
-            <a:ext cx="914400" cy="1251865"/>
-          </a:xfrm>
-          <a:prstGeom prst="line">
-            <a:avLst/>
-          </a:prstGeom>
-          <a:ln w="57150">
-            <a:solidFill>
-              <a:schemeClr val="tx2">
-                <a:lumMod val="50000"/>
-                <a:lumOff val="50000"/>
-              </a:schemeClr>
-            </a:solidFill>
-          </a:ln>
-        </p:spPr>
-        <p:style>
-          <a:lnRef idx="2">
-            <a:schemeClr val="dk1"/>
-          </a:lnRef>
-          <a:fillRef idx="0">
-            <a:schemeClr val="dk1"/>
-          </a:fillRef>
-          <a:effectRef idx="1">
-            <a:schemeClr val="dk1"/>
-          </a:effectRef>
-          <a:fontRef idx="minor">
-            <a:schemeClr val="tx1"/>
-          </a:fontRef>
-        </p:style>
-      </p:cxnSp>
-      <p:cxnSp>
-        <p:nvCxnSpPr>
-          <p:cNvPr id="82" name="Straight Connector 81">
-            <a:extLst>
-              <a:ext uri="{FF2B5EF4-FFF2-40B4-BE49-F238E27FC236}">
-                <a16:creationId xmlns:a16="http://schemas.microsoft.com/office/drawing/2014/main" id="{8C6B4A8A-C4F0-6ADC-64ED-64F95CD05828}"/>
-              </a:ext>
-            </a:extLst>
-          </p:cNvPr>
-          <p:cNvCxnSpPr>
-            <a:cxnSpLocks/>
-          </p:cNvCxnSpPr>
-          <p:nvPr/>
-        </p:nvCxnSpPr>
-        <p:spPr>
-          <a:xfrm flipH="1" flipV="1">
-            <a:off x="1739294" y="1431040"/>
-            <a:ext cx="1112129" cy="167010"/>
-          </a:xfrm>
-          <a:prstGeom prst="line">
-            <a:avLst/>
-          </a:prstGeom>
-          <a:ln w="57150">
-            <a:solidFill>
-              <a:schemeClr val="tx2">
-                <a:lumMod val="50000"/>
-                <a:lumOff val="50000"/>
-              </a:schemeClr>
-            </a:solidFill>
-          </a:ln>
-        </p:spPr>
-        <p:style>
-          <a:lnRef idx="2">
-            <a:schemeClr val="dk1"/>
-          </a:lnRef>
-          <a:fillRef idx="0">
-            <a:schemeClr val="dk1"/>
-          </a:fillRef>
-          <a:effectRef idx="1">
-            <a:schemeClr val="dk1"/>
-          </a:effectRef>
-          <a:fontRef idx="minor">
-            <a:schemeClr val="tx1"/>
-          </a:fontRef>
-        </p:style>
-      </p:cxnSp>
-      <p:cxnSp>
-        <p:nvCxnSpPr>
-          <p:cNvPr id="84" name="Straight Connector 83">
-            <a:extLst>
-              <a:ext uri="{FF2B5EF4-FFF2-40B4-BE49-F238E27FC236}">
-                <a16:creationId xmlns:a16="http://schemas.microsoft.com/office/drawing/2014/main" id="{7A3E794F-6660-F20C-70CD-6274A83DD430}"/>
-              </a:ext>
-            </a:extLst>
-          </p:cNvPr>
-          <p:cNvCxnSpPr>
-            <a:cxnSpLocks/>
-          </p:cNvCxnSpPr>
-          <p:nvPr/>
-        </p:nvCxnSpPr>
-        <p:spPr>
-          <a:xfrm flipV="1">
-            <a:off x="2826510" y="866599"/>
-            <a:ext cx="1195468" cy="736427"/>
-          </a:xfrm>
-          <a:prstGeom prst="line">
-            <a:avLst/>
-          </a:prstGeom>
-          <a:ln w="57150">
-            <a:solidFill>
-              <a:schemeClr val="tx2">
-                <a:lumMod val="50000"/>
-                <a:lumOff val="50000"/>
-              </a:schemeClr>
-            </a:solidFill>
-          </a:ln>
-        </p:spPr>
-        <p:style>
-          <a:lnRef idx="2">
-            <a:schemeClr val="dk1"/>
-          </a:lnRef>
-          <a:fillRef idx="0">
-            <a:schemeClr val="dk1"/>
-          </a:fillRef>
-          <a:effectRef idx="1">
-            <a:schemeClr val="dk1"/>
-          </a:effectRef>
-          <a:fontRef idx="minor">
-            <a:schemeClr val="tx1"/>
-          </a:fontRef>
-        </p:style>
-      </p:cxnSp>
-      <p:cxnSp>
-        <p:nvCxnSpPr>
-          <p:cNvPr id="86" name="Straight Connector 85">
-            <a:extLst>
-              <a:ext uri="{FF2B5EF4-FFF2-40B4-BE49-F238E27FC236}">
-                <a16:creationId xmlns:a16="http://schemas.microsoft.com/office/drawing/2014/main" id="{477B9ED8-44B0-4265-25F1-A250EB1ADC75}"/>
-              </a:ext>
-            </a:extLst>
-          </p:cNvPr>
-          <p:cNvCxnSpPr>
-            <a:cxnSpLocks/>
-          </p:cNvCxnSpPr>
-          <p:nvPr/>
-        </p:nvCxnSpPr>
-        <p:spPr>
-          <a:xfrm flipV="1">
-            <a:off x="869839" y="1824112"/>
-            <a:ext cx="1055832" cy="856761"/>
-          </a:xfrm>
-          <a:prstGeom prst="line">
-            <a:avLst/>
-          </a:prstGeom>
-          <a:ln w="57150">
-            <a:solidFill>
-              <a:schemeClr val="accent5">
-                <a:lumMod val="60000"/>
-                <a:lumOff val="40000"/>
-              </a:schemeClr>
-            </a:solidFill>
-          </a:ln>
-        </p:spPr>
-        <p:style>
-          <a:lnRef idx="2">
-            <a:schemeClr val="dk1"/>
-          </a:lnRef>
-          <a:fillRef idx="0">
-            <a:schemeClr val="dk1"/>
-          </a:fillRef>
-          <a:effectRef idx="1">
-            <a:schemeClr val="dk1"/>
-          </a:effectRef>
-          <a:fontRef idx="minor">
-            <a:schemeClr val="tx1"/>
-          </a:fontRef>
-        </p:style>
-      </p:cxnSp>
-      <p:cxnSp>
-        <p:nvCxnSpPr>
-          <p:cNvPr id="87" name="Straight Connector 86">
-            <a:extLst>
-              <a:ext uri="{FF2B5EF4-FFF2-40B4-BE49-F238E27FC236}">
-                <a16:creationId xmlns:a16="http://schemas.microsoft.com/office/drawing/2014/main" id="{5C29AAF3-0D32-8AA0-82FC-FACE841E700F}"/>
-              </a:ext>
-            </a:extLst>
-          </p:cNvPr>
-          <p:cNvCxnSpPr>
-            <a:cxnSpLocks/>
-          </p:cNvCxnSpPr>
-          <p:nvPr/>
-        </p:nvCxnSpPr>
-        <p:spPr>
-          <a:xfrm flipH="1" flipV="1">
-            <a:off x="1900147" y="1829088"/>
-            <a:ext cx="1034204" cy="126756"/>
-          </a:xfrm>
-          <a:prstGeom prst="line">
-            <a:avLst/>
-          </a:prstGeom>
-          <a:ln w="57150">
-            <a:solidFill>
-              <a:schemeClr val="accent5">
-                <a:lumMod val="60000"/>
-                <a:lumOff val="40000"/>
-              </a:schemeClr>
-            </a:solidFill>
-          </a:ln>
-        </p:spPr>
-        <p:style>
-          <a:lnRef idx="2">
-            <a:schemeClr val="dk1"/>
-          </a:lnRef>
-          <a:fillRef idx="0">
-            <a:schemeClr val="dk1"/>
-          </a:fillRef>
-          <a:effectRef idx="1">
-            <a:schemeClr val="dk1"/>
-          </a:effectRef>
-          <a:fontRef idx="minor">
-            <a:schemeClr val="tx1"/>
-          </a:fontRef>
-        </p:style>
-      </p:cxnSp>
-      <p:cxnSp>
-        <p:nvCxnSpPr>
-          <p:cNvPr id="88" name="Straight Connector 87">
-            <a:extLst>
-              <a:ext uri="{FF2B5EF4-FFF2-40B4-BE49-F238E27FC236}">
-                <a16:creationId xmlns:a16="http://schemas.microsoft.com/office/drawing/2014/main" id="{D5A40400-6D20-66D0-9142-13437333C576}"/>
-              </a:ext>
-            </a:extLst>
-          </p:cNvPr>
-          <p:cNvCxnSpPr>
-            <a:cxnSpLocks/>
-          </p:cNvCxnSpPr>
-          <p:nvPr/>
-        </p:nvCxnSpPr>
-        <p:spPr>
-          <a:xfrm flipV="1">
-            <a:off x="2910059" y="952467"/>
-            <a:ext cx="1183809" cy="1023959"/>
-          </a:xfrm>
-          <a:prstGeom prst="line">
-            <a:avLst/>
-          </a:prstGeom>
-          <a:ln w="57150">
-            <a:solidFill>
-              <a:schemeClr val="accent5">
-                <a:lumMod val="60000"/>
-                <a:lumOff val="40000"/>
-              </a:schemeClr>
-            </a:solidFill>
-          </a:ln>
-        </p:spPr>
-        <p:style>
-          <a:lnRef idx="2">
-            <a:schemeClr val="dk1"/>
-          </a:lnRef>
-          <a:fillRef idx="0">
-            <a:schemeClr val="dk1"/>
-          </a:fillRef>
-          <a:effectRef idx="1">
-            <a:schemeClr val="dk1"/>
-          </a:effectRef>
-          <a:fontRef idx="minor">
-            <a:schemeClr val="tx1"/>
-          </a:fontRef>
-        </p:style>
-      </p:cxnSp>
-      <p:cxnSp>
-        <p:nvCxnSpPr>
-          <p:cNvPr id="104" name="Straight Connector 103">
-            <a:extLst>
-              <a:ext uri="{FF2B5EF4-FFF2-40B4-BE49-F238E27FC236}">
-                <a16:creationId xmlns:a16="http://schemas.microsoft.com/office/drawing/2014/main" id="{86E4885C-3E60-F840-B0E8-97E9C170B90C}"/>
-              </a:ext>
-            </a:extLst>
-          </p:cNvPr>
-          <p:cNvCxnSpPr>
-            <a:cxnSpLocks/>
-          </p:cNvCxnSpPr>
-          <p:nvPr/>
-        </p:nvCxnSpPr>
-        <p:spPr>
-          <a:xfrm flipV="1">
-            <a:off x="888085" y="2088273"/>
-            <a:ext cx="1208843" cy="592600"/>
-          </a:xfrm>
-          <a:prstGeom prst="line">
-            <a:avLst/>
-          </a:prstGeom>
-          <a:ln w="57150">
-            <a:solidFill>
-              <a:schemeClr val="accent3">
-                <a:lumMod val="60000"/>
-                <a:lumOff val="40000"/>
-              </a:schemeClr>
-            </a:solidFill>
-          </a:ln>
-        </p:spPr>
-        <p:style>
-          <a:lnRef idx="2">
-            <a:schemeClr val="dk1"/>
-          </a:lnRef>
-          <a:fillRef idx="0">
-            <a:schemeClr val="dk1"/>
-          </a:fillRef>
-          <a:effectRef idx="1">
-            <a:schemeClr val="dk1"/>
-          </a:effectRef>
-          <a:fontRef idx="minor">
-            <a:schemeClr val="tx1"/>
-          </a:fontRef>
-        </p:style>
-      </p:cxnSp>
-      <p:cxnSp>
-        <p:nvCxnSpPr>
-          <p:cNvPr id="105" name="Straight Connector 104">
-            <a:extLst>
-              <a:ext uri="{FF2B5EF4-FFF2-40B4-BE49-F238E27FC236}">
-                <a16:creationId xmlns:a16="http://schemas.microsoft.com/office/drawing/2014/main" id="{0D283514-23C6-7A17-043B-FF7B8430C4F5}"/>
-              </a:ext>
-            </a:extLst>
-          </p:cNvPr>
-          <p:cNvCxnSpPr>
-            <a:cxnSpLocks/>
-          </p:cNvCxnSpPr>
-          <p:nvPr/>
-        </p:nvCxnSpPr>
-        <p:spPr>
-          <a:xfrm flipH="1" flipV="1">
-            <a:off x="2091034" y="2090182"/>
-            <a:ext cx="1034204" cy="126756"/>
-          </a:xfrm>
-          <a:prstGeom prst="line">
-            <a:avLst/>
-          </a:prstGeom>
-          <a:ln w="57150">
-            <a:solidFill>
-              <a:schemeClr val="accent3">
-                <a:lumMod val="60000"/>
-                <a:lumOff val="40000"/>
-              </a:schemeClr>
-            </a:solidFill>
-          </a:ln>
-        </p:spPr>
-        <p:style>
-          <a:lnRef idx="2">
-            <a:schemeClr val="dk1"/>
-          </a:lnRef>
-          <a:fillRef idx="0">
-            <a:schemeClr val="dk1"/>
-          </a:fillRef>
-          <a:effectRef idx="1">
-            <a:schemeClr val="dk1"/>
-          </a:effectRef>
-          <a:fontRef idx="minor">
-            <a:schemeClr val="tx1"/>
-          </a:fontRef>
-        </p:style>
-      </p:cxnSp>
-      <p:cxnSp>
-        <p:nvCxnSpPr>
-          <p:cNvPr id="106" name="Straight Connector 105">
-            <a:extLst>
-              <a:ext uri="{FF2B5EF4-FFF2-40B4-BE49-F238E27FC236}">
-                <a16:creationId xmlns:a16="http://schemas.microsoft.com/office/drawing/2014/main" id="{6CF98749-500B-9443-5D7B-C08952C2573A}"/>
-              </a:ext>
-            </a:extLst>
-          </p:cNvPr>
-          <p:cNvCxnSpPr>
-            <a:cxnSpLocks/>
-          </p:cNvCxnSpPr>
-          <p:nvPr/>
-        </p:nvCxnSpPr>
-        <p:spPr>
-          <a:xfrm flipV="1">
-            <a:off x="3116059" y="1081996"/>
-            <a:ext cx="1135350" cy="1126730"/>
-          </a:xfrm>
-          <a:prstGeom prst="line">
-            <a:avLst/>
-          </a:prstGeom>
-          <a:ln w="57150">
-            <a:solidFill>
-              <a:schemeClr val="accent3">
-                <a:lumMod val="60000"/>
-                <a:lumOff val="40000"/>
-              </a:schemeClr>
-            </a:solidFill>
-          </a:ln>
-        </p:spPr>
-        <p:style>
-          <a:lnRef idx="2">
-            <a:schemeClr val="dk1"/>
-          </a:lnRef>
-          <a:fillRef idx="0">
-            <a:schemeClr val="dk1"/>
-          </a:fillRef>
-          <a:effectRef idx="1">
-            <a:schemeClr val="dk1"/>
-          </a:effectRef>
-          <a:fontRef idx="minor">
-            <a:schemeClr val="tx1"/>
-          </a:fontRef>
-        </p:style>
-      </p:cxnSp>
-      <p:cxnSp>
-        <p:nvCxnSpPr>
-          <p:cNvPr id="110" name="Straight Connector 109">
-            <a:extLst>
-              <a:ext uri="{FF2B5EF4-FFF2-40B4-BE49-F238E27FC236}">
-                <a16:creationId xmlns:a16="http://schemas.microsoft.com/office/drawing/2014/main" id="{C499ED20-E52A-F5DE-3362-A3C54315A994}"/>
-              </a:ext>
-            </a:extLst>
-          </p:cNvPr>
-          <p:cNvCxnSpPr>
-            <a:cxnSpLocks/>
-          </p:cNvCxnSpPr>
-          <p:nvPr/>
-        </p:nvCxnSpPr>
-        <p:spPr>
-          <a:xfrm flipV="1">
-            <a:off x="888085" y="2413138"/>
-            <a:ext cx="1592958" cy="274756"/>
-          </a:xfrm>
-          <a:prstGeom prst="line">
-            <a:avLst/>
-          </a:prstGeom>
-          <a:ln w="57150">
-            <a:solidFill>
-              <a:schemeClr val="accent2">
-                <a:lumMod val="75000"/>
-              </a:schemeClr>
-            </a:solidFill>
-          </a:ln>
-        </p:spPr>
-        <p:style>
-          <a:lnRef idx="2">
-            <a:schemeClr val="dk1"/>
-          </a:lnRef>
-          <a:fillRef idx="0">
-            <a:schemeClr val="dk1"/>
-          </a:fillRef>
-          <a:effectRef idx="1">
-            <a:schemeClr val="dk1"/>
-          </a:effectRef>
-          <a:fontRef idx="minor">
-            <a:schemeClr val="tx1"/>
-          </a:fontRef>
-        </p:style>
-      </p:cxnSp>
-      <p:cxnSp>
-        <p:nvCxnSpPr>
-          <p:cNvPr id="111" name="Straight Connector 110">
-            <a:extLst>
-              <a:ext uri="{FF2B5EF4-FFF2-40B4-BE49-F238E27FC236}">
-                <a16:creationId xmlns:a16="http://schemas.microsoft.com/office/drawing/2014/main" id="{AAD7C02A-86E4-7A4B-C4B0-DE3681BADE34}"/>
-              </a:ext>
-            </a:extLst>
-          </p:cNvPr>
-          <p:cNvCxnSpPr>
-            <a:cxnSpLocks/>
-          </p:cNvCxnSpPr>
-          <p:nvPr/>
-        </p:nvCxnSpPr>
-        <p:spPr>
-          <a:xfrm flipH="1" flipV="1">
-            <a:off x="2447501" y="2408423"/>
-            <a:ext cx="1034204" cy="126756"/>
-          </a:xfrm>
-          <a:prstGeom prst="line">
-            <a:avLst/>
-          </a:prstGeom>
-          <a:ln w="57150">
-            <a:solidFill>
-              <a:schemeClr val="accent2">
-                <a:lumMod val="75000"/>
-              </a:schemeClr>
-            </a:solidFill>
-          </a:ln>
-        </p:spPr>
-        <p:style>
-          <a:lnRef idx="2">
-            <a:schemeClr val="dk1"/>
-          </a:lnRef>
-          <a:fillRef idx="0">
-            <a:schemeClr val="dk1"/>
-          </a:fillRef>
-          <a:effectRef idx="1">
-            <a:schemeClr val="dk1"/>
-          </a:effectRef>
-          <a:fontRef idx="minor">
-            <a:schemeClr val="tx1"/>
-          </a:fontRef>
-        </p:style>
-      </p:cxnSp>
-      <p:cxnSp>
-        <p:nvCxnSpPr>
-          <p:cNvPr id="112" name="Straight Connector 111">
-            <a:extLst>
-              <a:ext uri="{FF2B5EF4-FFF2-40B4-BE49-F238E27FC236}">
-                <a16:creationId xmlns:a16="http://schemas.microsoft.com/office/drawing/2014/main" id="{6958868B-200A-5B87-5714-4BA0FD591748}"/>
-              </a:ext>
-            </a:extLst>
-          </p:cNvPr>
-          <p:cNvCxnSpPr>
-            <a:cxnSpLocks/>
-          </p:cNvCxnSpPr>
-          <p:nvPr/>
-        </p:nvCxnSpPr>
-        <p:spPr>
-          <a:xfrm flipV="1">
-            <a:off x="3458065" y="1526557"/>
-            <a:ext cx="1183809" cy="1023959"/>
-          </a:xfrm>
-          <a:prstGeom prst="line">
-            <a:avLst/>
-          </a:prstGeom>
-          <a:ln w="57150">
-            <a:solidFill>
-              <a:schemeClr val="accent2">
-                <a:lumMod val="75000"/>
-              </a:schemeClr>
-            </a:solidFill>
-          </a:ln>
-        </p:spPr>
-        <p:style>
-          <a:lnRef idx="2">
-            <a:schemeClr val="dk1"/>
-          </a:lnRef>
-          <a:fillRef idx="0">
-            <a:schemeClr val="dk1"/>
-          </a:fillRef>
-          <a:effectRef idx="1">
-            <a:schemeClr val="dk1"/>
-          </a:effectRef>
-          <a:fontRef idx="minor">
-            <a:schemeClr val="tx1"/>
-          </a:fontRef>
-        </p:style>
-      </p:cxnSp>
     </p:spTree>
     <p:extLst>
       <p:ext uri="{BB962C8B-B14F-4D97-AF65-F5344CB8AC3E}">

</xml_diff>

<commit_message>
update icon for plot_sytles
</commit_message>
<xml_diff>
--- a/app/ui/iconpack/icon.pptx
+++ b/app/ui/iconpack/icon.pptx
@@ -262,7 +262,7 @@
           <a:p>
             <a:fld id="{B9739118-5D76-D243-9607-339F9C0D3323}" type="datetimeFigureOut">
               <a:rPr lang="en-US" smtClean="0"/>
-              <a:t>7/4/25</a:t>
+              <a:t>7/5/25</a:t>
             </a:fld>
             <a:endParaRPr lang="en-US"/>
           </a:p>
@@ -460,7 +460,7 @@
           <a:p>
             <a:fld id="{B9739118-5D76-D243-9607-339F9C0D3323}" type="datetimeFigureOut">
               <a:rPr lang="en-US" smtClean="0"/>
-              <a:t>7/4/25</a:t>
+              <a:t>7/5/25</a:t>
             </a:fld>
             <a:endParaRPr lang="en-US"/>
           </a:p>
@@ -668,7 +668,7 @@
           <a:p>
             <a:fld id="{B9739118-5D76-D243-9607-339F9C0D3323}" type="datetimeFigureOut">
               <a:rPr lang="en-US" smtClean="0"/>
-              <a:t>7/4/25</a:t>
+              <a:t>7/5/25</a:t>
             </a:fld>
             <a:endParaRPr lang="en-US"/>
           </a:p>
@@ -866,7 +866,7 @@
           <a:p>
             <a:fld id="{B9739118-5D76-D243-9607-339F9C0D3323}" type="datetimeFigureOut">
               <a:rPr lang="en-US" smtClean="0"/>
-              <a:t>7/4/25</a:t>
+              <a:t>7/5/25</a:t>
             </a:fld>
             <a:endParaRPr lang="en-US"/>
           </a:p>
@@ -1141,7 +1141,7 @@
           <a:p>
             <a:fld id="{B9739118-5D76-D243-9607-339F9C0D3323}" type="datetimeFigureOut">
               <a:rPr lang="en-US" smtClean="0"/>
-              <a:t>7/4/25</a:t>
+              <a:t>7/5/25</a:t>
             </a:fld>
             <a:endParaRPr lang="en-US"/>
           </a:p>
@@ -1406,7 +1406,7 @@
           <a:p>
             <a:fld id="{B9739118-5D76-D243-9607-339F9C0D3323}" type="datetimeFigureOut">
               <a:rPr lang="en-US" smtClean="0"/>
-              <a:t>7/4/25</a:t>
+              <a:t>7/5/25</a:t>
             </a:fld>
             <a:endParaRPr lang="en-US"/>
           </a:p>
@@ -1818,7 +1818,7 @@
           <a:p>
             <a:fld id="{B9739118-5D76-D243-9607-339F9C0D3323}" type="datetimeFigureOut">
               <a:rPr lang="en-US" smtClean="0"/>
-              <a:t>7/4/25</a:t>
+              <a:t>7/5/25</a:t>
             </a:fld>
             <a:endParaRPr lang="en-US"/>
           </a:p>
@@ -1959,7 +1959,7 @@
           <a:p>
             <a:fld id="{B9739118-5D76-D243-9607-339F9C0D3323}" type="datetimeFigureOut">
               <a:rPr lang="en-US" smtClean="0"/>
-              <a:t>7/4/25</a:t>
+              <a:t>7/5/25</a:t>
             </a:fld>
             <a:endParaRPr lang="en-US"/>
           </a:p>
@@ -2072,7 +2072,7 @@
           <a:p>
             <a:fld id="{B9739118-5D76-D243-9607-339F9C0D3323}" type="datetimeFigureOut">
               <a:rPr lang="en-US" smtClean="0"/>
-              <a:t>7/4/25</a:t>
+              <a:t>7/5/25</a:t>
             </a:fld>
             <a:endParaRPr lang="en-US"/>
           </a:p>
@@ -2383,7 +2383,7 @@
           <a:p>
             <a:fld id="{B9739118-5D76-D243-9607-339F9C0D3323}" type="datetimeFigureOut">
               <a:rPr lang="en-US" smtClean="0"/>
-              <a:t>7/4/25</a:t>
+              <a:t>7/5/25</a:t>
             </a:fld>
             <a:endParaRPr lang="en-US"/>
           </a:p>
@@ -2671,7 +2671,7 @@
           <a:p>
             <a:fld id="{B9739118-5D76-D243-9607-339F9C0D3323}" type="datetimeFigureOut">
               <a:rPr lang="en-US" smtClean="0"/>
-              <a:t>7/4/25</a:t>
+              <a:t>7/5/25</a:t>
             </a:fld>
             <a:endParaRPr lang="en-US"/>
           </a:p>
@@ -2912,7 +2912,7 @@
           <a:p>
             <a:fld id="{B9739118-5D76-D243-9607-339F9C0D3323}" type="datetimeFigureOut">
               <a:rPr lang="en-US" smtClean="0"/>
-              <a:t>7/4/25</a:t>
+              <a:t>7/5/25</a:t>
             </a:fld>
             <a:endParaRPr lang="en-US"/>
           </a:p>
@@ -7492,7 +7492,7 @@
         </p:nvGrpSpPr>
         <p:grpSpPr>
           <a:xfrm>
-            <a:off x="935421" y="1608083"/>
+            <a:off x="348191" y="0"/>
             <a:ext cx="3962400" cy="2627586"/>
             <a:chOff x="935421" y="1608083"/>
             <a:chExt cx="3962400" cy="2627586"/>
@@ -8541,12 +8541,93 @@
           </p:txBody>
         </p:sp>
       </p:grpSp>
+      <p:grpSp>
+        <p:nvGrpSpPr>
+          <p:cNvPr id="17" name="Group 16">
+            <a:extLst>
+              <a:ext uri="{FF2B5EF4-FFF2-40B4-BE49-F238E27FC236}">
+                <a16:creationId xmlns:a16="http://schemas.microsoft.com/office/drawing/2014/main" id="{CCC4F894-C7F3-0E35-E865-3568B5D45760}"/>
+              </a:ext>
+            </a:extLst>
+          </p:cNvPr>
+          <p:cNvGrpSpPr/>
+          <p:nvPr/>
+        </p:nvGrpSpPr>
+        <p:grpSpPr>
+          <a:xfrm>
+            <a:off x="8662534" y="141590"/>
+            <a:ext cx="2588790" cy="2022147"/>
+            <a:chOff x="5794543" y="812710"/>
+            <a:chExt cx="5515302" cy="4308095"/>
+          </a:xfrm>
+        </p:grpSpPr>
+        <p:pic>
+          <p:nvPicPr>
+            <p:cNvPr id="14" name="Picture 13" descr="A blue and yellow pixelated image&#10;&#10;AI-generated content may be incorrect.">
+              <a:extLst>
+                <a:ext uri="{FF2B5EF4-FFF2-40B4-BE49-F238E27FC236}">
+                  <a16:creationId xmlns:a16="http://schemas.microsoft.com/office/drawing/2014/main" id="{4CC909D4-84B2-0448-1C5A-72FB3410875F}"/>
+                </a:ext>
+              </a:extLst>
+            </p:cNvPr>
+            <p:cNvPicPr>
+              <a:picLocks noChangeAspect="1"/>
+            </p:cNvPicPr>
+            <p:nvPr/>
+          </p:nvPicPr>
+          <p:blipFill>
+            <a:blip r:embed="rId2"/>
+            <a:stretch>
+              <a:fillRect/>
+            </a:stretch>
+          </p:blipFill>
+          <p:spPr>
+            <a:xfrm>
+              <a:off x="5794543" y="812710"/>
+              <a:ext cx="4568504" cy="4300232"/>
+            </a:xfrm>
+            <a:prstGeom prst="rect">
+              <a:avLst/>
+            </a:prstGeom>
+          </p:spPr>
+        </p:pic>
+        <p:pic>
+          <p:nvPicPr>
+            <p:cNvPr id="16" name="Picture 15">
+              <a:extLst>
+                <a:ext uri="{FF2B5EF4-FFF2-40B4-BE49-F238E27FC236}">
+                  <a16:creationId xmlns:a16="http://schemas.microsoft.com/office/drawing/2014/main" id="{2123AC76-054D-8194-6075-684279CA84E4}"/>
+                </a:ext>
+              </a:extLst>
+            </p:cNvPr>
+            <p:cNvPicPr>
+              <a:picLocks noChangeAspect="1"/>
+            </p:cNvPicPr>
+            <p:nvPr/>
+          </p:nvPicPr>
+          <p:blipFill>
+            <a:blip r:embed="rId3"/>
+            <a:stretch>
+              <a:fillRect/>
+            </a:stretch>
+          </p:blipFill>
+          <p:spPr>
+            <a:xfrm>
+              <a:off x="11019537" y="820572"/>
+              <a:ext cx="290308" cy="4300233"/>
+            </a:xfrm>
+            <a:prstGeom prst="rect">
+              <a:avLst/>
+            </a:prstGeom>
+          </p:spPr>
+        </p:pic>
+      </p:grpSp>
       <p:pic>
         <p:nvPicPr>
-          <p:cNvPr id="12" name="Picture 11">
+          <p:cNvPr id="23" name="Picture 22">
             <a:extLst>
               <a:ext uri="{FF2B5EF4-FFF2-40B4-BE49-F238E27FC236}">
-                <a16:creationId xmlns:a16="http://schemas.microsoft.com/office/drawing/2014/main" id="{1E63FC69-69E3-C16D-8FE7-5F6315D33B62}"/>
+                <a16:creationId xmlns:a16="http://schemas.microsoft.com/office/drawing/2014/main" id="{86CEA8F1-47C6-7CB3-F069-1E6C67877216}"/>
               </a:ext>
             </a:extLst>
           </p:cNvPr>
@@ -8556,51 +8637,152 @@
           <p:nvPr/>
         </p:nvPicPr>
         <p:blipFill>
-          <a:blip r:embed="rId2"/>
+          <a:blip r:embed="rId4"/>
           <a:stretch>
             <a:fillRect/>
           </a:stretch>
         </p:blipFill>
         <p:spPr>
           <a:xfrm>
-            <a:off x="7483324" y="-281755"/>
-            <a:ext cx="4401495" cy="3435581"/>
+            <a:off x="643867" y="2637113"/>
+            <a:ext cx="4876800" cy="3581400"/>
           </a:xfrm>
           <a:prstGeom prst="rect">
             <a:avLst/>
           </a:prstGeom>
         </p:spPr>
       </p:pic>
-      <p:pic>
-        <p:nvPicPr>
-          <p:cNvPr id="13" name="Picture 12">
+      <p:grpSp>
+        <p:nvGrpSpPr>
+          <p:cNvPr id="28" name="Group 27">
             <a:extLst>
               <a:ext uri="{FF2B5EF4-FFF2-40B4-BE49-F238E27FC236}">
-                <a16:creationId xmlns:a16="http://schemas.microsoft.com/office/drawing/2014/main" id="{2A644DF4-CE00-47C4-99F6-BA687EC68972}"/>
+                <a16:creationId xmlns:a16="http://schemas.microsoft.com/office/drawing/2014/main" id="{848366E7-8CA6-E499-925C-89C31A9116C4}"/>
               </a:ext>
             </a:extLst>
           </p:cNvPr>
-          <p:cNvPicPr>
-            <a:picLocks noChangeAspect="1"/>
-          </p:cNvPicPr>
+          <p:cNvGrpSpPr/>
           <p:nvPr/>
-        </p:nvPicPr>
-        <p:blipFill>
-          <a:blip r:embed="rId3"/>
-          <a:stretch>
-            <a:fillRect/>
-          </a:stretch>
-        </p:blipFill>
-        <p:spPr>
+        </p:nvGrpSpPr>
+        <p:grpSpPr>
           <a:xfrm>
-            <a:off x="6792119" y="2724796"/>
-            <a:ext cx="5092700" cy="3975100"/>
+            <a:off x="8132576" y="2961863"/>
+            <a:ext cx="3204294" cy="2702859"/>
+            <a:chOff x="7978897" y="2983986"/>
+            <a:chExt cx="3204294" cy="2702859"/>
           </a:xfrm>
-          <a:prstGeom prst="rect">
-            <a:avLst/>
-          </a:prstGeom>
-        </p:spPr>
-      </p:pic>
+        </p:grpSpPr>
+        <p:pic>
+          <p:nvPicPr>
+            <p:cNvPr id="25" name="Picture 24" descr="A colorful circle with black dots&#10;&#10;AI-generated content may be incorrect.">
+              <a:extLst>
+                <a:ext uri="{FF2B5EF4-FFF2-40B4-BE49-F238E27FC236}">
+                  <a16:creationId xmlns:a16="http://schemas.microsoft.com/office/drawing/2014/main" id="{C9B40D35-B217-95B4-86E0-08BDEC12C21C}"/>
+                </a:ext>
+              </a:extLst>
+            </p:cNvPr>
+            <p:cNvPicPr>
+              <a:picLocks noChangeAspect="1"/>
+            </p:cNvPicPr>
+            <p:nvPr/>
+          </p:nvPicPr>
+          <p:blipFill>
+            <a:blip r:embed="rId5">
+              <a:extLst>
+                <a:ext uri="{BEBA8EAE-BF5A-486C-A8C5-ECC9F3942E4B}">
+                  <a14:imgProps xmlns:a14="http://schemas.microsoft.com/office/drawing/2010/main">
+                    <a14:imgLayer r:embed="rId6">
+                      <a14:imgEffect>
+                        <a14:backgroundRemoval t="4500" b="97500" l="4195" r="95805">
+                          <a14:foregroundMark x1="64262" y1="14500" x2="84396" y2="29167"/>
+                          <a14:foregroundMark x1="84396" y1="29167" x2="86577" y2="49500"/>
+                          <a14:foregroundMark x1="86577" y1="49500" x2="80201" y2="68167"/>
+                          <a14:foregroundMark x1="80201" y1="68167" x2="66443" y2="80000"/>
+                          <a14:foregroundMark x1="66443" y1="80000" x2="48993" y2="86000"/>
+                          <a14:foregroundMark x1="48993" y1="86000" x2="26510" y2="81167"/>
+                          <a14:foregroundMark x1="26510" y1="81167" x2="13926" y2="65667"/>
+                          <a14:foregroundMark x1="13926" y1="65667" x2="9060" y2="46333"/>
+                          <a14:foregroundMark x1="9060" y1="46333" x2="18960" y2="28833"/>
+                          <a14:foregroundMark x1="18960" y1="28833" x2="32886" y2="17667"/>
+                          <a14:foregroundMark x1="32886" y1="17667" x2="52852" y2="17833"/>
+                          <a14:foregroundMark x1="52852" y1="17833" x2="73826" y2="26000"/>
+                          <a14:foregroundMark x1="73826" y1="26000" x2="85403" y2="41667"/>
+                          <a14:foregroundMark x1="85403" y1="41667" x2="86242" y2="62500"/>
+                          <a14:foregroundMark x1="86242" y1="62500" x2="77852" y2="78333"/>
+                          <a14:foregroundMark x1="77852" y1="78333" x2="60738" y2="88000"/>
+                          <a14:foregroundMark x1="60738" y1="88000" x2="41779" y2="91500"/>
+                          <a14:foregroundMark x1="41779" y1="91500" x2="33557" y2="86833"/>
+                          <a14:foregroundMark x1="82383" y1="26833" x2="71309" y2="12667"/>
+                          <a14:foregroundMark x1="71309" y1="12667" x2="54195" y2="5500"/>
+                          <a14:foregroundMark x1="54195" y1="5500" x2="35235" y2="6667"/>
+                          <a14:foregroundMark x1="35235" y1="6667" x2="18960" y2="15333"/>
+                          <a14:foregroundMark x1="18960" y1="15333" x2="7383" y2="29500"/>
+                          <a14:foregroundMark x1="7383" y1="29500" x2="4195" y2="47667"/>
+                          <a14:foregroundMark x1="4195" y1="47667" x2="8221" y2="73000"/>
+                          <a14:foregroundMark x1="29195" y1="92667" x2="48154" y2="97167"/>
+                          <a14:foregroundMark x1="48154" y1="97167" x2="66107" y2="95333"/>
+                          <a14:foregroundMark x1="66107" y1="95333" x2="81040" y2="85333"/>
+                          <a14:foregroundMark x1="81040" y1="85333" x2="91443" y2="70167"/>
+                          <a14:foregroundMark x1="91443" y1="70167" x2="94631" y2="52167"/>
+                          <a14:foregroundMark x1="94631" y1="52167" x2="87416" y2="24667"/>
+                          <a14:foregroundMark x1="34396" y1="95000" x2="52349" y2="97500"/>
+                          <a14:foregroundMark x1="52349" y1="97500" x2="66946" y2="95333"/>
+                          <a14:foregroundMark x1="65436" y1="9167" x2="46812" y2="4500"/>
+                          <a14:foregroundMark x1="46812" y1="4500" x2="34899" y2="6833"/>
+                          <a14:foregroundMark x1="95805" y1="55833" x2="94799" y2="49500"/>
+                          <a14:foregroundMark x1="37416" y1="6667" x2="36242" y2="6667"/>
+                        </a14:backgroundRemoval>
+                      </a14:imgEffect>
+                    </a14:imgLayer>
+                  </a14:imgProps>
+                </a:ext>
+              </a:extLst>
+            </a:blip>
+            <a:stretch>
+              <a:fillRect/>
+            </a:stretch>
+          </p:blipFill>
+          <p:spPr>
+            <a:xfrm>
+              <a:off x="7978897" y="2983986"/>
+              <a:ext cx="2684840" cy="2702859"/>
+            </a:xfrm>
+            <a:prstGeom prst="rect">
+              <a:avLst/>
+            </a:prstGeom>
+          </p:spPr>
+        </p:pic>
+        <p:pic>
+          <p:nvPicPr>
+            <p:cNvPr id="27" name="Picture 26">
+              <a:extLst>
+                <a:ext uri="{FF2B5EF4-FFF2-40B4-BE49-F238E27FC236}">
+                  <a16:creationId xmlns:a16="http://schemas.microsoft.com/office/drawing/2014/main" id="{3532F69B-99D2-450C-155B-8B53CA4FB1F8}"/>
+                </a:ext>
+              </a:extLst>
+            </p:cNvPr>
+            <p:cNvPicPr>
+              <a:picLocks noChangeAspect="1"/>
+            </p:cNvPicPr>
+            <p:nvPr/>
+          </p:nvPicPr>
+          <p:blipFill>
+            <a:blip r:embed="rId7"/>
+            <a:stretch>
+              <a:fillRect/>
+            </a:stretch>
+          </p:blipFill>
+          <p:spPr>
+            <a:xfrm>
+              <a:off x="10985401" y="3170290"/>
+              <a:ext cx="197790" cy="2515045"/>
+            </a:xfrm>
+            <a:prstGeom prst="rect">
+              <a:avLst/>
+            </a:prstGeom>
+          </p:spPr>
+        </p:pic>
+      </p:grpSp>
     </p:spTree>
     <p:extLst>
       <p:ext uri="{BB962C8B-B14F-4D97-AF65-F5344CB8AC3E}">

</xml_diff>